<commit_message>
Continuação da montagem da Documentação e organização do código-fonte.
</commit_message>
<xml_diff>
--- a/Apresentação1.pptx
+++ b/Apresentação1.pptx
@@ -125,6 +125,7 @@
   <p1510:revLst>
     <p1510:client id="{30BDF555-67D5-7F4D-E88F-8CE1BD22A84C}" v="690" dt="2021-10-19T23:18:27.093"/>
     <p1510:client id="{3DDC54BA-4075-6979-1A35-C7DCFB10469F}" v="934" dt="2021-10-20T00:12:26.392"/>
+    <p1510:client id="{521AAFE5-9A30-F6FA-69E5-18C0254DB6B9}" v="704" dt="2021-10-21T00:11:16.760"/>
     <p1510:client id="{D8C965DF-2039-0F1A-FCF3-D76005C0B460}" v="17" dt="2021-10-14T20:02:31.275"/>
     <p1510:client id="{DD34EB74-03A9-7CC1-0BA6-6F37897EA669}" v="2" dt="2021-10-19T23:19:18.156"/>
     <p1510:client id="{FF39032D-773E-417D-B62A-0A22B4029DE9}" v="19" dt="2021-10-14T20:02:19.512"/>
@@ -901,16 +902,16 @@
         <a:lstStyle/>
         <a:p>
           <a:r>
-            <a:rPr lang="pt-BR" b="0" dirty="0"/>
+            <a:rPr lang="pt-BR" b="0"/>
             <a:t>total:</a:t>
           </a:r>
           <a:r>
-            <a:rPr lang="pt-BR" b="0" dirty="0">
+            <a:rPr lang="pt-BR" b="0">
               <a:latin typeface="Calibri Light" panose="020F0302020204030204"/>
             </a:rPr>
             <a:t> </a:t>
           </a:r>
-          <a:endParaRPr lang="pt-BR" b="0" dirty="0">
+          <a:endParaRPr lang="pt-BR" b="0">
             <a:latin typeface="Calibri"/>
             <a:cs typeface="Calibri"/>
           </a:endParaRPr>
@@ -948,16 +949,16 @@
         <a:p>
           <a:pPr rtl="0"/>
           <a:r>
-            <a:rPr lang="pt-BR" dirty="0"/>
+            <a:rPr lang="pt-BR"/>
             <a:t>soma dos elementos de "volumeabsoluto" = 4.220.713</a:t>
           </a:r>
           <a:r>
-            <a:rPr lang="pt-BR" dirty="0">
+            <a:rPr lang="pt-BR">
               <a:latin typeface="Calibri Light" panose="020F0302020204030204"/>
             </a:rPr>
             <a:t>.</a:t>
           </a:r>
-          <a:endParaRPr lang="pt-BR" dirty="0"/>
+          <a:endParaRPr lang="pt-BR"/>
         </a:p>
       </dgm:t>
     </dgm:pt>
@@ -991,7 +992,7 @@
         <a:lstStyle/>
         <a:p>
           <a:r>
-            <a:rPr lang="pt-BR" dirty="0"/>
+            <a:rPr lang="pt-BR"/>
             <a:t>cumulativopedidos</a:t>
           </a:r>
         </a:p>
@@ -1028,20 +1029,20 @@
         <a:p>
           <a:pPr rtl="0"/>
           <a:r>
-            <a:rPr lang="pt-BR" dirty="0" err="1">
+            <a:rPr lang="pt-BR" err="1">
               <a:latin typeface="Calibri"/>
               <a:cs typeface="Calibri"/>
             </a:rPr>
             <a:t>volumetotal</a:t>
           </a:r>
           <a:r>
-            <a:rPr lang="pt-BR" dirty="0">
+            <a:rPr lang="pt-BR">
               <a:latin typeface="Calibri"/>
               <a:cs typeface="Calibri"/>
             </a:rPr>
             <a:t>: </a:t>
           </a:r>
-          <a:endParaRPr lang="pt-BR" dirty="0"/>
+          <a:endParaRPr lang="pt-BR"/>
         </a:p>
       </dgm:t>
     </dgm:pt>
@@ -1069,15 +1070,15 @@
         <a:p>
           <a:pPr rtl="0"/>
           <a:r>
-            <a:rPr lang="pt-BR" dirty="0"/>
+            <a:rPr lang="pt-BR"/>
             <a:t>soma das frequências das ordens; deveria equivaler ao total de pedidos (linhas, 73.670), porém por conta do arredondamento em "</a:t>
           </a:r>
           <a:r>
-            <a:rPr lang="pt-BR" dirty="0" err="1"/>
+            <a:rPr lang="pt-BR" err="1"/>
             <a:t>volumevalores</a:t>
           </a:r>
           <a:r>
-            <a:rPr lang="pt-BR" dirty="0"/>
+            <a:rPr lang="pt-BR"/>
             <a:t>", resulta 73.610.</a:t>
           </a:r>
         </a:p>
@@ -1107,23 +1108,23 @@
         <a:p>
           <a:pPr rtl="0"/>
           <a:r>
-            <a:rPr lang="pt-BR" dirty="0"/>
+            <a:rPr lang="pt-BR"/>
             <a:t>contribuição percentual acumulada do "</a:t>
           </a:r>
           <a:r>
-            <a:rPr lang="pt-BR" dirty="0" err="1"/>
+            <a:rPr lang="pt-BR" err="1"/>
             <a:t>volumeabsoluto</a:t>
           </a:r>
           <a:r>
-            <a:rPr lang="pt-BR" dirty="0"/>
+            <a:rPr lang="pt-BR"/>
             <a:t>" de cada ordem; </a:t>
           </a:r>
           <a:r>
-            <a:rPr lang="pt-BR" i="1" dirty="0"/>
+            <a:rPr lang="pt-BR" i="1"/>
             <a:t>e.g. </a:t>
           </a:r>
           <a:r>
-            <a:rPr lang="pt-BR" dirty="0"/>
+            <a:rPr lang="pt-BR"/>
             <a:t>pedidos de uma ordem correspondem a 0,0021% do total de ordens.</a:t>
           </a:r>
         </a:p>
@@ -1153,7 +1154,7 @@
         <a:p>
           <a:pPr rtl="0"/>
           <a:r>
-            <a:rPr lang="pt-BR" dirty="0">
+            <a:rPr lang="pt-BR">
               <a:latin typeface="Calibri Light" panose="020F0302020204030204"/>
             </a:rPr>
             <a:t>Cumulativolume</a:t>
@@ -1185,15 +1186,15 @@
         <a:p>
           <a:pPr algn="l" rtl="0"/>
           <a:r>
-            <a:rPr lang="pt-BR" dirty="0"/>
+            <a:rPr lang="pt-BR"/>
             <a:t>contribuição percentual acumulada de "volumevalores" (frequência de cada ordem); </a:t>
           </a:r>
           <a:r>
-            <a:rPr lang="pt-BR" i="1" dirty="0"/>
+            <a:rPr lang="pt-BR" i="1"/>
             <a:t>e.g. </a:t>
           </a:r>
           <a:r>
-            <a:rPr lang="pt-BR" dirty="0"/>
+            <a:rPr lang="pt-BR"/>
             <a:t>pedidos com uma ordem correspondem a 11.50% das ordens efetuadas.</a:t>
           </a:r>
         </a:p>
@@ -1223,7 +1224,7 @@
         <a:p>
           <a:pPr rtl="0"/>
           <a:r>
-            <a:rPr lang="pt-BR" b="0" dirty="0">
+            <a:rPr lang="pt-BR" b="0">
               <a:latin typeface="Calibri Light" panose="020F0302020204030204"/>
             </a:rPr>
             <a:t>volumevalores:</a:t>
@@ -1255,7 +1256,7 @@
         <a:p>
           <a:pPr rtl="0"/>
           <a:r>
-            <a:rPr lang="pt-BR" b="0" dirty="0">
+            <a:rPr lang="pt-BR" b="0">
               <a:latin typeface="Calibri Light" panose="020F0302020204030204"/>
             </a:rPr>
             <a:t>volumeabsoluto:</a:t>
@@ -1286,10 +1287,10 @@
         <a:lstStyle/>
         <a:p>
           <a:r>
-            <a:rPr lang="pt-BR" b="0" dirty="0"/>
+            <a:rPr lang="pt-BR" b="0"/>
             <a:t>frequência da ordem vezes sua quantidade.</a:t>
           </a:r>
-          <a:endParaRPr lang="pt-BR" dirty="0"/>
+          <a:endParaRPr lang="pt-BR"/>
         </a:p>
       </dgm:t>
     </dgm:pt>
@@ -1317,11 +1318,11 @@
         <a:p>
           <a:pPr rtl="0"/>
           <a:r>
-            <a:rPr lang="pt-BR" b="0" dirty="0"/>
+            <a:rPr lang="pt-BR" b="0"/>
             <a:t>frequência da ordem</a:t>
           </a:r>
           <a:r>
-            <a:rPr lang="pt-BR" b="0" dirty="0">
+            <a:rPr lang="pt-BR" b="0">
               <a:latin typeface="Calibri Light" panose="020F0302020204030204"/>
             </a:rPr>
             <a:t>.</a:t>
@@ -1702,11 +1703,11 @@
             <a:buChar char="•"/>
           </a:pPr>
           <a:r>
-            <a:rPr lang="pt-BR" sz="1300" b="0" kern="1200" dirty="0"/>
+            <a:rPr lang="pt-BR" sz="1300" b="0" kern="1200"/>
             <a:t>frequência da ordem</a:t>
           </a:r>
           <a:r>
-            <a:rPr lang="pt-BR" sz="1300" b="0" kern="1200" dirty="0">
+            <a:rPr lang="pt-BR" sz="1300" b="0" kern="1200">
               <a:latin typeface="Calibri Light" panose="020F0302020204030204"/>
             </a:rPr>
             <a:t>.</a:t>
@@ -1786,7 +1787,7 @@
             <a:buNone/>
           </a:pPr>
           <a:r>
-            <a:rPr lang="pt-BR" sz="1300" b="0" kern="1200" dirty="0">
+            <a:rPr lang="pt-BR" sz="1300" b="0" kern="1200">
               <a:latin typeface="Calibri Light" panose="020F0302020204030204"/>
             </a:rPr>
             <a:t>volumevalores:</a:t>
@@ -1865,10 +1866,10 @@
             <a:buChar char="•"/>
           </a:pPr>
           <a:r>
-            <a:rPr lang="pt-BR" sz="1300" b="0" kern="1200" dirty="0"/>
+            <a:rPr lang="pt-BR" sz="1300" b="0" kern="1200"/>
             <a:t>frequência da ordem vezes sua quantidade.</a:t>
           </a:r>
-          <a:endParaRPr lang="pt-BR" sz="1300" kern="1200" dirty="0"/>
+          <a:endParaRPr lang="pt-BR" sz="1300" kern="1200"/>
         </a:p>
       </dsp:txBody>
       <dsp:txXfrm>
@@ -1944,7 +1945,7 @@
             <a:buNone/>
           </a:pPr>
           <a:r>
-            <a:rPr lang="pt-BR" sz="1300" b="0" kern="1200" dirty="0">
+            <a:rPr lang="pt-BR" sz="1300" b="0" kern="1200">
               <a:latin typeface="Calibri Light" panose="020F0302020204030204"/>
             </a:rPr>
             <a:t>volumeabsoluto:</a:t>
@@ -2023,16 +2024,16 @@
             <a:buChar char="•"/>
           </a:pPr>
           <a:r>
-            <a:rPr lang="pt-BR" sz="1300" kern="1200" dirty="0"/>
+            <a:rPr lang="pt-BR" sz="1300" kern="1200"/>
             <a:t>soma dos elementos de "volumeabsoluto" = 4.220.713</a:t>
           </a:r>
           <a:r>
-            <a:rPr lang="pt-BR" sz="1300" kern="1200" dirty="0">
+            <a:rPr lang="pt-BR" sz="1300" kern="1200">
               <a:latin typeface="Calibri Light" panose="020F0302020204030204"/>
             </a:rPr>
             <a:t>.</a:t>
           </a:r>
-          <a:endParaRPr lang="pt-BR" sz="1300" kern="1200" dirty="0"/>
+          <a:endParaRPr lang="pt-BR" sz="1300" kern="1200"/>
         </a:p>
       </dsp:txBody>
       <dsp:txXfrm>
@@ -2108,16 +2109,16 @@
             <a:buNone/>
           </a:pPr>
           <a:r>
-            <a:rPr lang="pt-BR" sz="1300" b="0" kern="1200" dirty="0"/>
+            <a:rPr lang="pt-BR" sz="1300" b="0" kern="1200"/>
             <a:t>total:</a:t>
           </a:r>
           <a:r>
-            <a:rPr lang="pt-BR" sz="1300" b="0" kern="1200" dirty="0">
+            <a:rPr lang="pt-BR" sz="1300" b="0" kern="1200">
               <a:latin typeface="Calibri Light" panose="020F0302020204030204"/>
             </a:rPr>
             <a:t> </a:t>
           </a:r>
-          <a:endParaRPr lang="pt-BR" sz="1300" b="0" kern="1200" dirty="0">
+          <a:endParaRPr lang="pt-BR" sz="1300" b="0" kern="1200">
             <a:latin typeface="Calibri"/>
             <a:cs typeface="Calibri"/>
           </a:endParaRPr>
@@ -2195,15 +2196,15 @@
             <a:buChar char="•"/>
           </a:pPr>
           <a:r>
-            <a:rPr lang="pt-BR" sz="1300" kern="1200" dirty="0"/>
+            <a:rPr lang="pt-BR" sz="1300" kern="1200"/>
             <a:t>soma das frequências das ordens; deveria equivaler ao total de pedidos (linhas, 73.670), porém por conta do arredondamento em "</a:t>
           </a:r>
           <a:r>
-            <a:rPr lang="pt-BR" sz="1300" kern="1200" dirty="0" err="1"/>
+            <a:rPr lang="pt-BR" sz="1300" kern="1200" err="1"/>
             <a:t>volumevalores</a:t>
           </a:r>
           <a:r>
-            <a:rPr lang="pt-BR" sz="1300" kern="1200" dirty="0"/>
+            <a:rPr lang="pt-BR" sz="1300" kern="1200"/>
             <a:t>", resulta 73.610.</a:t>
           </a:r>
         </a:p>
@@ -2281,20 +2282,20 @@
             <a:buNone/>
           </a:pPr>
           <a:r>
-            <a:rPr lang="pt-BR" sz="1300" kern="1200" dirty="0" err="1">
+            <a:rPr lang="pt-BR" sz="1300" kern="1200" err="1">
               <a:latin typeface="Calibri"/>
               <a:cs typeface="Calibri"/>
             </a:rPr>
             <a:t>volumetotal</a:t>
           </a:r>
           <a:r>
-            <a:rPr lang="pt-BR" sz="1300" kern="1200" dirty="0">
+            <a:rPr lang="pt-BR" sz="1300" kern="1200">
               <a:latin typeface="Calibri"/>
               <a:cs typeface="Calibri"/>
             </a:rPr>
             <a:t>: </a:t>
           </a:r>
-          <a:endParaRPr lang="pt-BR" sz="1300" kern="1200" dirty="0"/>
+          <a:endParaRPr lang="pt-BR" sz="1300" kern="1200"/>
         </a:p>
       </dsp:txBody>
       <dsp:txXfrm>
@@ -2369,23 +2370,23 @@
             <a:buChar char="•"/>
           </a:pPr>
           <a:r>
-            <a:rPr lang="pt-BR" sz="1300" kern="1200" dirty="0"/>
+            <a:rPr lang="pt-BR" sz="1300" kern="1200"/>
             <a:t>contribuição percentual acumulada do "</a:t>
           </a:r>
           <a:r>
-            <a:rPr lang="pt-BR" sz="1300" kern="1200" dirty="0" err="1"/>
+            <a:rPr lang="pt-BR" sz="1300" kern="1200" err="1"/>
             <a:t>volumeabsoluto</a:t>
           </a:r>
           <a:r>
-            <a:rPr lang="pt-BR" sz="1300" kern="1200" dirty="0"/>
+            <a:rPr lang="pt-BR" sz="1300" kern="1200"/>
             <a:t>" de cada ordem; </a:t>
           </a:r>
           <a:r>
-            <a:rPr lang="pt-BR" sz="1300" i="1" kern="1200" dirty="0"/>
+            <a:rPr lang="pt-BR" sz="1300" i="1" kern="1200"/>
             <a:t>e.g. </a:t>
           </a:r>
           <a:r>
-            <a:rPr lang="pt-BR" sz="1300" kern="1200" dirty="0"/>
+            <a:rPr lang="pt-BR" sz="1300" kern="1200"/>
             <a:t>pedidos de uma ordem correspondem a 0,0021% do total de ordens.</a:t>
           </a:r>
         </a:p>
@@ -2463,7 +2464,7 @@
             <a:buNone/>
           </a:pPr>
           <a:r>
-            <a:rPr lang="pt-BR" sz="1300" kern="1200" dirty="0"/>
+            <a:rPr lang="pt-BR" sz="1300" kern="1200"/>
             <a:t>cumulativopedidos</a:t>
           </a:r>
         </a:p>
@@ -2540,15 +2541,15 @@
             <a:buChar char="•"/>
           </a:pPr>
           <a:r>
-            <a:rPr lang="pt-BR" sz="1300" kern="1200" dirty="0"/>
+            <a:rPr lang="pt-BR" sz="1300" kern="1200"/>
             <a:t>contribuição percentual acumulada de "volumevalores" (frequência de cada ordem); </a:t>
           </a:r>
           <a:r>
-            <a:rPr lang="pt-BR" sz="1300" i="1" kern="1200" dirty="0"/>
+            <a:rPr lang="pt-BR" sz="1300" i="1" kern="1200"/>
             <a:t>e.g. </a:t>
           </a:r>
           <a:r>
-            <a:rPr lang="pt-BR" sz="1300" kern="1200" dirty="0"/>
+            <a:rPr lang="pt-BR" sz="1300" kern="1200"/>
             <a:t>pedidos com uma ordem correspondem a 11.50% das ordens efetuadas.</a:t>
           </a:r>
         </a:p>
@@ -2626,7 +2627,7 @@
             <a:buNone/>
           </a:pPr>
           <a:r>
-            <a:rPr lang="pt-BR" sz="1300" kern="1200" dirty="0">
+            <a:rPr lang="pt-BR" sz="1300" kern="1200">
               <a:latin typeface="Calibri Light" panose="020F0302020204030204"/>
             </a:rPr>
             <a:t>Cumulativolume</a:t>
@@ -4032,7 +4033,7 @@
           <a:p>
             <a:fld id="{F0E51C7C-CEA3-4CAA-BE4B-344879E7C377}" type="datetimeFigureOut">
               <a:rPr lang="de-DE" smtClean="0"/>
-              <a:t>19.10.2021</a:t>
+              <a:t>20.10.2021</a:t>
             </a:fld>
             <a:endParaRPr lang="de-DE"/>
           </a:p>
@@ -4202,7 +4203,7 @@
           <a:p>
             <a:fld id="{F0E51C7C-CEA3-4CAA-BE4B-344879E7C377}" type="datetimeFigureOut">
               <a:rPr lang="de-DE" smtClean="0"/>
-              <a:t>19.10.2021</a:t>
+              <a:t>20.10.2021</a:t>
             </a:fld>
             <a:endParaRPr lang="de-DE"/>
           </a:p>
@@ -4382,7 +4383,7 @@
           <a:p>
             <a:fld id="{F0E51C7C-CEA3-4CAA-BE4B-344879E7C377}" type="datetimeFigureOut">
               <a:rPr lang="de-DE" smtClean="0"/>
-              <a:t>19.10.2021</a:t>
+              <a:t>20.10.2021</a:t>
             </a:fld>
             <a:endParaRPr lang="de-DE"/>
           </a:p>
@@ -4552,7 +4553,7 @@
           <a:p>
             <a:fld id="{F0E51C7C-CEA3-4CAA-BE4B-344879E7C377}" type="datetimeFigureOut">
               <a:rPr lang="de-DE" smtClean="0"/>
-              <a:t>19.10.2021</a:t>
+              <a:t>20.10.2021</a:t>
             </a:fld>
             <a:endParaRPr lang="de-DE"/>
           </a:p>
@@ -4798,7 +4799,7 @@
           <a:p>
             <a:fld id="{F0E51C7C-CEA3-4CAA-BE4B-344879E7C377}" type="datetimeFigureOut">
               <a:rPr lang="de-DE" smtClean="0"/>
-              <a:t>19.10.2021</a:t>
+              <a:t>20.10.2021</a:t>
             </a:fld>
             <a:endParaRPr lang="de-DE"/>
           </a:p>
@@ -5030,7 +5031,7 @@
           <a:p>
             <a:fld id="{F0E51C7C-CEA3-4CAA-BE4B-344879E7C377}" type="datetimeFigureOut">
               <a:rPr lang="de-DE" smtClean="0"/>
-              <a:t>19.10.2021</a:t>
+              <a:t>20.10.2021</a:t>
             </a:fld>
             <a:endParaRPr lang="de-DE"/>
           </a:p>
@@ -5397,7 +5398,7 @@
           <a:p>
             <a:fld id="{F0E51C7C-CEA3-4CAA-BE4B-344879E7C377}" type="datetimeFigureOut">
               <a:rPr lang="de-DE" smtClean="0"/>
-              <a:t>19.10.2021</a:t>
+              <a:t>20.10.2021</a:t>
             </a:fld>
             <a:endParaRPr lang="de-DE"/>
           </a:p>
@@ -5515,7 +5516,7 @@
           <a:p>
             <a:fld id="{F0E51C7C-CEA3-4CAA-BE4B-344879E7C377}" type="datetimeFigureOut">
               <a:rPr lang="de-DE" smtClean="0"/>
-              <a:t>19.10.2021</a:t>
+              <a:t>20.10.2021</a:t>
             </a:fld>
             <a:endParaRPr lang="de-DE"/>
           </a:p>
@@ -5610,7 +5611,7 @@
           <a:p>
             <a:fld id="{F0E51C7C-CEA3-4CAA-BE4B-344879E7C377}" type="datetimeFigureOut">
               <a:rPr lang="de-DE" smtClean="0"/>
-              <a:t>19.10.2021</a:t>
+              <a:t>20.10.2021</a:t>
             </a:fld>
             <a:endParaRPr lang="de-DE"/>
           </a:p>
@@ -5887,7 +5888,7 @@
           <a:p>
             <a:fld id="{F0E51C7C-CEA3-4CAA-BE4B-344879E7C377}" type="datetimeFigureOut">
               <a:rPr lang="de-DE" smtClean="0"/>
-              <a:t>19.10.2021</a:t>
+              <a:t>20.10.2021</a:t>
             </a:fld>
             <a:endParaRPr lang="de-DE"/>
           </a:p>
@@ -6140,7 +6141,7 @@
           <a:p>
             <a:fld id="{F0E51C7C-CEA3-4CAA-BE4B-344879E7C377}" type="datetimeFigureOut">
               <a:rPr lang="de-DE" smtClean="0"/>
-              <a:t>19.10.2021</a:t>
+              <a:t>20.10.2021</a:t>
             </a:fld>
             <a:endParaRPr lang="de-DE"/>
           </a:p>
@@ -6353,7 +6354,7 @@
           <a:p>
             <a:fld id="{F0E51C7C-CEA3-4CAA-BE4B-344879E7C377}" type="datetimeFigureOut">
               <a:rPr lang="de-DE" smtClean="0"/>
-              <a:t>19.10.2021</a:t>
+              <a:t>20.10.2021</a:t>
             </a:fld>
             <a:endParaRPr lang="de-DE"/>
           </a:p>
@@ -6887,15 +6888,15 @@
           <a:p>
             <a:pPr algn="l"/>
             <a:r>
-              <a:rPr lang="en-US" sz="2000" dirty="0"/>
+              <a:rPr lang="en-US" sz="2000"/>
               <a:t>Breno </a:t>
             </a:r>
             <a:r>
-              <a:rPr lang="en-US" sz="2000" dirty="0" err="1"/>
+              <a:rPr lang="en-US" sz="2000" err="1"/>
               <a:t>Coltro</a:t>
             </a:r>
             <a:r>
-              <a:rPr lang="en-US" sz="2000" dirty="0"/>
+              <a:rPr lang="en-US" sz="2000"/>
               <a:t> da Costa</a:t>
             </a:r>
             <a:endParaRPr lang="en-US" sz="2000">
@@ -6904,7 +6905,7 @@
           </a:p>
           <a:p>
             <a:r>
-              <a:rPr lang="en-US" sz="2000" dirty="0"/>
+              <a:rPr lang="en-US" sz="2000"/>
               <a:t>&amp;</a:t>
             </a:r>
             <a:endParaRPr lang="en-US" sz="2000">
@@ -6914,7 +6915,7 @@
           <a:p>
             <a:pPr algn="r"/>
             <a:r>
-              <a:rPr lang="en-US" sz="2000" dirty="0"/>
+              <a:rPr lang="en-US" sz="2000"/>
               <a:t>João Roberto Crespi Júnior</a:t>
             </a:r>
             <a:endParaRPr lang="en-US" sz="2000">
@@ -6962,14 +6963,14 @@
               </a:spcAft>
             </a:pPr>
             <a:r>
-              <a:rPr lang="en-US" sz="2000" dirty="0"/>
+              <a:rPr lang="en-US" sz="2000"/>
               <a:t>Trilha: Sistemas de </a:t>
             </a:r>
             <a:r>
-              <a:rPr lang="en-US" sz="2000" dirty="0" err="1"/>
+              <a:rPr lang="en-US" sz="2000" err="1"/>
               <a:t>Recomendação</a:t>
             </a:r>
-            <a:endParaRPr lang="en-US" sz="2000" dirty="0">
+            <a:endParaRPr lang="en-US" sz="2000">
               <a:cs typeface="Calibri"/>
             </a:endParaRPr>
           </a:p>
@@ -6983,29 +6984,29 @@
               </a:spcAft>
             </a:pPr>
             <a:br>
-              <a:rPr lang="en-US" sz="2000" dirty="0"/>
+              <a:rPr lang="en-US" sz="2000"/>
             </a:br>
             <a:r>
-              <a:rPr lang="en-US" sz="2000" dirty="0" err="1"/>
+              <a:rPr lang="en-US" sz="2000" err="1"/>
               <a:t>Desafio</a:t>
             </a:r>
             <a:r>
-              <a:rPr lang="en-US" sz="2000" dirty="0"/>
+              <a:rPr lang="en-US" sz="2000"/>
               <a:t>: Venda </a:t>
             </a:r>
             <a:r>
-              <a:rPr lang="en-US" sz="2000" dirty="0" err="1"/>
+              <a:rPr lang="en-US" sz="2000" err="1"/>
               <a:t>cruzada</a:t>
             </a:r>
             <a:r>
-              <a:rPr lang="en-US" sz="2000" dirty="0"/>
+              <a:rPr lang="en-US" sz="2000"/>
               <a:t> / Venda </a:t>
             </a:r>
             <a:r>
-              <a:rPr lang="en-US" sz="2000" dirty="0" err="1"/>
+              <a:rPr lang="en-US" sz="2000" err="1"/>
               <a:t>adicional</a:t>
             </a:r>
-            <a:endParaRPr lang="en-US" sz="2000" dirty="0">
+            <a:endParaRPr lang="en-US" sz="2000">
               <a:cs typeface="Calibri"/>
             </a:endParaRPr>
           </a:p>
@@ -7019,45 +7020,45 @@
               </a:spcAft>
             </a:pPr>
             <a:br>
-              <a:rPr lang="en-US" sz="2000" dirty="0"/>
+              <a:rPr lang="en-US" sz="2000"/>
             </a:br>
             <a:r>
-              <a:rPr lang="en-US" sz="2000" dirty="0" err="1"/>
+              <a:rPr lang="en-US" sz="2000" err="1"/>
               <a:t>Projeto</a:t>
             </a:r>
             <a:r>
-              <a:rPr lang="en-US" sz="2000" dirty="0"/>
+              <a:rPr lang="en-US" sz="2000"/>
               <a:t>: </a:t>
             </a:r>
             <a:r>
-              <a:rPr lang="en-US" sz="2000" b="1" dirty="0" err="1"/>
+              <a:rPr lang="en-US" sz="2000" b="1" err="1"/>
               <a:t>Recomendação</a:t>
             </a:r>
             <a:r>
-              <a:rPr lang="en-US" sz="2000" b="1" dirty="0"/>
+              <a:rPr lang="en-US" sz="2000" b="1"/>
               <a:t> para </a:t>
             </a:r>
             <a:r>
-              <a:rPr lang="en-US" sz="2000" b="1" dirty="0" err="1"/>
+              <a:rPr lang="en-US" sz="2000" b="1" err="1"/>
               <a:t>pontos</a:t>
             </a:r>
             <a:r>
-              <a:rPr lang="en-US" sz="2000" b="1" dirty="0"/>
+              <a:rPr lang="en-US" sz="2000" b="1"/>
               <a:t> de </a:t>
             </a:r>
             <a:r>
-              <a:rPr lang="en-US" sz="2000" b="1" dirty="0" err="1"/>
+              <a:rPr lang="en-US" sz="2000" b="1" err="1"/>
               <a:t>venda</a:t>
             </a:r>
             <a:r>
-              <a:rPr lang="en-US" sz="2000" b="1" dirty="0"/>
+              <a:rPr lang="en-US" sz="2000" b="1"/>
               <a:t> </a:t>
             </a:r>
             <a:r>
-              <a:rPr lang="en-US" sz="2000" b="1" dirty="0" err="1"/>
+              <a:rPr lang="en-US" sz="2000" b="1" err="1"/>
               <a:t>locais</a:t>
             </a:r>
-            <a:endParaRPr lang="en-US" sz="2000" b="1" dirty="0">
+            <a:endParaRPr lang="en-US" sz="2000" b="1">
               <a:cs typeface="Calibri"/>
             </a:endParaRPr>
           </a:p>
@@ -7196,7 +7197,7 @@
               <a:t>Clientes</a:t>
             </a:r>
             <a:br>
-              <a:rPr lang="pt-BR" sz="5400" b="1" dirty="0">
+              <a:rPr lang="pt-BR" sz="5400" b="1">
                 <a:cs typeface="Calibri Light"/>
               </a:rPr>
             </a:br>
@@ -7518,22 +7519,16 @@
           <a:lstStyle/>
           <a:p>
             <a:r>
-              <a:rPr lang="pt-BR" sz="2200" dirty="0">
-                <a:cs typeface="Calibri"/>
-              </a:rPr>
-              <a:t>Clientes: 179, divididos pelos 73.670 pedidos </a:t>
-            </a:r>
-            <a:r>
               <a:rPr lang="pt-BR" sz="2200">
                 <a:cs typeface="Calibri"/>
               </a:rPr>
-              <a:t>(linhas)</a:t>
+              <a:t>Clientes: 179, divididos pelos 73.670 pedidos (linhas)</a:t>
             </a:r>
             <a:endParaRPr lang="pt-BR"/>
           </a:p>
           <a:p>
             <a:r>
-              <a:rPr lang="pt-BR" sz="2200" dirty="0">
+              <a:rPr lang="pt-BR" sz="2200">
                 <a:cs typeface="Calibri"/>
               </a:rPr>
               <a:t>Distribuem-se conforme:</a:t>
@@ -7544,7 +7539,7 @@
               <a:buNone/>
             </a:pPr>
             <a:r>
-              <a:rPr lang="pt-BR" sz="2200" dirty="0">
+              <a:rPr lang="pt-BR" sz="2200">
                 <a:cs typeface="Calibri"/>
               </a:rPr>
               <a:t>O gráfico traz o número absoluto de pedidos, reflexo da frequência do mesmo.</a:t>
@@ -7679,7 +7674,7 @@
           <a:lstStyle/>
           <a:p>
             <a:pPr algn="ctr"/>
-            <a:endParaRPr lang="en-US" dirty="0"/>
+            <a:endParaRPr lang="en-US"/>
           </a:p>
         </p:txBody>
       </p:sp>
@@ -7795,7 +7790,7 @@
           <a:lstStyle/>
           <a:p>
             <a:pPr algn="ctr"/>
-            <a:endParaRPr lang="en-US" dirty="0"/>
+            <a:endParaRPr lang="en-US"/>
           </a:p>
         </p:txBody>
       </p:sp>
@@ -8035,7 +8030,7 @@
           <a:lstStyle/>
           <a:p>
             <a:pPr algn="ctr"/>
-            <a:endParaRPr lang="en-US" dirty="0"/>
+            <a:endParaRPr lang="en-US"/>
           </a:p>
         </p:txBody>
       </p:sp>
@@ -8220,47 +8215,47 @@
           <a:lstStyle/>
           <a:p>
             <a:r>
-              <a:rPr lang="pt-BR" sz="3200" b="1" dirty="0">
+              <a:rPr lang="pt-BR" sz="3200" b="1">
                 <a:cs typeface="Calibri Light"/>
               </a:rPr>
               <a:t>Ordens </a:t>
             </a:r>
             <a:r>
-              <a:rPr lang="pt-BR" sz="3200" dirty="0">
+              <a:rPr lang="pt-BR" sz="3200">
                 <a:cs typeface="Calibri Light"/>
               </a:rPr>
               <a:t>[</a:t>
             </a:r>
             <a:r>
-              <a:rPr lang="pt-BR" sz="3200" dirty="0">
+              <a:rPr lang="pt-BR" sz="3200">
                 <a:ea typeface="+mj-lt"/>
                 <a:cs typeface="+mj-lt"/>
               </a:rPr>
               <a:t>"</a:t>
             </a:r>
             <a:r>
-              <a:rPr lang="pt-BR" sz="3200" dirty="0" err="1">
+              <a:rPr lang="pt-BR" sz="3200" err="1">
                 <a:ea typeface="+mj-lt"/>
                 <a:cs typeface="+mj-lt"/>
               </a:rPr>
               <a:t>Order</a:t>
             </a:r>
             <a:r>
-              <a:rPr lang="pt-BR" sz="3200" dirty="0">
+              <a:rPr lang="pt-BR" sz="3200">
                 <a:ea typeface="+mj-lt"/>
                 <a:cs typeface="+mj-lt"/>
               </a:rPr>
               <a:t> </a:t>
             </a:r>
             <a:r>
-              <a:rPr lang="pt-BR" sz="3200" dirty="0" err="1">
+              <a:rPr lang="pt-BR" sz="3200" err="1">
                 <a:ea typeface="+mj-lt"/>
                 <a:cs typeface="+mj-lt"/>
               </a:rPr>
               <a:t>qty</a:t>
             </a:r>
             <a:r>
-              <a:rPr lang="pt-BR" sz="3200" dirty="0">
+              <a:rPr lang="pt-BR" sz="3200">
                 <a:ea typeface="+mj-lt"/>
                 <a:cs typeface="+mj-lt"/>
               </a:rPr>
@@ -8478,47 +8473,47 @@
           <a:lstStyle/>
           <a:p>
             <a:r>
-              <a:rPr lang="pt-BR" sz="3200" b="1" dirty="0">
+              <a:rPr lang="pt-BR" sz="3200" b="1">
                 <a:cs typeface="Calibri Light"/>
               </a:rPr>
               <a:t>Ordens </a:t>
             </a:r>
             <a:r>
-              <a:rPr lang="pt-BR" sz="3200" dirty="0">
+              <a:rPr lang="pt-BR" sz="3200">
                 <a:cs typeface="Calibri Light"/>
               </a:rPr>
               <a:t>[</a:t>
             </a:r>
             <a:r>
-              <a:rPr lang="pt-BR" sz="3200" dirty="0">
+              <a:rPr lang="pt-BR" sz="3200">
                 <a:ea typeface="+mj-lt"/>
                 <a:cs typeface="+mj-lt"/>
               </a:rPr>
               <a:t>"</a:t>
             </a:r>
             <a:r>
-              <a:rPr lang="pt-BR" sz="3200" dirty="0" err="1">
+              <a:rPr lang="pt-BR" sz="3200" err="1">
                 <a:ea typeface="+mj-lt"/>
                 <a:cs typeface="+mj-lt"/>
               </a:rPr>
               <a:t>Order</a:t>
             </a:r>
             <a:r>
-              <a:rPr lang="pt-BR" sz="3200" dirty="0">
+              <a:rPr lang="pt-BR" sz="3200">
                 <a:ea typeface="+mj-lt"/>
                 <a:cs typeface="+mj-lt"/>
               </a:rPr>
               <a:t> </a:t>
             </a:r>
             <a:r>
-              <a:rPr lang="pt-BR" sz="3200" dirty="0" err="1">
+              <a:rPr lang="pt-BR" sz="3200" err="1">
                 <a:ea typeface="+mj-lt"/>
                 <a:cs typeface="+mj-lt"/>
               </a:rPr>
               <a:t>qty</a:t>
             </a:r>
             <a:r>
-              <a:rPr lang="pt-BR" sz="3200" dirty="0">
+              <a:rPr lang="pt-BR" sz="3200">
                 <a:ea typeface="+mj-lt"/>
                 <a:cs typeface="+mj-lt"/>
               </a:rPr>
@@ -8589,13 +8584,13 @@
           <a:lstStyle/>
           <a:p>
             <a:r>
-              <a:rPr lang="pt-BR" dirty="0">
+              <a:rPr lang="pt-BR">
                 <a:cs typeface="Calibri"/>
               </a:rPr>
               <a:t>Contribuição da frequência das ordens no total de pedidos; </a:t>
             </a:r>
             <a:r>
-              <a:rPr lang="pt-BR" dirty="0">
+              <a:rPr lang="pt-BR">
                 <a:ea typeface="+mn-lt"/>
                 <a:cs typeface="+mn-lt"/>
               </a:rPr>
@@ -8603,7 +8598,7 @@
             </a:r>
           </a:p>
           <a:p>
-            <a:endParaRPr lang="pt-BR" dirty="0">
+            <a:endParaRPr lang="pt-BR">
               <a:cs typeface="Calibri"/>
             </a:endParaRPr>
           </a:p>
@@ -8641,13 +8636,13 @@
           <a:lstStyle/>
           <a:p>
             <a:r>
-              <a:rPr lang="pt-BR" dirty="0">
+              <a:rPr lang="pt-BR">
                 <a:cs typeface="Calibri"/>
               </a:rPr>
               <a:t>Contribuição do volume das ordens no total de ordens;</a:t>
             </a:r>
             <a:r>
-              <a:rPr lang="pt-BR" dirty="0">
+              <a:rPr lang="pt-BR">
                 <a:ea typeface="+mn-lt"/>
                 <a:cs typeface="+mn-lt"/>
               </a:rPr>
@@ -8655,7 +8650,7 @@
             </a:r>
           </a:p>
           <a:p>
-            <a:endParaRPr lang="pt-BR" dirty="0">
+            <a:endParaRPr lang="pt-BR">
               <a:cs typeface="Calibri"/>
             </a:endParaRPr>
           </a:p>
@@ -8713,30 +8708,30 @@
           <a:lstStyle/>
           <a:p>
             <a:r>
-              <a:rPr lang="pt-BR" b="1" dirty="0">
+              <a:rPr lang="pt-BR" b="1">
                 <a:cs typeface="Calibri Light"/>
               </a:rPr>
               <a:t>Peças entregues </a:t>
             </a:r>
             <a:r>
-              <a:rPr lang="pt-BR" dirty="0">
+              <a:rPr lang="pt-BR">
                 <a:cs typeface="Calibri Light"/>
               </a:rPr>
               <a:t>["PCS </a:t>
             </a:r>
             <a:r>
-              <a:rPr lang="pt-BR" dirty="0" err="1">
+              <a:rPr lang="pt-BR" err="1">
                 <a:cs typeface="Calibri Light"/>
               </a:rPr>
               <a:t>delivered</a:t>
             </a:r>
             <a:r>
-              <a:rPr lang="pt-BR" dirty="0">
+              <a:rPr lang="pt-BR">
                 <a:cs typeface="Calibri Light"/>
               </a:rPr>
               <a:t>"]</a:t>
             </a:r>
-            <a:endParaRPr lang="pt-BR" b="1" dirty="0"/>
+            <a:endParaRPr lang="pt-BR" b="1"/>
           </a:p>
         </p:txBody>
       </p:sp>
@@ -8758,9 +8753,17 @@
         </p:nvSpPr>
         <p:spPr/>
         <p:txBody>
-          <a:bodyPr/>
+          <a:bodyPr vert="horz" lIns="91440" tIns="45720" rIns="91440" bIns="45720" rtlCol="0" anchor="t">
+            <a:normAutofit/>
+          </a:bodyPr>
           <a:lstStyle/>
           <a:p>
+            <a:r>
+              <a:rPr lang="pt-BR">
+                <a:cs typeface="Calibri"/>
+              </a:rPr>
+              <a:t>Averiguar relação de peças e ordens.</a:t>
+            </a:r>
             <a:endParaRPr lang="pt-BR"/>
           </a:p>
         </p:txBody>
@@ -8817,19 +8820,19 @@
           <a:lstStyle/>
           <a:p>
             <a:r>
-              <a:rPr lang="pt-BR" b="1" dirty="0">
+              <a:rPr lang="pt-BR" b="1">
                 <a:cs typeface="Calibri Light"/>
               </a:rPr>
               <a:t>Marcas </a:t>
             </a:r>
             <a:r>
-              <a:rPr lang="pt-BR" dirty="0">
+              <a:rPr lang="pt-BR">
                 <a:cs typeface="Calibri Light"/>
               </a:rPr>
               <a:t>[</a:t>
             </a:r>
             <a:r>
-              <a:rPr lang="pt-BR" dirty="0">
+              <a:rPr lang="pt-BR">
                 <a:ea typeface="+mj-lt"/>
                 <a:cs typeface="+mj-lt"/>
               </a:rPr>
@@ -8870,7 +8873,7 @@
               <a:buNone/>
             </a:pPr>
             <a:r>
-              <a:rPr lang="pt-BR" sz="2200" dirty="0">
+              <a:rPr lang="pt-BR" sz="2200">
                 <a:latin typeface="Calibri"/>
                 <a:ea typeface="+mn-lt"/>
                 <a:cs typeface="+mn-lt"/>
@@ -8883,7 +8886,7 @@
               <a:buNone/>
             </a:pPr>
             <a:r>
-              <a:rPr lang="pt-BR" sz="2200" dirty="0">
+              <a:rPr lang="pt-BR" sz="2200">
                 <a:latin typeface="Consolas"/>
                 <a:ea typeface="+mn-lt"/>
                 <a:cs typeface="+mn-lt"/>
@@ -8921,7 +8924,7 @@
         <p:spPr>
           <a:xfrm>
             <a:off x="905741" y="1823605"/>
-            <a:ext cx="5488130" cy="461665"/>
+            <a:ext cx="5488130" cy="1200329"/>
           </a:xfrm>
           <a:prstGeom prst="rect">
             <a:avLst/>
@@ -8942,13 +8945,27 @@
                 <a:ea typeface="+mn-lt"/>
                 <a:cs typeface="+mn-lt"/>
               </a:rPr>
-              <a:t>Constam em </a:t>
+              <a:t>As </a:t>
+            </a:r>
+            <a:r>
+              <a:rPr lang="pt-BR" sz="2400" b="1">
+                <a:ea typeface="+mn-lt"/>
+                <a:cs typeface="+mn-lt"/>
+              </a:rPr>
+              <a:t>marcas, submarcas, volume e tipo da embalagem </a:t>
+            </a:r>
+            <a:r>
+              <a:rPr lang="pt-BR" sz="2400" dirty="0">
+                <a:ea typeface="+mn-lt"/>
+                <a:cs typeface="+mn-lt"/>
+              </a:rPr>
+              <a:t>constam em </a:t>
             </a:r>
             <a:r>
               <a:rPr lang="pt-BR" sz="2400" dirty="0"/>
               <a:t>28.316 dos pedidos.</a:t>
             </a:r>
-            <a:endParaRPr lang="pt-BR" sz="2400">
+            <a:endParaRPr lang="pt-BR" sz="2400" dirty="0">
               <a:cs typeface="Calibri"/>
             </a:endParaRPr>
           </a:p>
@@ -8986,7 +9003,7 @@
           <a:lstStyle/>
           <a:p>
             <a:r>
-              <a:rPr lang="pt-BR" dirty="0">
+              <a:rPr lang="pt-BR">
                 <a:latin typeface="Calibri"/>
                 <a:cs typeface="Calibri"/>
               </a:rPr>
@@ -8994,14 +9011,14 @@
             </a:r>
           </a:p>
           <a:p>
-            <a:endParaRPr lang="pt-BR" dirty="0">
+            <a:endParaRPr lang="pt-BR">
               <a:latin typeface="Calibri"/>
               <a:cs typeface="Calibri"/>
             </a:endParaRPr>
           </a:p>
           <a:p>
             <a:r>
-              <a:rPr lang="pt-BR" dirty="0">
+              <a:rPr lang="pt-BR">
                 <a:latin typeface="Consolas"/>
               </a:rPr>
               <a:t>[0.4327235485238028,
@@ -9108,30 +9125,30 @@
           <a:lstStyle/>
           <a:p>
             <a:r>
-              <a:rPr lang="pt-BR" b="1" dirty="0">
+              <a:rPr lang="pt-BR" b="1">
                 <a:cs typeface="Calibri Light"/>
               </a:rPr>
               <a:t>Submarcas</a:t>
             </a:r>
             <a:r>
-              <a:rPr lang="pt-BR" dirty="0">
+              <a:rPr lang="pt-BR">
                 <a:cs typeface="Calibri Light"/>
               </a:rPr>
               <a:t> ["</a:t>
             </a:r>
             <a:r>
-              <a:rPr lang="pt-BR" dirty="0" err="1">
+              <a:rPr lang="pt-BR" err="1">
                 <a:cs typeface="Calibri Light"/>
               </a:rPr>
               <a:t>Subrand</a:t>
             </a:r>
             <a:r>
-              <a:rPr lang="pt-BR" dirty="0">
+              <a:rPr lang="pt-BR">
                 <a:cs typeface="Calibri Light"/>
               </a:rPr>
               <a:t>"]</a:t>
             </a:r>
-            <a:endParaRPr lang="pt-BR" dirty="0"/>
+            <a:endParaRPr lang="pt-BR"/>
           </a:p>
         </p:txBody>
       </p:sp>
@@ -9167,118 +9184,118 @@
           <a:lstStyle/>
           <a:p>
             <a:r>
-              <a:rPr lang="pt-BR" dirty="0">
+              <a:rPr lang="pt-BR">
                 <a:latin typeface="Consolas"/>
               </a:rPr>
               <a:t>LEFFE BLONDE        4784, </a:t>
             </a:r>
             <a:r>
-              <a:rPr lang="pt-BR" dirty="0">
+              <a:rPr lang="pt-BR">
                 <a:ea typeface="+mn-lt"/>
                 <a:cs typeface="+mn-lt"/>
               </a:rPr>
               <a:t>0,3904</a:t>
             </a:r>
             <a:r>
-              <a:rPr lang="pt-BR" dirty="0">
+              <a:rPr lang="pt-BR">
                 <a:latin typeface="Consolas"/>
               </a:rPr>
               <a:t>
 LEFFE RUBY          2661, </a:t>
             </a:r>
             <a:r>
-              <a:rPr lang="pt-BR" dirty="0">
+              <a:rPr lang="pt-BR">
                 <a:ea typeface="+mn-lt"/>
                 <a:cs typeface="+mn-lt"/>
               </a:rPr>
               <a:t>0,2172</a:t>
             </a:r>
             <a:r>
-              <a:rPr lang="pt-BR" dirty="0">
+              <a:rPr lang="pt-BR">
                 <a:latin typeface="Consolas"/>
               </a:rPr>
               <a:t>
 LEFFE ROYALE        2179, </a:t>
             </a:r>
             <a:r>
-              <a:rPr lang="pt-BR" dirty="0">
+              <a:rPr lang="pt-BR">
                 <a:ea typeface="+mn-lt"/>
                 <a:cs typeface="+mn-lt"/>
               </a:rPr>
               <a:t>0,1778</a:t>
             </a:r>
             <a:r>
-              <a:rPr lang="pt-BR" dirty="0">
+              <a:rPr lang="pt-BR">
                 <a:latin typeface="Consolas"/>
               </a:rPr>
               <a:t>
 LEFFE RITUEL 9°      881, </a:t>
             </a:r>
             <a:r>
-              <a:rPr lang="pt-BR" dirty="0">
+              <a:rPr lang="pt-BR">
                 <a:ea typeface="+mn-lt"/>
                 <a:cs typeface="+mn-lt"/>
               </a:rPr>
               <a:t>0,0719</a:t>
             </a:r>
             <a:r>
-              <a:rPr lang="pt-BR" dirty="0">
+              <a:rPr lang="pt-BR">
                 <a:latin typeface="Consolas"/>
               </a:rPr>
               <a:t>
 LEFFE BRUNE          706, </a:t>
             </a:r>
             <a:r>
-              <a:rPr lang="pt-BR" dirty="0">
+              <a:rPr lang="pt-BR">
                 <a:ea typeface="+mn-lt"/>
                 <a:cs typeface="+mn-lt"/>
               </a:rPr>
               <a:t>0,0576</a:t>
             </a:r>
             <a:r>
-              <a:rPr lang="pt-BR" dirty="0">
+              <a:rPr lang="pt-BR">
                 <a:latin typeface="Consolas"/>
               </a:rPr>
               <a:t>
 LEFFE AMBREE         511, </a:t>
             </a:r>
             <a:r>
-              <a:rPr lang="pt-BR" dirty="0">
+              <a:rPr lang="pt-BR">
                 <a:ea typeface="+mn-lt"/>
                 <a:cs typeface="+mn-lt"/>
               </a:rPr>
               <a:t>0,0417</a:t>
             </a:r>
             <a:r>
-              <a:rPr lang="pt-BR" dirty="0">
+              <a:rPr lang="pt-BR">
                 <a:latin typeface="Consolas"/>
               </a:rPr>
               <a:t>
 LEFFE BLONDE 0,0     301, </a:t>
             </a:r>
             <a:r>
-              <a:rPr lang="pt-BR" dirty="0">
+              <a:rPr lang="pt-BR">
                 <a:ea typeface="+mn-lt"/>
                 <a:cs typeface="+mn-lt"/>
               </a:rPr>
               <a:t>0,0246</a:t>
             </a:r>
             <a:r>
-              <a:rPr lang="pt-BR" dirty="0">
+              <a:rPr lang="pt-BR">
                 <a:latin typeface="Consolas"/>
               </a:rPr>
               <a:t>
 LEFFE LA LEGERE      202, </a:t>
             </a:r>
             <a:r>
-              <a:rPr lang="pt-BR" dirty="0">
+              <a:rPr lang="pt-BR">
                 <a:ea typeface="+mn-lt"/>
                 <a:cs typeface="+mn-lt"/>
               </a:rPr>
               <a:t>0,0165</a:t>
             </a:r>
             <a:r>
-              <a:rPr lang="pt-BR" dirty="0">
+              <a:rPr lang="pt-BR">
                 <a:latin typeface="Consolas"/>
                 <a:ea typeface="+mn-lt"/>
                 <a:cs typeface="+mn-lt"/>
@@ -9287,19 +9304,19 @@
 </a:t>
             </a:r>
             <a:r>
-              <a:rPr lang="pt-BR" dirty="0">
+              <a:rPr lang="pt-BR">
                 <a:latin typeface="Consolas"/>
               </a:rPr>
               <a:t>LEFFE TRIPLE          28, </a:t>
             </a:r>
             <a:r>
-              <a:rPr lang="pt-BR" dirty="0">
+              <a:rPr lang="pt-BR">
                 <a:ea typeface="+mn-lt"/>
                 <a:cs typeface="+mn-lt"/>
               </a:rPr>
               <a:t>0,0023</a:t>
             </a:r>
-            <a:endParaRPr lang="pt-BR" dirty="0"/>
+            <a:endParaRPr lang="pt-BR"/>
           </a:p>
         </p:txBody>
       </p:sp>
@@ -9335,39 +9352,39 @@
           <a:lstStyle/>
           <a:p>
             <a:r>
-              <a:rPr lang="pt-BR" dirty="0"/>
+              <a:rPr lang="pt-BR"/>
               <a:t>HOEGAARDEN WHITE           3171,   0,7025</a:t>
             </a:r>
           </a:p>
           <a:p>
             <a:r>
-              <a:rPr lang="pt-BR" dirty="0"/>
+              <a:rPr lang="pt-BR"/>
               <a:t>HOEGAARDEN ROSEE           1251,    </a:t>
             </a:r>
             <a:r>
-              <a:rPr lang="pt-BR" dirty="0">
+              <a:rPr lang="pt-BR">
                 <a:ea typeface="+mn-lt"/>
                 <a:cs typeface="+mn-lt"/>
               </a:rPr>
               <a:t>0,2771</a:t>
             </a:r>
-            <a:endParaRPr lang="pt-BR" dirty="0">
+            <a:endParaRPr lang="pt-BR">
               <a:cs typeface="Calibri"/>
             </a:endParaRPr>
           </a:p>
           <a:p>
             <a:r>
-              <a:rPr lang="pt-BR" dirty="0"/>
+              <a:rPr lang="pt-BR"/>
               <a:t>HOEGAARDEN GRAND CRU     92,    </a:t>
             </a:r>
             <a:r>
-              <a:rPr lang="pt-BR" dirty="0">
+              <a:rPr lang="pt-BR">
                 <a:ea typeface="+mn-lt"/>
                 <a:cs typeface="+mn-lt"/>
               </a:rPr>
               <a:t>0,0204</a:t>
             </a:r>
-            <a:endParaRPr lang="pt-BR" dirty="0">
+            <a:endParaRPr lang="pt-BR">
               <a:cs typeface="Calibri"/>
             </a:endParaRPr>
           </a:p>
@@ -9405,7 +9422,7 @@
           <a:lstStyle/>
           <a:p>
             <a:r>
-              <a:rPr lang="pt-BR" dirty="0"/>
+              <a:rPr lang="pt-BR"/>
               <a:t>TRIPLE KARMELIET                 3383,   1,0000</a:t>
             </a:r>
           </a:p>
@@ -9443,11 +9460,11 @@
           <a:lstStyle/>
           <a:p>
             <a:r>
-              <a:rPr lang="pt-BR" dirty="0"/>
+              <a:rPr lang="pt-BR"/>
               <a:t>KWAK                                        2808, </a:t>
             </a:r>
             <a:r>
-              <a:rPr lang="pt-BR" dirty="0">
+              <a:rPr lang="pt-BR">
                 <a:ea typeface="+mn-lt"/>
                 <a:cs typeface="+mn-lt"/>
               </a:rPr>
@@ -9488,19 +9505,19 @@
           <a:lstStyle/>
           <a:p>
             <a:r>
-              <a:rPr lang="pt-BR" dirty="0">
+              <a:rPr lang="pt-BR">
                 <a:latin typeface="Consolas"/>
               </a:rPr>
               <a:t>BUD                  1901,</a:t>
             </a:r>
             <a:r>
-              <a:rPr lang="pt-BR" dirty="0">
+              <a:rPr lang="pt-BR">
                 <a:latin typeface="Calibri"/>
                 <a:cs typeface="Calibri"/>
               </a:rPr>
               <a:t>1,0000</a:t>
             </a:r>
-            <a:endParaRPr lang="pt-BR" dirty="0"/>
+            <a:endParaRPr lang="pt-BR"/>
           </a:p>
         </p:txBody>
       </p:sp>
@@ -9536,11 +9553,11 @@
           <a:lstStyle/>
           <a:p>
             <a:r>
-              <a:rPr lang="pt-BR" dirty="0"/>
+              <a:rPr lang="pt-BR"/>
               <a:t>GOOSE                                       1324,  </a:t>
             </a:r>
             <a:r>
-              <a:rPr lang="pt-BR" dirty="0">
+              <a:rPr lang="pt-BR">
                 <a:ea typeface="+mn-lt"/>
                 <a:cs typeface="+mn-lt"/>
               </a:rPr>
@@ -9581,11 +9598,11 @@
           <a:lstStyle/>
           <a:p>
             <a:r>
-              <a:rPr lang="pt-BR" dirty="0"/>
+              <a:rPr lang="pt-BR"/>
               <a:t>CORONA EXTRA                        1322, </a:t>
             </a:r>
             <a:r>
-              <a:rPr lang="pt-BR" dirty="0">
+              <a:rPr lang="pt-BR">
                 <a:ea typeface="+mn-lt"/>
                 <a:cs typeface="+mn-lt"/>
               </a:rPr>
@@ -9626,20 +9643,20 @@
           <a:lstStyle/>
           <a:p>
             <a:r>
-              <a:rPr lang="pt-BR" dirty="0">
+              <a:rPr lang="pt-BR">
                 <a:latin typeface="Consolas"/>
               </a:rPr>
               <a:t>GINETTE LAGER      189, </a:t>
             </a:r>
             <a:r>
-              <a:rPr lang="pt-BR" dirty="0">
+              <a:rPr lang="pt-BR">
                 <a:ea typeface="+mn-lt"/>
                 <a:cs typeface="+mn-lt"/>
               </a:rPr>
               <a:t>0,4355</a:t>
             </a:r>
             <a:r>
-              <a:rPr lang="pt-BR" dirty="0">
+              <a:rPr lang="pt-BR">
                 <a:latin typeface="Consolas"/>
                 <a:ea typeface="+mn-lt"/>
                 <a:cs typeface="+mn-lt"/>
@@ -9648,61 +9665,61 @@
 </a:t>
             </a:r>
             <a:r>
-              <a:rPr lang="pt-BR" dirty="0">
+              <a:rPr lang="pt-BR">
                 <a:latin typeface="Consolas"/>
               </a:rPr>
               <a:t>GINETTE BLANCHE    120, </a:t>
             </a:r>
             <a:r>
-              <a:rPr lang="pt-BR" dirty="0">
+              <a:rPr lang="pt-BR">
                 <a:ea typeface="+mn-lt"/>
                 <a:cs typeface="+mn-lt"/>
               </a:rPr>
               <a:t>0,2765</a:t>
             </a:r>
             <a:r>
-              <a:rPr lang="pt-BR" dirty="0">
+              <a:rPr lang="pt-BR">
                 <a:latin typeface="Consolas"/>
               </a:rPr>
               <a:t>
 GINETTE FRUIT       89, </a:t>
             </a:r>
             <a:r>
-              <a:rPr lang="pt-BR" dirty="0">
+              <a:rPr lang="pt-BR">
                 <a:ea typeface="+mn-lt"/>
                 <a:cs typeface="+mn-lt"/>
               </a:rPr>
               <a:t>0,2051</a:t>
             </a:r>
             <a:r>
-              <a:rPr lang="pt-BR" dirty="0">
+              <a:rPr lang="pt-BR">
                 <a:latin typeface="Consolas"/>
               </a:rPr>
               <a:t>
 GINETTE TRIPLE      31, </a:t>
             </a:r>
             <a:r>
-              <a:rPr lang="pt-BR" dirty="0">
+              <a:rPr lang="pt-BR">
                 <a:ea typeface="+mn-lt"/>
                 <a:cs typeface="+mn-lt"/>
               </a:rPr>
               <a:t>0,0714</a:t>
             </a:r>
             <a:r>
-              <a:rPr lang="pt-BR" dirty="0">
+              <a:rPr lang="pt-BR">
                 <a:latin typeface="Consolas"/>
               </a:rPr>
               <a:t>
 GINETTE BLONDE       5, </a:t>
             </a:r>
             <a:r>
-              <a:rPr lang="pt-BR" dirty="0">
+              <a:rPr lang="pt-BR">
                 <a:ea typeface="+mn-lt"/>
                 <a:cs typeface="+mn-lt"/>
               </a:rPr>
               <a:t>0,0115</a:t>
             </a:r>
-            <a:endParaRPr lang="pt-BR" dirty="0"/>
+            <a:endParaRPr lang="pt-BR"/>
           </a:p>
         </p:txBody>
       </p:sp>
@@ -9738,31 +9755,31 @@
           <a:lstStyle/>
           <a:p>
             <a:r>
-              <a:rPr lang="pt-BR" dirty="0"/>
+              <a:rPr lang="pt-BR"/>
               <a:t>CAMDEN PALE ALE               247, </a:t>
             </a:r>
             <a:r>
-              <a:rPr lang="pt-BR" dirty="0">
+              <a:rPr lang="pt-BR">
                 <a:ea typeface="+mn-lt"/>
                 <a:cs typeface="+mn-lt"/>
               </a:rPr>
               <a:t>0,7841</a:t>
             </a:r>
-            <a:endParaRPr lang="pt-BR" dirty="0"/>
-          </a:p>
-          <a:p>
-            <a:r>
-              <a:rPr lang="pt-BR" dirty="0"/>
+            <a:endParaRPr lang="pt-BR"/>
+          </a:p>
+          <a:p>
+            <a:r>
+              <a:rPr lang="pt-BR"/>
               <a:t>CAMDEN HELLS                       68, </a:t>
             </a:r>
             <a:r>
-              <a:rPr lang="pt-BR" dirty="0">
+              <a:rPr lang="pt-BR">
                 <a:ea typeface="+mn-lt"/>
                 <a:cs typeface="+mn-lt"/>
               </a:rPr>
               <a:t>0,2159</a:t>
             </a:r>
-            <a:endParaRPr lang="pt-BR" dirty="0">
+            <a:endParaRPr lang="pt-BR">
               <a:cs typeface="Calibri"/>
             </a:endParaRPr>
           </a:p>
@@ -9800,11 +9817,11 @@
           <a:lstStyle/>
           <a:p>
             <a:r>
-              <a:rPr lang="pt-BR" dirty="0"/>
+              <a:rPr lang="pt-BR"/>
               <a:t>BIRRA DEL BORGO                  62, </a:t>
             </a:r>
             <a:r>
-              <a:rPr lang="pt-BR" dirty="0">
+              <a:rPr lang="pt-BR">
                 <a:ea typeface="+mn-lt"/>
                 <a:cs typeface="+mn-lt"/>
               </a:rPr>
@@ -9994,7 +10011,7 @@
           </a:bodyPr>
           <a:lstStyle/>
           <a:p>
-            <a:endParaRPr lang="pt-BR" sz="2000" b="1" dirty="0">
+            <a:endParaRPr lang="pt-BR" sz="2000" b="1">
               <a:cs typeface="Calibri"/>
             </a:endParaRPr>
           </a:p>
@@ -10041,13 +10058,13 @@
           <a:p>
             <a:pPr algn="ctr"/>
             <a:r>
-              <a:rPr lang="pt-BR" b="1" dirty="0">
+              <a:rPr lang="pt-BR" b="1">
                 <a:ea typeface="+mn-lt"/>
                 <a:cs typeface="+mn-lt"/>
               </a:rPr>
               <a:t>Contribuição percentual de cada submarca na venda da marca.</a:t>
             </a:r>
-            <a:endParaRPr lang="pt-BR" dirty="0"/>
+            <a:endParaRPr lang="pt-BR"/>
           </a:p>
         </p:txBody>
       </p:sp>
@@ -10103,30 +10120,18 @@
           <a:lstStyle/>
           <a:p>
             <a:r>
-              <a:rPr lang="pt-BR" b="1" dirty="0">
+              <a:rPr lang="pt-BR" b="1">
                 <a:cs typeface="Calibri Light"/>
               </a:rPr>
               <a:t>Volume da embalagem </a:t>
             </a:r>
             <a:r>
-              <a:rPr lang="pt-BR" dirty="0">
+              <a:rPr lang="pt-BR">
                 <a:cs typeface="Calibri Light"/>
               </a:rPr>
-              <a:t>["Container </a:t>
-            </a:r>
-            <a:r>
-              <a:rPr lang="pt-BR" dirty="0" err="1">
-                <a:cs typeface="Calibri Light"/>
-              </a:rPr>
-              <a:t>Size</a:t>
-            </a:r>
-            <a:r>
-              <a:rPr lang="pt-BR" dirty="0">
-                <a:cs typeface="Calibri Light"/>
-              </a:rPr>
-              <a:t>"]</a:t>
-            </a:r>
-            <a:endParaRPr lang="pt-BR" dirty="0"/>
+              <a:t>["Container Size"]</a:t>
+            </a:r>
+            <a:endParaRPr lang="pt-BR"/>
           </a:p>
         </p:txBody>
       </p:sp>
@@ -10146,12 +10151,424 @@
             <p:ph idx="1"/>
           </p:nvPr>
         </p:nvSpPr>
-        <p:spPr/>
+        <p:spPr>
+          <a:xfrm>
+            <a:off x="838200" y="1713057"/>
+            <a:ext cx="3475760" cy="2073998"/>
+          </a:xfrm>
+        </p:spPr>
         <p:txBody>
-          <a:bodyPr/>
+          <a:bodyPr vert="horz" lIns="91440" tIns="45720" rIns="91440" bIns="45720" rtlCol="0" anchor="t">
+            <a:normAutofit/>
+          </a:bodyPr>
           <a:lstStyle/>
           <a:p>
+            <a:pPr marL="0" indent="0">
+              <a:lnSpc>
+                <a:spcPct val="100000"/>
+              </a:lnSpc>
+              <a:spcBef>
+                <a:spcPts val="0"/>
+              </a:spcBef>
+              <a:buNone/>
+            </a:pPr>
+            <a:r>
+              <a:rPr lang="pt-BR">
+                <a:cs typeface="Calibri"/>
+              </a:rPr>
+              <a:t>De 28.316 </a:t>
+            </a:r>
+            <a:r>
+              <a:rPr lang="pt-BR" b="1">
+                <a:cs typeface="Calibri"/>
+              </a:rPr>
+              <a:t>pedidos</a:t>
+            </a:r>
+            <a:r>
+              <a:rPr lang="pt-BR">
+                <a:cs typeface="Calibri"/>
+              </a:rPr>
+              <a:t>,</a:t>
+            </a:r>
+            <a:endParaRPr lang="pt-BR" dirty="0">
+              <a:cs typeface="Calibri"/>
+            </a:endParaRPr>
+          </a:p>
+          <a:p>
+            <a:pPr marL="0" indent="0">
+              <a:lnSpc>
+                <a:spcPct val="100000"/>
+              </a:lnSpc>
+              <a:spcBef>
+                <a:spcPts val="0"/>
+              </a:spcBef>
+              <a:buNone/>
+            </a:pPr>
+            <a:r>
+              <a:rPr lang="pt-BR">
+                <a:cs typeface="Calibri"/>
+              </a:rPr>
+              <a:t>6 l         19.775  0,6984</a:t>
+            </a:r>
+          </a:p>
+          <a:p>
+            <a:pPr marL="0" indent="0">
+              <a:lnSpc>
+                <a:spcPct val="100000"/>
+              </a:lnSpc>
+              <a:spcBef>
+                <a:spcPts val="0"/>
+              </a:spcBef>
+              <a:buNone/>
+            </a:pPr>
+            <a:r>
+              <a:rPr lang="pt-BR">
+                <a:cs typeface="Calibri"/>
+              </a:rPr>
+              <a:t>330 ml 6.657    0,2351</a:t>
+            </a:r>
+          </a:p>
+          <a:p>
+            <a:pPr marL="0" indent="0">
+              <a:lnSpc>
+                <a:spcPct val="100000"/>
+              </a:lnSpc>
+              <a:spcBef>
+                <a:spcPts val="0"/>
+              </a:spcBef>
+              <a:buNone/>
+            </a:pPr>
+            <a:r>
+              <a:rPr lang="pt-BR">
+                <a:cs typeface="Calibri"/>
+              </a:rPr>
+              <a:t>355 ml 1.627    0,0575</a:t>
+            </a:r>
+            <a:endParaRPr lang="pt-BR" dirty="0">
+              <a:cs typeface="Calibri"/>
+            </a:endParaRPr>
+          </a:p>
+        </p:txBody>
+      </p:sp>
+      <p:sp>
+        <p:nvSpPr>
+          <p:cNvPr id="5" name="CaixaDeTexto 4">
+            <a:extLst>
+              <a:ext uri="{FF2B5EF4-FFF2-40B4-BE49-F238E27FC236}">
+                <a16:creationId xmlns:a16="http://schemas.microsoft.com/office/drawing/2014/main" id="{3DCD6379-F483-40B7-8027-5E4B1FE47B67}"/>
+              </a:ext>
+            </a:extLst>
+          </p:cNvPr>
+          <p:cNvSpPr txBox="1"/>
+          <p:nvPr/>
+        </p:nvSpPr>
+        <p:spPr>
+          <a:xfrm>
+            <a:off x="4308764" y="1711036"/>
+            <a:ext cx="7800107" cy="1815882"/>
+          </a:xfrm>
+          <a:prstGeom prst="rect">
+            <a:avLst/>
+          </a:prstGeom>
+          <a:noFill/>
+        </p:spPr>
+        <p:txBody>
+          <a:bodyPr rot="0" spcFirstLastPara="0" vertOverflow="overflow" horzOverflow="overflow" vert="horz" wrap="square" lIns="91440" tIns="45720" rIns="91440" bIns="45720" numCol="1" spcCol="0" rtlCol="0" fromWordArt="0" anchor="t" anchorCtr="0" forceAA="0" compatLnSpc="1">
+            <a:prstTxWarp prst="textNoShape">
+              <a:avLst/>
+            </a:prstTxWarp>
+            <a:spAutoFit/>
+          </a:bodyPr>
+          <a:lstStyle/>
+          <a:p>
+            <a:r>
+              <a:rPr lang="pt-BR" sz="2800">
+                <a:cs typeface="Calibri"/>
+              </a:rPr>
+              <a:t>Do volume de 1.743.298 ordens com marcas,</a:t>
+            </a:r>
             <a:endParaRPr lang="pt-BR"/>
+          </a:p>
+          <a:p>
+            <a:r>
+              <a:rPr lang="pt-BR" sz="2800">
+                <a:cs typeface="Calibri"/>
+              </a:rPr>
+              <a:t>6</a:t>
+            </a:r>
+            <a:r>
+              <a:rPr lang="pt-BR" sz="2800" dirty="0"/>
+              <a:t> </a:t>
+            </a:r>
+            <a:r>
+              <a:rPr lang="pt-BR" sz="2800"/>
+              <a:t>l          </a:t>
+            </a:r>
+            <a:r>
+              <a:rPr lang="pt-BR" sz="2800" dirty="0">
+                <a:latin typeface="Calibri"/>
+                <a:cs typeface="Calibri"/>
+              </a:rPr>
+              <a:t>1.460.659  0,8379</a:t>
+            </a:r>
+            <a:endParaRPr lang="pt-BR" sz="2800">
+              <a:cs typeface="Calibri"/>
+            </a:endParaRPr>
+          </a:p>
+          <a:p>
+            <a:r>
+              <a:rPr lang="pt-BR" sz="2800" dirty="0">
+                <a:cs typeface="Calibri"/>
+              </a:rPr>
+              <a:t>330 ml     </a:t>
+            </a:r>
+            <a:r>
+              <a:rPr lang="pt-BR" sz="2800">
+                <a:ea typeface="+mn-lt"/>
+                <a:cs typeface="+mn-lt"/>
+              </a:rPr>
+              <a:t>174.620  0,1002</a:t>
+            </a:r>
+          </a:p>
+          <a:p>
+            <a:r>
+              <a:rPr lang="pt-BR" sz="2800" dirty="0">
+                <a:cs typeface="Calibri"/>
+              </a:rPr>
+              <a:t>355 ml     </a:t>
+            </a:r>
+            <a:r>
+              <a:rPr lang="pt-BR" sz="2800">
+                <a:ea typeface="+mn-lt"/>
+                <a:cs typeface="+mn-lt"/>
+              </a:rPr>
+              <a:t>  80.056  0,0459</a:t>
+            </a:r>
+            <a:endParaRPr lang="pt-BR" sz="2800" dirty="0">
+              <a:cs typeface="Calibri"/>
+            </a:endParaRPr>
+          </a:p>
+        </p:txBody>
+      </p:sp>
+      <p:sp>
+        <p:nvSpPr>
+          <p:cNvPr id="6" name="CaixaDeTexto 5">
+            <a:extLst>
+              <a:ext uri="{FF2B5EF4-FFF2-40B4-BE49-F238E27FC236}">
+                <a16:creationId xmlns:a16="http://schemas.microsoft.com/office/drawing/2014/main" id="{994E4428-610E-46F4-B0F0-886C6C425915}"/>
+              </a:ext>
+            </a:extLst>
+          </p:cNvPr>
+          <p:cNvSpPr txBox="1"/>
+          <p:nvPr/>
+        </p:nvSpPr>
+        <p:spPr>
+          <a:xfrm>
+            <a:off x="836468" y="3520787"/>
+            <a:ext cx="5262995" cy="1815882"/>
+          </a:xfrm>
+          <a:prstGeom prst="rect">
+            <a:avLst/>
+          </a:prstGeom>
+          <a:noFill/>
+        </p:spPr>
+        <p:txBody>
+          <a:bodyPr rot="0" spcFirstLastPara="0" vertOverflow="overflow" horzOverflow="overflow" vert="horz" wrap="square" lIns="91440" tIns="45720" rIns="91440" bIns="45720" numCol="1" spcCol="0" rtlCol="0" fromWordArt="0" anchor="t" anchorCtr="0" forceAA="0" compatLnSpc="1">
+            <a:prstTxWarp prst="textNoShape">
+              <a:avLst/>
+            </a:prstTxWarp>
+            <a:spAutoFit/>
+          </a:bodyPr>
+          <a:lstStyle/>
+          <a:p>
+            <a:r>
+              <a:rPr lang="pt-BR" sz="2800" dirty="0">
+                <a:ea typeface="+mn-lt"/>
+                <a:cs typeface="+mn-lt"/>
+              </a:rPr>
+              <a:t>De 2.963.644 </a:t>
+            </a:r>
+            <a:r>
+              <a:rPr lang="pt-BR" sz="2800" b="1" dirty="0">
+                <a:ea typeface="+mn-lt"/>
+                <a:cs typeface="+mn-lt"/>
+              </a:rPr>
+              <a:t>peças </a:t>
+            </a:r>
+            <a:r>
+              <a:rPr lang="pt-BR" sz="2800">
+                <a:ea typeface="+mn-lt"/>
+                <a:cs typeface="+mn-lt"/>
+              </a:rPr>
+              <a:t>entregues,</a:t>
+            </a:r>
+          </a:p>
+          <a:p>
+            <a:r>
+              <a:rPr lang="pt-BR" sz="2800" dirty="0">
+                <a:ea typeface="+mn-lt"/>
+                <a:cs typeface="+mn-lt"/>
+              </a:rPr>
+              <a:t>6 l          2.466.967</a:t>
+            </a:r>
+            <a:r>
+              <a:rPr lang="pt-BR" sz="2800"/>
+              <a:t>  0,8324 </a:t>
+            </a:r>
+            <a:endParaRPr lang="pt-BR" sz="2800" dirty="0">
+              <a:ea typeface="+mn-lt"/>
+              <a:cs typeface="+mn-lt"/>
+            </a:endParaRPr>
+          </a:p>
+          <a:p>
+            <a:r>
+              <a:rPr lang="pt-BR" sz="2800" dirty="0">
+                <a:ea typeface="+mn-lt"/>
+                <a:cs typeface="+mn-lt"/>
+              </a:rPr>
+              <a:t>330 ml     296.085</a:t>
+            </a:r>
+            <a:r>
+              <a:rPr lang="pt-BR" sz="2800"/>
+              <a:t>  0,0999 </a:t>
+            </a:r>
+            <a:endParaRPr lang="en-US" sz="2800">
+              <a:ea typeface="+mn-lt"/>
+              <a:cs typeface="+mn-lt"/>
+            </a:endParaRPr>
+          </a:p>
+          <a:p>
+            <a:r>
+              <a:rPr lang="pt-BR" sz="2800" dirty="0">
+                <a:ea typeface="+mn-lt"/>
+                <a:cs typeface="+mn-lt"/>
+              </a:rPr>
+              <a:t>355 ml     147.494</a:t>
+            </a:r>
+            <a:r>
+              <a:rPr lang="pt-BR" sz="2800"/>
+              <a:t>  0,0498 </a:t>
+            </a:r>
+            <a:endParaRPr lang="pt-BR"/>
+          </a:p>
+        </p:txBody>
+      </p:sp>
+      <p:sp>
+        <p:nvSpPr>
+          <p:cNvPr id="7" name="CaixaDeTexto 6">
+            <a:extLst>
+              <a:ext uri="{FF2B5EF4-FFF2-40B4-BE49-F238E27FC236}">
+                <a16:creationId xmlns:a16="http://schemas.microsoft.com/office/drawing/2014/main" id="{FD5BFC56-B47B-433D-AB03-93D31A924583}"/>
+              </a:ext>
+            </a:extLst>
+          </p:cNvPr>
+          <p:cNvSpPr txBox="1"/>
+          <p:nvPr/>
+        </p:nvSpPr>
+        <p:spPr>
+          <a:xfrm>
+            <a:off x="5620616" y="3473161"/>
+            <a:ext cx="5955721" cy="2246769"/>
+          </a:xfrm>
+          <a:prstGeom prst="rect">
+            <a:avLst/>
+          </a:prstGeom>
+          <a:noFill/>
+        </p:spPr>
+        <p:txBody>
+          <a:bodyPr rot="0" spcFirstLastPara="0" vertOverflow="overflow" horzOverflow="overflow" vert="horz" wrap="square" lIns="91440" tIns="45720" rIns="91440" bIns="45720" numCol="1" spcCol="0" rtlCol="0" fromWordArt="0" anchor="t" anchorCtr="0" forceAA="0" compatLnSpc="1">
+            <a:prstTxWarp prst="textNoShape">
+              <a:avLst/>
+            </a:prstTxWarp>
+            <a:spAutoFit/>
+          </a:bodyPr>
+          <a:lstStyle/>
+          <a:p>
+            <a:r>
+              <a:rPr lang="pt-BR" sz="2800" b="1" dirty="0"/>
+              <a:t>Relação </a:t>
+            </a:r>
+            <a:r>
+              <a:rPr lang="pt-BR" sz="2800" dirty="0"/>
+              <a:t>da quantidade de </a:t>
+            </a:r>
+            <a:r>
+              <a:rPr lang="pt-BR" sz="2800" b="1" dirty="0"/>
+              <a:t>peças</a:t>
+            </a:r>
+            <a:r>
+              <a:rPr lang="pt-BR" sz="2800" dirty="0"/>
+              <a:t> entregues com a </a:t>
+            </a:r>
+            <a:r>
+              <a:rPr lang="pt-BR" sz="2800"/>
+              <a:t>quantidade de </a:t>
+            </a:r>
+            <a:r>
+              <a:rPr lang="pt-BR" sz="2800" b="1"/>
+              <a:t>ordens</a:t>
+            </a:r>
+            <a:r>
+              <a:rPr lang="pt-BR" sz="2800"/>
+              <a:t>:</a:t>
+            </a:r>
+          </a:p>
+          <a:p>
+            <a:r>
+              <a:rPr lang="pt-BR" sz="2800">
+                <a:cs typeface="Calibri"/>
+              </a:rPr>
+              <a:t>6 l         = </a:t>
+            </a:r>
+            <a:r>
+              <a:rPr lang="pt-BR" sz="2800">
+                <a:ea typeface="+mn-lt"/>
+                <a:cs typeface="+mn-lt"/>
+              </a:rPr>
+              <a:t>1,6889</a:t>
+            </a:r>
+            <a:endParaRPr lang="pt-BR" sz="2800" dirty="0">
+              <a:ea typeface="+mn-lt"/>
+              <a:cs typeface="+mn-lt"/>
+            </a:endParaRPr>
+          </a:p>
+          <a:p>
+            <a:r>
+              <a:rPr lang="pt-BR" sz="2800">
+                <a:cs typeface="Calibri"/>
+              </a:rPr>
+              <a:t>330 ml = </a:t>
+            </a:r>
+            <a:r>
+              <a:rPr lang="pt-BR" sz="2800">
+                <a:ea typeface="+mn-lt"/>
+                <a:cs typeface="+mn-lt"/>
+              </a:rPr>
+              <a:t>1,6956</a:t>
+            </a:r>
+            <a:endParaRPr lang="pt-BR" sz="2800" dirty="0">
+              <a:ea typeface="+mn-lt"/>
+              <a:cs typeface="+mn-lt"/>
+            </a:endParaRPr>
+          </a:p>
+          <a:p>
+            <a:r>
+              <a:rPr lang="pt-BR" sz="2800">
+                <a:cs typeface="Calibri"/>
+              </a:rPr>
+              <a:t>355 ml = </a:t>
+            </a:r>
+            <a:r>
+              <a:rPr lang="pt-BR" sz="2800">
+                <a:ea typeface="+mn-lt"/>
+                <a:cs typeface="+mn-lt"/>
+              </a:rPr>
+              <a:t>1,8424</a:t>
+            </a:r>
+            <a:endParaRPr lang="pt-BR" sz="2800" dirty="0">
+              <a:ea typeface="+mn-lt"/>
+              <a:cs typeface="+mn-lt"/>
+            </a:endParaRPr>
           </a:p>
         </p:txBody>
       </p:sp>
@@ -10207,18 +10624,18 @@
           <a:lstStyle/>
           <a:p>
             <a:r>
-              <a:rPr lang="pt-BR" b="1" dirty="0">
+              <a:rPr lang="pt-BR" b="1">
                 <a:cs typeface="Calibri Light"/>
               </a:rPr>
               <a:t>Distribuição do material </a:t>
             </a:r>
             <a:r>
-              <a:rPr lang="pt-BR" dirty="0">
+              <a:rPr lang="pt-BR">
                 <a:cs typeface="Calibri Light"/>
               </a:rPr>
               <a:t>["Material"]</a:t>
             </a:r>
-            <a:endParaRPr lang="pt-BR" dirty="0"/>
+            <a:endParaRPr lang="pt-BR"/>
           </a:p>
         </p:txBody>
       </p:sp>
@@ -10240,9 +10657,17 @@
         </p:nvSpPr>
         <p:spPr/>
         <p:txBody>
-          <a:bodyPr/>
+          <a:bodyPr vert="horz" lIns="91440" tIns="45720" rIns="91440" bIns="45720" rtlCol="0" anchor="t">
+            <a:normAutofit/>
+          </a:bodyPr>
           <a:lstStyle/>
           <a:p>
+            <a:r>
+              <a:rPr lang="pt-BR">
+                <a:cs typeface="Calibri"/>
+              </a:rPr>
+              <a:t>Averiguar se um "material" corresponde a algum produto específico (possibilidade de preencher campos vazios se constatada relação)</a:t>
+            </a:r>
             <a:endParaRPr lang="pt-BR"/>
           </a:p>
         </p:txBody>

</xml_diff>

<commit_message>
Atualização de meio-tempo da Apresentação e do código-fonte.
</commit_message>
<xml_diff>
--- a/Apresentação1.pptx
+++ b/Apresentação1.pptx
@@ -129,6 +129,8 @@
     <p1510:client id="{30BDF555-67D5-7F4D-E88F-8CE1BD22A84C}" v="690" dt="2021-10-19T23:18:27.093"/>
     <p1510:client id="{3DDC54BA-4075-6979-1A35-C7DCFB10469F}" v="934" dt="2021-10-20T00:12:26.392"/>
     <p1510:client id="{521AAFE5-9A30-F6FA-69E5-18C0254DB6B9}" v="704" dt="2021-10-21T00:11:16.760"/>
+    <p1510:client id="{6227370F-7FE4-1758-DB8A-4C92D50D133C}" v="738" dt="2021-10-22T12:37:26.569"/>
+    <p1510:client id="{83F1D559-B501-536E-D835-FCBCD9B96138}" v="320" dt="2021-10-22T18:58:41.908"/>
     <p1510:client id="{CC30ADC3-F2FC-14EE-3D66-6C99CADAFB92}" v="3333" dt="2021-10-22T02:11:26.281"/>
     <p1510:client id="{D8C965DF-2039-0F1A-FCF3-D76005C0B460}" v="17" dt="2021-10-14T20:02:31.275"/>
     <p1510:client id="{DD34EB74-03A9-7CC1-0BA6-6F37897EA669}" v="2" dt="2021-10-19T23:19:18.156"/>
@@ -1078,16 +1080,16 @@
         <a:lstStyle/>
         <a:p>
           <a:r>
-            <a:rPr lang="pt-BR" b="0"/>
+            <a:rPr lang="pt-BR" b="0" dirty="0"/>
             <a:t>total:</a:t>
           </a:r>
           <a:r>
-            <a:rPr lang="pt-BR" b="0">
+            <a:rPr lang="pt-BR" b="0" dirty="0">
               <a:latin typeface="Calibri Light" panose="020F0302020204030204"/>
             </a:rPr>
             <a:t> </a:t>
           </a:r>
-          <a:endParaRPr lang="pt-BR" b="0">
+          <a:endParaRPr lang="pt-BR" b="0" dirty="0">
             <a:latin typeface="Calibri"/>
             <a:cs typeface="Calibri"/>
           </a:endParaRPr>
@@ -1125,16 +1127,24 @@
         <a:p>
           <a:pPr rtl="0"/>
           <a:r>
-            <a:rPr lang="pt-BR"/>
-            <a:t>soma dos elementos de "volumeabsoluto" = 4.220.713</a:t>
+            <a:rPr lang="pt-BR" dirty="0"/>
+            <a:t>soma dos elementos de "</a:t>
           </a:r>
           <a:r>
-            <a:rPr lang="pt-BR">
+            <a:rPr lang="pt-BR" dirty="0" err="1"/>
+            <a:t>volumeabsoluto</a:t>
+          </a:r>
+          <a:r>
+            <a:rPr lang="pt-BR" dirty="0"/>
+            <a:t>" = 4.220.713</a:t>
+          </a:r>
+          <a:r>
+            <a:rPr lang="pt-BR" dirty="0">
               <a:latin typeface="Calibri Light" panose="020F0302020204030204"/>
             </a:rPr>
             <a:t>.</a:t>
           </a:r>
-          <a:endParaRPr lang="pt-BR"/>
+          <a:endParaRPr lang="pt-BR" dirty="0"/>
         </a:p>
       </dgm:t>
     </dgm:pt>
@@ -1168,7 +1178,7 @@
         <a:lstStyle/>
         <a:p>
           <a:r>
-            <a:rPr lang="pt-BR"/>
+            <a:rPr lang="pt-BR" dirty="0" err="1"/>
             <a:t>cumulativopedidos</a:t>
           </a:r>
         </a:p>
@@ -1205,20 +1215,20 @@
         <a:p>
           <a:pPr rtl="0"/>
           <a:r>
-            <a:rPr lang="pt-BR" err="1">
+            <a:rPr lang="pt-BR" dirty="0" err="1">
               <a:latin typeface="Calibri"/>
               <a:cs typeface="Calibri"/>
             </a:rPr>
             <a:t>volumetotal</a:t>
           </a:r>
           <a:r>
-            <a:rPr lang="pt-BR">
+            <a:rPr lang="pt-BR" dirty="0">
               <a:latin typeface="Calibri"/>
               <a:cs typeface="Calibri"/>
             </a:rPr>
             <a:t>: </a:t>
           </a:r>
-          <a:endParaRPr lang="pt-BR"/>
+          <a:endParaRPr lang="pt-BR" dirty="0"/>
         </a:p>
       </dgm:t>
     </dgm:pt>
@@ -1246,15 +1256,15 @@
         <a:p>
           <a:pPr rtl="0"/>
           <a:r>
-            <a:rPr lang="pt-BR"/>
+            <a:rPr lang="pt-BR" dirty="0"/>
             <a:t>soma das frequências das ordens; deveria equivaler ao total de pedidos (linhas, 73.670), porém por conta do arredondamento em "</a:t>
           </a:r>
           <a:r>
-            <a:rPr lang="pt-BR" err="1"/>
+            <a:rPr lang="pt-BR" dirty="0" err="1"/>
             <a:t>volumevalores</a:t>
           </a:r>
           <a:r>
-            <a:rPr lang="pt-BR"/>
+            <a:rPr lang="pt-BR" dirty="0"/>
             <a:t>", resulta 73.610.</a:t>
           </a:r>
         </a:p>
@@ -1284,23 +1294,23 @@
         <a:p>
           <a:pPr rtl="0"/>
           <a:r>
-            <a:rPr lang="pt-BR"/>
+            <a:rPr lang="pt-BR" dirty="0"/>
             <a:t>contribuição percentual acumulada do "</a:t>
           </a:r>
           <a:r>
-            <a:rPr lang="pt-BR" err="1"/>
+            <a:rPr lang="pt-BR" dirty="0" err="1"/>
             <a:t>volumeabsoluto</a:t>
           </a:r>
           <a:r>
-            <a:rPr lang="pt-BR"/>
+            <a:rPr lang="pt-BR" dirty="0"/>
             <a:t>" de cada ordem; </a:t>
           </a:r>
           <a:r>
-            <a:rPr lang="pt-BR" i="1"/>
+            <a:rPr lang="pt-BR" i="1" dirty="0"/>
             <a:t>e.g. </a:t>
           </a:r>
           <a:r>
-            <a:rPr lang="pt-BR"/>
+            <a:rPr lang="pt-BR" dirty="0"/>
             <a:t>pedidos de uma ordem correspondem a 0,0021% do total de ordens.</a:t>
           </a:r>
         </a:p>
@@ -1330,10 +1340,10 @@
         <a:p>
           <a:pPr rtl="0"/>
           <a:r>
-            <a:rPr lang="pt-BR">
+            <a:rPr lang="pt-BR" dirty="0" err="1">
               <a:latin typeface="Calibri Light" panose="020F0302020204030204"/>
             </a:rPr>
-            <a:t>Cumulativolume</a:t>
+            <a:t>cumulativolume</a:t>
           </a:r>
         </a:p>
       </dgm:t>
@@ -1362,15 +1372,23 @@
         <a:p>
           <a:pPr algn="l" rtl="0"/>
           <a:r>
-            <a:rPr lang="pt-BR"/>
-            <a:t>contribuição percentual acumulada de "volumevalores" (frequência de cada ordem); </a:t>
+            <a:rPr lang="pt-BR" dirty="0"/>
+            <a:t>contribuição percentual acumulada de "</a:t>
           </a:r>
           <a:r>
-            <a:rPr lang="pt-BR" i="1"/>
+            <a:rPr lang="pt-BR" dirty="0" err="1"/>
+            <a:t>volumevalores</a:t>
+          </a:r>
+          <a:r>
+            <a:rPr lang="pt-BR" dirty="0"/>
+            <a:t>" (frequência de cada ordem); </a:t>
+          </a:r>
+          <a:r>
+            <a:rPr lang="pt-BR" i="1" dirty="0"/>
             <a:t>e.g. </a:t>
           </a:r>
           <a:r>
-            <a:rPr lang="pt-BR"/>
+            <a:rPr lang="pt-BR" dirty="0"/>
             <a:t>pedidos com uma ordem correspondem a 11.50% das ordens efetuadas.</a:t>
           </a:r>
         </a:p>
@@ -1400,10 +1418,16 @@
         <a:p>
           <a:pPr rtl="0"/>
           <a:r>
-            <a:rPr lang="pt-BR" b="0">
+            <a:rPr lang="pt-BR" b="0" dirty="0" err="1">
               <a:latin typeface="Calibri Light" panose="020F0302020204030204"/>
             </a:rPr>
-            <a:t>volumevalores:</a:t>
+            <a:t>volumevalores</a:t>
+          </a:r>
+          <a:r>
+            <a:rPr lang="pt-BR" b="0" dirty="0">
+              <a:latin typeface="Calibri Light" panose="020F0302020204030204"/>
+            </a:rPr>
+            <a:t>:</a:t>
           </a:r>
         </a:p>
       </dgm:t>
@@ -1432,10 +1456,16 @@
         <a:p>
           <a:pPr rtl="0"/>
           <a:r>
-            <a:rPr lang="pt-BR" b="0">
+            <a:rPr lang="pt-BR" b="0" dirty="0" err="1">
               <a:latin typeface="Calibri Light" panose="020F0302020204030204"/>
             </a:rPr>
-            <a:t>volumeabsoluto:</a:t>
+            <a:t>volumeabsoluto</a:t>
+          </a:r>
+          <a:r>
+            <a:rPr lang="pt-BR" b="0" dirty="0">
+              <a:latin typeface="Calibri Light" panose="020F0302020204030204"/>
+            </a:rPr>
+            <a:t>:</a:t>
           </a:r>
         </a:p>
       </dgm:t>
@@ -1463,10 +1493,10 @@
         <a:lstStyle/>
         <a:p>
           <a:r>
-            <a:rPr lang="pt-BR" b="0"/>
+            <a:rPr lang="pt-BR" b="0" dirty="0"/>
             <a:t>frequência da ordem vezes sua quantidade.</a:t>
           </a:r>
-          <a:endParaRPr lang="pt-BR"/>
+          <a:endParaRPr lang="pt-BR" dirty="0"/>
         </a:p>
       </dgm:t>
     </dgm:pt>
@@ -1494,11 +1524,11 @@
         <a:p>
           <a:pPr rtl="0"/>
           <a:r>
-            <a:rPr lang="pt-BR" b="0"/>
+            <a:rPr lang="pt-BR" b="0" dirty="0"/>
             <a:t>frequência da ordem</a:t>
           </a:r>
           <a:r>
-            <a:rPr lang="pt-BR" b="0">
+            <a:rPr lang="pt-BR" b="0" dirty="0">
               <a:latin typeface="Calibri Light" panose="020F0302020204030204"/>
             </a:rPr>
             <a:t>.</a:t>
@@ -1879,11 +1909,11 @@
             <a:buChar char="•"/>
           </a:pPr>
           <a:r>
-            <a:rPr lang="pt-BR" sz="1300" b="0" kern="1200"/>
+            <a:rPr lang="pt-BR" sz="1300" b="0" kern="1200" dirty="0"/>
             <a:t>frequência da ordem</a:t>
           </a:r>
           <a:r>
-            <a:rPr lang="pt-BR" sz="1300" b="0" kern="1200">
+            <a:rPr lang="pt-BR" sz="1300" b="0" kern="1200" dirty="0">
               <a:latin typeface="Calibri Light" panose="020F0302020204030204"/>
             </a:rPr>
             <a:t>.</a:t>
@@ -1963,10 +1993,16 @@
             <a:buNone/>
           </a:pPr>
           <a:r>
-            <a:rPr lang="pt-BR" sz="1300" b="0" kern="1200">
+            <a:rPr lang="pt-BR" sz="1300" b="0" kern="1200" dirty="0" err="1">
               <a:latin typeface="Calibri Light" panose="020F0302020204030204"/>
             </a:rPr>
-            <a:t>volumevalores:</a:t>
+            <a:t>volumevalores</a:t>
+          </a:r>
+          <a:r>
+            <a:rPr lang="pt-BR" sz="1300" b="0" kern="1200" dirty="0">
+              <a:latin typeface="Calibri Light" panose="020F0302020204030204"/>
+            </a:rPr>
+            <a:t>:</a:t>
           </a:r>
         </a:p>
       </dsp:txBody>
@@ -2042,10 +2078,10 @@
             <a:buChar char="•"/>
           </a:pPr>
           <a:r>
-            <a:rPr lang="pt-BR" sz="1300" b="0" kern="1200"/>
+            <a:rPr lang="pt-BR" sz="1300" b="0" kern="1200" dirty="0"/>
             <a:t>frequência da ordem vezes sua quantidade.</a:t>
           </a:r>
-          <a:endParaRPr lang="pt-BR" sz="1300" kern="1200"/>
+          <a:endParaRPr lang="pt-BR" sz="1300" kern="1200" dirty="0"/>
         </a:p>
       </dsp:txBody>
       <dsp:txXfrm>
@@ -2121,10 +2157,16 @@
             <a:buNone/>
           </a:pPr>
           <a:r>
-            <a:rPr lang="pt-BR" sz="1300" b="0" kern="1200">
+            <a:rPr lang="pt-BR" sz="1300" b="0" kern="1200" dirty="0" err="1">
               <a:latin typeface="Calibri Light" panose="020F0302020204030204"/>
             </a:rPr>
-            <a:t>volumeabsoluto:</a:t>
+            <a:t>volumeabsoluto</a:t>
+          </a:r>
+          <a:r>
+            <a:rPr lang="pt-BR" sz="1300" b="0" kern="1200" dirty="0">
+              <a:latin typeface="Calibri Light" panose="020F0302020204030204"/>
+            </a:rPr>
+            <a:t>:</a:t>
           </a:r>
         </a:p>
       </dsp:txBody>
@@ -2200,16 +2242,24 @@
             <a:buChar char="•"/>
           </a:pPr>
           <a:r>
-            <a:rPr lang="pt-BR" sz="1300" kern="1200"/>
-            <a:t>soma dos elementos de "volumeabsoluto" = 4.220.713</a:t>
+            <a:rPr lang="pt-BR" sz="1300" kern="1200" dirty="0"/>
+            <a:t>soma dos elementos de "</a:t>
           </a:r>
           <a:r>
-            <a:rPr lang="pt-BR" sz="1300" kern="1200">
+            <a:rPr lang="pt-BR" sz="1300" kern="1200" dirty="0" err="1"/>
+            <a:t>volumeabsoluto</a:t>
+          </a:r>
+          <a:r>
+            <a:rPr lang="pt-BR" sz="1300" kern="1200" dirty="0"/>
+            <a:t>" = 4.220.713</a:t>
+          </a:r>
+          <a:r>
+            <a:rPr lang="pt-BR" sz="1300" kern="1200" dirty="0">
               <a:latin typeface="Calibri Light" panose="020F0302020204030204"/>
             </a:rPr>
             <a:t>.</a:t>
           </a:r>
-          <a:endParaRPr lang="pt-BR" sz="1300" kern="1200"/>
+          <a:endParaRPr lang="pt-BR" sz="1300" kern="1200" dirty="0"/>
         </a:p>
       </dsp:txBody>
       <dsp:txXfrm>
@@ -2285,16 +2335,16 @@
             <a:buNone/>
           </a:pPr>
           <a:r>
-            <a:rPr lang="pt-BR" sz="1300" b="0" kern="1200"/>
+            <a:rPr lang="pt-BR" sz="1300" b="0" kern="1200" dirty="0"/>
             <a:t>total:</a:t>
           </a:r>
           <a:r>
-            <a:rPr lang="pt-BR" sz="1300" b="0" kern="1200">
+            <a:rPr lang="pt-BR" sz="1300" b="0" kern="1200" dirty="0">
               <a:latin typeface="Calibri Light" panose="020F0302020204030204"/>
             </a:rPr>
             <a:t> </a:t>
           </a:r>
-          <a:endParaRPr lang="pt-BR" sz="1300" b="0" kern="1200">
+          <a:endParaRPr lang="pt-BR" sz="1300" b="0" kern="1200" dirty="0">
             <a:latin typeface="Calibri"/>
             <a:cs typeface="Calibri"/>
           </a:endParaRPr>
@@ -2372,15 +2422,15 @@
             <a:buChar char="•"/>
           </a:pPr>
           <a:r>
-            <a:rPr lang="pt-BR" sz="1300" kern="1200"/>
+            <a:rPr lang="pt-BR" sz="1300" kern="1200" dirty="0"/>
             <a:t>soma das frequências das ordens; deveria equivaler ao total de pedidos (linhas, 73.670), porém por conta do arredondamento em "</a:t>
           </a:r>
           <a:r>
-            <a:rPr lang="pt-BR" sz="1300" kern="1200" err="1"/>
+            <a:rPr lang="pt-BR" sz="1300" kern="1200" dirty="0" err="1"/>
             <a:t>volumevalores</a:t>
           </a:r>
           <a:r>
-            <a:rPr lang="pt-BR" sz="1300" kern="1200"/>
+            <a:rPr lang="pt-BR" sz="1300" kern="1200" dirty="0"/>
             <a:t>", resulta 73.610.</a:t>
           </a:r>
         </a:p>
@@ -2458,20 +2508,20 @@
             <a:buNone/>
           </a:pPr>
           <a:r>
-            <a:rPr lang="pt-BR" sz="1300" kern="1200" err="1">
+            <a:rPr lang="pt-BR" sz="1300" kern="1200" dirty="0" err="1">
               <a:latin typeface="Calibri"/>
               <a:cs typeface="Calibri"/>
             </a:rPr>
             <a:t>volumetotal</a:t>
           </a:r>
           <a:r>
-            <a:rPr lang="pt-BR" sz="1300" kern="1200">
+            <a:rPr lang="pt-BR" sz="1300" kern="1200" dirty="0">
               <a:latin typeface="Calibri"/>
               <a:cs typeface="Calibri"/>
             </a:rPr>
             <a:t>: </a:t>
           </a:r>
-          <a:endParaRPr lang="pt-BR" sz="1300" kern="1200"/>
+          <a:endParaRPr lang="pt-BR" sz="1300" kern="1200" dirty="0"/>
         </a:p>
       </dsp:txBody>
       <dsp:txXfrm>
@@ -2546,23 +2596,23 @@
             <a:buChar char="•"/>
           </a:pPr>
           <a:r>
-            <a:rPr lang="pt-BR" sz="1300" kern="1200"/>
+            <a:rPr lang="pt-BR" sz="1300" kern="1200" dirty="0"/>
             <a:t>contribuição percentual acumulada do "</a:t>
           </a:r>
           <a:r>
-            <a:rPr lang="pt-BR" sz="1300" kern="1200" err="1"/>
+            <a:rPr lang="pt-BR" sz="1300" kern="1200" dirty="0" err="1"/>
             <a:t>volumeabsoluto</a:t>
           </a:r>
           <a:r>
-            <a:rPr lang="pt-BR" sz="1300" kern="1200"/>
+            <a:rPr lang="pt-BR" sz="1300" kern="1200" dirty="0"/>
             <a:t>" de cada ordem; </a:t>
           </a:r>
           <a:r>
-            <a:rPr lang="pt-BR" sz="1300" i="1" kern="1200"/>
+            <a:rPr lang="pt-BR" sz="1300" i="1" kern="1200" dirty="0"/>
             <a:t>e.g. </a:t>
           </a:r>
           <a:r>
-            <a:rPr lang="pt-BR" sz="1300" kern="1200"/>
+            <a:rPr lang="pt-BR" sz="1300" kern="1200" dirty="0"/>
             <a:t>pedidos de uma ordem correspondem a 0,0021% do total de ordens.</a:t>
           </a:r>
         </a:p>
@@ -2640,7 +2690,7 @@
             <a:buNone/>
           </a:pPr>
           <a:r>
-            <a:rPr lang="pt-BR" sz="1300" kern="1200"/>
+            <a:rPr lang="pt-BR" sz="1300" kern="1200" dirty="0" err="1"/>
             <a:t>cumulativopedidos</a:t>
           </a:r>
         </a:p>
@@ -2717,15 +2767,23 @@
             <a:buChar char="•"/>
           </a:pPr>
           <a:r>
-            <a:rPr lang="pt-BR" sz="1300" kern="1200"/>
-            <a:t>contribuição percentual acumulada de "volumevalores" (frequência de cada ordem); </a:t>
+            <a:rPr lang="pt-BR" sz="1300" kern="1200" dirty="0"/>
+            <a:t>contribuição percentual acumulada de "</a:t>
           </a:r>
           <a:r>
-            <a:rPr lang="pt-BR" sz="1300" i="1" kern="1200"/>
+            <a:rPr lang="pt-BR" sz="1300" kern="1200" dirty="0" err="1"/>
+            <a:t>volumevalores</a:t>
+          </a:r>
+          <a:r>
+            <a:rPr lang="pt-BR" sz="1300" kern="1200" dirty="0"/>
+            <a:t>" (frequência de cada ordem); </a:t>
+          </a:r>
+          <a:r>
+            <a:rPr lang="pt-BR" sz="1300" i="1" kern="1200" dirty="0"/>
             <a:t>e.g. </a:t>
           </a:r>
           <a:r>
-            <a:rPr lang="pt-BR" sz="1300" kern="1200"/>
+            <a:rPr lang="pt-BR" sz="1300" kern="1200" dirty="0"/>
             <a:t>pedidos com uma ordem correspondem a 11.50% das ordens efetuadas.</a:t>
           </a:r>
         </a:p>
@@ -2803,10 +2861,10 @@
             <a:buNone/>
           </a:pPr>
           <a:r>
-            <a:rPr lang="pt-BR" sz="1300" kern="1200">
+            <a:rPr lang="pt-BR" sz="1300" kern="1200" dirty="0" err="1">
               <a:latin typeface="Calibri Light" panose="020F0302020204030204"/>
             </a:rPr>
-            <a:t>Cumulativolume</a:t>
+            <a:t>cumulativolume</a:t>
           </a:r>
         </a:p>
       </dsp:txBody>
@@ -4209,7 +4267,7 @@
           <a:p>
             <a:fld id="{F0E51C7C-CEA3-4CAA-BE4B-344879E7C377}" type="datetimeFigureOut">
               <a:rPr lang="de-DE" smtClean="0"/>
-              <a:t>21.10.2021</a:t>
+              <a:t>22.10.2021</a:t>
             </a:fld>
             <a:endParaRPr lang="de-DE"/>
           </a:p>
@@ -4379,7 +4437,7 @@
           <a:p>
             <a:fld id="{F0E51C7C-CEA3-4CAA-BE4B-344879E7C377}" type="datetimeFigureOut">
               <a:rPr lang="de-DE" smtClean="0"/>
-              <a:t>21.10.2021</a:t>
+              <a:t>22.10.2021</a:t>
             </a:fld>
             <a:endParaRPr lang="de-DE"/>
           </a:p>
@@ -4559,7 +4617,7 @@
           <a:p>
             <a:fld id="{F0E51C7C-CEA3-4CAA-BE4B-344879E7C377}" type="datetimeFigureOut">
               <a:rPr lang="de-DE" smtClean="0"/>
-              <a:t>21.10.2021</a:t>
+              <a:t>22.10.2021</a:t>
             </a:fld>
             <a:endParaRPr lang="de-DE"/>
           </a:p>
@@ -4729,7 +4787,7 @@
           <a:p>
             <a:fld id="{F0E51C7C-CEA3-4CAA-BE4B-344879E7C377}" type="datetimeFigureOut">
               <a:rPr lang="de-DE" smtClean="0"/>
-              <a:t>21.10.2021</a:t>
+              <a:t>22.10.2021</a:t>
             </a:fld>
             <a:endParaRPr lang="de-DE"/>
           </a:p>
@@ -4975,7 +5033,7 @@
           <a:p>
             <a:fld id="{F0E51C7C-CEA3-4CAA-BE4B-344879E7C377}" type="datetimeFigureOut">
               <a:rPr lang="de-DE" smtClean="0"/>
-              <a:t>21.10.2021</a:t>
+              <a:t>22.10.2021</a:t>
             </a:fld>
             <a:endParaRPr lang="de-DE"/>
           </a:p>
@@ -5207,7 +5265,7 @@
           <a:p>
             <a:fld id="{F0E51C7C-CEA3-4CAA-BE4B-344879E7C377}" type="datetimeFigureOut">
               <a:rPr lang="de-DE" smtClean="0"/>
-              <a:t>21.10.2021</a:t>
+              <a:t>22.10.2021</a:t>
             </a:fld>
             <a:endParaRPr lang="de-DE"/>
           </a:p>
@@ -5574,7 +5632,7 @@
           <a:p>
             <a:fld id="{F0E51C7C-CEA3-4CAA-BE4B-344879E7C377}" type="datetimeFigureOut">
               <a:rPr lang="de-DE" smtClean="0"/>
-              <a:t>21.10.2021</a:t>
+              <a:t>22.10.2021</a:t>
             </a:fld>
             <a:endParaRPr lang="de-DE"/>
           </a:p>
@@ -5692,7 +5750,7 @@
           <a:p>
             <a:fld id="{F0E51C7C-CEA3-4CAA-BE4B-344879E7C377}" type="datetimeFigureOut">
               <a:rPr lang="de-DE" smtClean="0"/>
-              <a:t>21.10.2021</a:t>
+              <a:t>22.10.2021</a:t>
             </a:fld>
             <a:endParaRPr lang="de-DE"/>
           </a:p>
@@ -5787,7 +5845,7 @@
           <a:p>
             <a:fld id="{F0E51C7C-CEA3-4CAA-BE4B-344879E7C377}" type="datetimeFigureOut">
               <a:rPr lang="de-DE" smtClean="0"/>
-              <a:t>21.10.2021</a:t>
+              <a:t>22.10.2021</a:t>
             </a:fld>
             <a:endParaRPr lang="de-DE"/>
           </a:p>
@@ -6064,7 +6122,7 @@
           <a:p>
             <a:fld id="{F0E51C7C-CEA3-4CAA-BE4B-344879E7C377}" type="datetimeFigureOut">
               <a:rPr lang="de-DE" smtClean="0"/>
-              <a:t>21.10.2021</a:t>
+              <a:t>22.10.2021</a:t>
             </a:fld>
             <a:endParaRPr lang="de-DE"/>
           </a:p>
@@ -6317,7 +6375,7 @@
           <a:p>
             <a:fld id="{F0E51C7C-CEA3-4CAA-BE4B-344879E7C377}" type="datetimeFigureOut">
               <a:rPr lang="de-DE" smtClean="0"/>
-              <a:t>21.10.2021</a:t>
+              <a:t>22.10.2021</a:t>
             </a:fld>
             <a:endParaRPr lang="de-DE"/>
           </a:p>
@@ -6530,7 +6588,7 @@
           <a:p>
             <a:fld id="{F0E51C7C-CEA3-4CAA-BE4B-344879E7C377}" type="datetimeFigureOut">
               <a:rPr lang="de-DE" smtClean="0"/>
-              <a:t>21.10.2021</a:t>
+              <a:t>22.10.2021</a:t>
             </a:fld>
             <a:endParaRPr lang="de-DE"/>
           </a:p>
@@ -10576,7 +10634,7 @@
           <a:lstStyle/>
           <a:p>
             <a:r>
-              <a:rPr lang="en-US" sz="4000" b="1" kern="1200">
+              <a:rPr lang="pt-BR" sz="4000" b="1" kern="1200" dirty="0">
                 <a:solidFill>
                   <a:srgbClr val="FFFFFF"/>
                 </a:solidFill>
@@ -10587,7 +10645,7 @@
               <a:t>Volume da embalagem </a:t>
             </a:r>
             <a:r>
-              <a:rPr lang="en-US" sz="4000" kern="1200">
+              <a:rPr lang="pt-BR" sz="4000" kern="1200" dirty="0">
                 <a:solidFill>
                   <a:srgbClr val="FFFFFF"/>
                 </a:solidFill>
@@ -10595,211 +10653,30 @@
                 <a:ea typeface="+mj-ea"/>
                 <a:cs typeface="+mj-cs"/>
               </a:rPr>
-              <a:t>["Container Size"]</a:t>
-            </a:r>
-          </a:p>
-        </p:txBody>
-      </p:sp>
-      <p:sp>
-        <p:nvSpPr>
-          <p:cNvPr id="3" name="Espaço Reservado para Conteúdo 2">
-            <a:extLst>
-              <a:ext uri="{FF2B5EF4-FFF2-40B4-BE49-F238E27FC236}">
-                <a16:creationId xmlns:a16="http://schemas.microsoft.com/office/drawing/2014/main" id="{D4DF4DBF-8753-4E14-8D9E-9AFF85C214E8}"/>
-              </a:ext>
-            </a:extLst>
-          </p:cNvPr>
-          <p:cNvSpPr>
-            <a:spLocks noGrp="1"/>
-          </p:cNvSpPr>
-          <p:nvPr>
-            <p:ph idx="1"/>
-          </p:nvPr>
-        </p:nvSpPr>
-        <p:spPr>
-          <a:xfrm>
-            <a:off x="4380855" y="1412489"/>
-            <a:ext cx="3427283" cy="4363844"/>
-          </a:xfrm>
-        </p:spPr>
-        <p:txBody>
-          <a:bodyPr vert="horz" lIns="91440" tIns="45720" rIns="91440" bIns="45720" rtlCol="0" anchor="t">
-            <a:normAutofit/>
-          </a:bodyPr>
-          <a:lstStyle/>
-          <a:p>
-            <a:pPr marL="0">
-              <a:spcBef>
-                <a:spcPts val="0"/>
-              </a:spcBef>
-              <a:spcAft>
-                <a:spcPts val="600"/>
-              </a:spcAft>
-            </a:pPr>
-            <a:r>
-              <a:rPr lang="en-US" sz="2000"/>
-              <a:t>De 28.316 </a:t>
+              <a:t>["Container </a:t>
             </a:r>
             <a:r>
-              <a:rPr lang="en-US" sz="2000" b="1"/>
-              <a:t>pedidos</a:t>
+              <a:rPr lang="pt-BR" sz="4000" kern="1200" dirty="0" err="1">
+                <a:solidFill>
+                  <a:srgbClr val="FFFFFF"/>
+                </a:solidFill>
+                <a:latin typeface="+mj-lt"/>
+                <a:ea typeface="+mj-ea"/>
+                <a:cs typeface="+mj-cs"/>
+              </a:rPr>
+              <a:t>Size</a:t>
             </a:r>
             <a:r>
-              <a:rPr lang="en-US" sz="2000"/>
-              <a:t>,</a:t>
+              <a:rPr lang="pt-BR" sz="4000" kern="1200" dirty="0">
+                <a:solidFill>
+                  <a:srgbClr val="FFFFFF"/>
+                </a:solidFill>
+                <a:latin typeface="+mj-lt"/>
+                <a:ea typeface="+mj-ea"/>
+                <a:cs typeface="+mj-cs"/>
+              </a:rPr>
+              <a:t>"]</a:t>
             </a:r>
-          </a:p>
-          <a:p>
-            <a:pPr marL="0" indent="0">
-              <a:spcBef>
-                <a:spcPts val="0"/>
-              </a:spcBef>
-              <a:spcAft>
-                <a:spcPts val="600"/>
-              </a:spcAft>
-              <a:buNone/>
-            </a:pPr>
-            <a:r>
-              <a:rPr lang="en-US" sz="2000"/>
-              <a:t>6 l         19.775  0,6984</a:t>
-            </a:r>
-            <a:endParaRPr lang="en-US" sz="2000">
-              <a:cs typeface="Calibri" panose="020F0502020204030204"/>
-            </a:endParaRPr>
-          </a:p>
-          <a:p>
-            <a:pPr marL="0" indent="0">
-              <a:spcBef>
-                <a:spcPts val="0"/>
-              </a:spcBef>
-              <a:spcAft>
-                <a:spcPts val="600"/>
-              </a:spcAft>
-              <a:buNone/>
-            </a:pPr>
-            <a:r>
-              <a:rPr lang="en-US" sz="2000"/>
-              <a:t>330 ml 6.657    0,2351</a:t>
-            </a:r>
-            <a:endParaRPr lang="en-US" sz="2000">
-              <a:cs typeface="Calibri" panose="020F0502020204030204"/>
-            </a:endParaRPr>
-          </a:p>
-          <a:p>
-            <a:pPr marL="0" indent="0">
-              <a:spcBef>
-                <a:spcPts val="0"/>
-              </a:spcBef>
-              <a:spcAft>
-                <a:spcPts val="600"/>
-              </a:spcAft>
-              <a:buNone/>
-            </a:pPr>
-            <a:r>
-              <a:rPr lang="en-US" sz="2000"/>
-              <a:t>355 ml 1.627    0,0575</a:t>
-            </a:r>
-            <a:endParaRPr lang="en-US" sz="2000">
-              <a:cs typeface="Calibri" panose="020F0502020204030204"/>
-            </a:endParaRPr>
-          </a:p>
-          <a:p>
-            <a:pPr marL="0">
-              <a:spcBef>
-                <a:spcPts val="0"/>
-              </a:spcBef>
-              <a:spcAft>
-                <a:spcPts val="600"/>
-              </a:spcAft>
-            </a:pPr>
-            <a:endParaRPr lang="en-US" sz="2000"/>
-          </a:p>
-          <a:p>
-            <a:pPr marL="0">
-              <a:spcBef>
-                <a:spcPts val="0"/>
-              </a:spcBef>
-              <a:spcAft>
-                <a:spcPts val="600"/>
-              </a:spcAft>
-            </a:pPr>
-            <a:r>
-              <a:rPr lang="en-US" sz="2000"/>
-              <a:t>Do </a:t>
-            </a:r>
-            <a:r>
-              <a:rPr lang="en-US" sz="2000" b="1"/>
-              <a:t>volume </a:t>
-            </a:r>
-            <a:r>
-              <a:rPr lang="en-US" sz="2000"/>
-              <a:t>de 1.743.298 ordens com marcas,</a:t>
-            </a:r>
-          </a:p>
-          <a:p>
-            <a:pPr marL="0" indent="0">
-              <a:spcBef>
-                <a:spcPts val="0"/>
-              </a:spcBef>
-              <a:spcAft>
-                <a:spcPts val="600"/>
-              </a:spcAft>
-              <a:buNone/>
-            </a:pPr>
-            <a:r>
-              <a:rPr lang="en-US" sz="2000"/>
-              <a:t>6 l          1.460.659  0,8379</a:t>
-            </a:r>
-            <a:endParaRPr lang="en-US" sz="2000">
-              <a:cs typeface="Calibri" panose="020F0502020204030204"/>
-            </a:endParaRPr>
-          </a:p>
-          <a:p>
-            <a:pPr marL="0" indent="0">
-              <a:spcBef>
-                <a:spcPts val="0"/>
-              </a:spcBef>
-              <a:spcAft>
-                <a:spcPts val="600"/>
-              </a:spcAft>
-              <a:buNone/>
-            </a:pPr>
-            <a:r>
-              <a:rPr lang="en-US" sz="2000"/>
-              <a:t>330 ml     174.620  0,1002</a:t>
-            </a:r>
-            <a:endParaRPr lang="en-US" sz="2000">
-              <a:cs typeface="Calibri" panose="020F0502020204030204"/>
-            </a:endParaRPr>
-          </a:p>
-          <a:p>
-            <a:pPr marL="0" indent="0">
-              <a:spcBef>
-                <a:spcPts val="0"/>
-              </a:spcBef>
-              <a:spcAft>
-                <a:spcPts val="600"/>
-              </a:spcAft>
-              <a:buNone/>
-            </a:pPr>
-            <a:r>
-              <a:rPr lang="en-US" sz="2000"/>
-              <a:t>355 ml       80.056  0,0459</a:t>
-            </a:r>
-            <a:endParaRPr lang="en-US" sz="2000">
-              <a:cs typeface="Calibri" panose="020F0502020204030204"/>
-            </a:endParaRPr>
-          </a:p>
-          <a:p>
-            <a:pPr marL="0">
-              <a:spcBef>
-                <a:spcPts val="0"/>
-              </a:spcBef>
-              <a:spcAft>
-                <a:spcPts val="600"/>
-              </a:spcAft>
-            </a:pPr>
-            <a:endParaRPr lang="en-US" sz="2000"/>
           </a:p>
         </p:txBody>
       </p:sp>
@@ -10858,215 +10735,1146 @@
           </a:fontRef>
         </p:style>
       </p:cxnSp>
-      <p:sp>
-        <p:nvSpPr>
-          <p:cNvPr id="6" name="CaixaDeTexto 5">
+      <p:graphicFrame>
+        <p:nvGraphicFramePr>
+          <p:cNvPr id="4" name="Tabela 4">
             <a:extLst>
               <a:ext uri="{FF2B5EF4-FFF2-40B4-BE49-F238E27FC236}">
-                <a16:creationId xmlns:a16="http://schemas.microsoft.com/office/drawing/2014/main" id="{994E4428-610E-46F4-B0F0-886C6C425915}"/>
+                <a16:creationId xmlns:a16="http://schemas.microsoft.com/office/drawing/2014/main" id="{2E2099D9-0C6E-49B7-9B39-DEDEA2B3F654}"/>
               </a:ext>
             </a:extLst>
           </p:cNvPr>
-          <p:cNvSpPr txBox="1"/>
-          <p:nvPr/>
-        </p:nvSpPr>
-        <p:spPr>
-          <a:xfrm>
-            <a:off x="8451604" y="1412489"/>
-            <a:ext cx="3197701" cy="4363844"/>
-          </a:xfrm>
-          <a:prstGeom prst="rect">
-            <a:avLst/>
-          </a:prstGeom>
-        </p:spPr>
-        <p:txBody>
-          <a:bodyPr rot="0" spcFirstLastPara="0" vertOverflow="overflow" horzOverflow="overflow" vert="horz" lIns="91440" tIns="45720" rIns="91440" bIns="45720" numCol="1" spcCol="0" rtlCol="0" fromWordArt="0" anchor="t" anchorCtr="0" forceAA="0" compatLnSpc="1">
-            <a:prstTxWarp prst="textNoShape">
-              <a:avLst/>
-            </a:prstTxWarp>
-            <a:normAutofit/>
-          </a:bodyPr>
-          <a:lstStyle/>
-          <a:p>
-            <a:pPr indent="-228600">
-              <a:lnSpc>
-                <a:spcPct val="90000"/>
-              </a:lnSpc>
-              <a:spcAft>
-                <a:spcPts val="600"/>
-              </a:spcAft>
-              <a:buFont typeface="Arial" panose="020B0604020202020204" pitchFamily="34" charset="0"/>
-              <a:buChar char="•"/>
-            </a:pPr>
-            <a:r>
-              <a:rPr lang="en-US" sz="2000"/>
-              <a:t>De 2.963.644 </a:t>
-            </a:r>
-            <a:r>
-              <a:rPr lang="en-US" sz="2000" b="1"/>
-              <a:t>peças </a:t>
-            </a:r>
-            <a:r>
-              <a:rPr lang="en-US" sz="2000"/>
-              <a:t>entregues,</a:t>
-            </a:r>
-            <a:endParaRPr lang="en-US" sz="2000">
-              <a:cs typeface="Calibri" panose="020F0502020204030204"/>
-            </a:endParaRPr>
-          </a:p>
-          <a:p>
-            <a:pPr>
-              <a:lnSpc>
-                <a:spcPct val="90000"/>
-              </a:lnSpc>
-              <a:spcAft>
-                <a:spcPts val="600"/>
-              </a:spcAft>
-            </a:pPr>
-            <a:r>
-              <a:rPr lang="en-US" sz="2000"/>
-              <a:t>6 l          2.466.967  0,8324 </a:t>
-            </a:r>
-            <a:endParaRPr lang="en-US" sz="2000">
-              <a:cs typeface="Calibri" panose="020F0502020204030204"/>
-            </a:endParaRPr>
-          </a:p>
-          <a:p>
-            <a:pPr>
-              <a:lnSpc>
-                <a:spcPct val="90000"/>
-              </a:lnSpc>
-              <a:spcAft>
-                <a:spcPts val="600"/>
-              </a:spcAft>
-            </a:pPr>
-            <a:r>
-              <a:rPr lang="en-US" sz="2000"/>
-              <a:t>330 ml     296.085  0,0999 </a:t>
-            </a:r>
-            <a:endParaRPr lang="en-US" sz="2000">
-              <a:cs typeface="Calibri" panose="020F0502020204030204"/>
-            </a:endParaRPr>
-          </a:p>
-          <a:p>
-            <a:pPr>
-              <a:lnSpc>
-                <a:spcPct val="90000"/>
-              </a:lnSpc>
-              <a:spcAft>
-                <a:spcPts val="600"/>
-              </a:spcAft>
-            </a:pPr>
-            <a:r>
-              <a:rPr lang="en-US" sz="2000"/>
-              <a:t>355 ml     147.494  0,0498 </a:t>
-            </a:r>
-            <a:endParaRPr lang="en-US" sz="2000">
-              <a:cs typeface="Calibri" panose="020F0502020204030204"/>
-            </a:endParaRPr>
-          </a:p>
-          <a:p>
-            <a:pPr indent="-228600">
-              <a:lnSpc>
-                <a:spcPct val="90000"/>
-              </a:lnSpc>
-              <a:spcAft>
-                <a:spcPts val="600"/>
-              </a:spcAft>
-              <a:buFont typeface="Arial" panose="020B0604020202020204" pitchFamily="34" charset="0"/>
-              <a:buChar char="•"/>
-            </a:pPr>
-            <a:endParaRPr lang="en-US" sz="2000" b="1"/>
-          </a:p>
-          <a:p>
-            <a:pPr indent="-228600">
-              <a:lnSpc>
-                <a:spcPct val="90000"/>
-              </a:lnSpc>
-              <a:spcAft>
-                <a:spcPts val="600"/>
-              </a:spcAft>
-              <a:buFont typeface="Arial" panose="020B0604020202020204" pitchFamily="34" charset="0"/>
-              <a:buChar char="•"/>
-            </a:pPr>
-            <a:r>
-              <a:rPr lang="en-US" sz="2000" b="1"/>
-              <a:t>Relação </a:t>
-            </a:r>
-            <a:r>
-              <a:rPr lang="en-US" sz="2000"/>
-              <a:t>da quantidade de </a:t>
-            </a:r>
-            <a:r>
-              <a:rPr lang="en-US" sz="2000" b="1"/>
-              <a:t>peças</a:t>
-            </a:r>
-            <a:r>
-              <a:rPr lang="en-US" sz="2000"/>
-              <a:t> entregues com a quantidade de </a:t>
-            </a:r>
-            <a:r>
-              <a:rPr lang="en-US" sz="2000" b="1"/>
-              <a:t>ordens</a:t>
-            </a:r>
-            <a:r>
-              <a:rPr lang="en-US" sz="2000"/>
-              <a:t>:</a:t>
-            </a:r>
-          </a:p>
-          <a:p>
-            <a:pPr>
-              <a:lnSpc>
-                <a:spcPct val="90000"/>
-              </a:lnSpc>
-              <a:spcAft>
-                <a:spcPts val="600"/>
-              </a:spcAft>
-            </a:pPr>
-            <a:r>
-              <a:rPr lang="en-US" sz="2000"/>
-              <a:t>6 l         = 1,6889</a:t>
-            </a:r>
-            <a:endParaRPr lang="en-US" sz="2000">
-              <a:cs typeface="Calibri" panose="020F0502020204030204"/>
-            </a:endParaRPr>
-          </a:p>
-          <a:p>
-            <a:pPr>
-              <a:lnSpc>
-                <a:spcPct val="90000"/>
-              </a:lnSpc>
-              <a:spcAft>
-                <a:spcPts val="600"/>
-              </a:spcAft>
-            </a:pPr>
-            <a:r>
-              <a:rPr lang="en-US" sz="2000"/>
-              <a:t>330 ml = 1,6956</a:t>
-            </a:r>
-            <a:endParaRPr lang="en-US" sz="2000">
-              <a:cs typeface="Calibri" panose="020F0502020204030204"/>
-            </a:endParaRPr>
-          </a:p>
-          <a:p>
-            <a:pPr>
-              <a:lnSpc>
-                <a:spcPct val="90000"/>
-              </a:lnSpc>
-              <a:spcAft>
-                <a:spcPts val="600"/>
-              </a:spcAft>
-            </a:pPr>
-            <a:r>
-              <a:rPr lang="en-US" sz="2000"/>
-              <a:t>355 ml = 1,8424</a:t>
-            </a:r>
-            <a:endParaRPr lang="en-US" sz="2000">
-              <a:cs typeface="Calibri" panose="020F0502020204030204"/>
-            </a:endParaRPr>
-          </a:p>
-        </p:txBody>
-      </p:sp>
+          <p:cNvGraphicFramePr>
+            <a:graphicFrameLocks noGrp="1"/>
+          </p:cNvGraphicFramePr>
+          <p:nvPr>
+            <p:extLst>
+              <p:ext uri="{D42A27DB-BD31-4B8C-83A1-F6EECF244321}">
+                <p14:modId xmlns:p14="http://schemas.microsoft.com/office/powerpoint/2010/main" val="1150243029"/>
+              </p:ext>
+            </p:extLst>
+          </p:nvPr>
+        </p:nvGraphicFramePr>
+        <p:xfrm>
+          <a:off x="4130386" y="926522"/>
+          <a:ext cx="3934215" cy="1922330"/>
+        </p:xfrm>
+        <a:graphic>
+          <a:graphicData uri="http://schemas.openxmlformats.org/drawingml/2006/table">
+            <a:tbl>
+              <a:tblPr firstRow="1" bandRow="1">
+                <a:tableStyleId>{793D81CF-94F2-401A-BA57-92F5A7B2D0C5}</a:tableStyleId>
+              </a:tblPr>
+              <a:tblGrid>
+                <a:gridCol w="1311404">
+                  <a:extLst>
+                    <a:ext uri="{9D8B030D-6E8A-4147-A177-3AD203B41FA5}">
+                      <a16:colId xmlns:a16="http://schemas.microsoft.com/office/drawing/2014/main" val="3472440766"/>
+                    </a:ext>
+                  </a:extLst>
+                </a:gridCol>
+                <a:gridCol w="1005693">
+                  <a:extLst>
+                    <a:ext uri="{9D8B030D-6E8A-4147-A177-3AD203B41FA5}">
+                      <a16:colId xmlns:a16="http://schemas.microsoft.com/office/drawing/2014/main" val="1281881764"/>
+                    </a:ext>
+                  </a:extLst>
+                </a:gridCol>
+                <a:gridCol w="1617118">
+                  <a:extLst>
+                    <a:ext uri="{9D8B030D-6E8A-4147-A177-3AD203B41FA5}">
+                      <a16:colId xmlns:a16="http://schemas.microsoft.com/office/drawing/2014/main" val="3296932850"/>
+                    </a:ext>
+                  </a:extLst>
+                </a:gridCol>
+              </a:tblGrid>
+              <a:tr h="710625">
+                <a:tc>
+                  <a:txBody>
+                    <a:bodyPr/>
+                    <a:lstStyle/>
+                    <a:p>
+                      <a:r>
+                        <a:rPr lang="pt-BR" dirty="0"/>
+                        <a:t>De 28.316 </a:t>
+                      </a:r>
+                      <a:r>
+                        <a:rPr lang="pt-BR" u="sng" dirty="0"/>
+                        <a:t>pedidos</a:t>
+                      </a:r>
+                      <a:r>
+                        <a:rPr lang="pt-BR" dirty="0"/>
+                        <a:t>,</a:t>
+                      </a:r>
+                    </a:p>
+                  </a:txBody>
+                  <a:tcPr/>
+                </a:tc>
+                <a:tc>
+                  <a:txBody>
+                    <a:bodyPr/>
+                    <a:lstStyle/>
+                    <a:p>
+                      <a:r>
+                        <a:rPr lang="pt-BR" dirty="0"/>
+                        <a:t>Volume</a:t>
+                      </a:r>
+                    </a:p>
+                  </a:txBody>
+                  <a:tcPr/>
+                </a:tc>
+                <a:tc>
+                  <a:txBody>
+                    <a:bodyPr/>
+                    <a:lstStyle/>
+                    <a:p>
+                      <a:r>
+                        <a:rPr lang="pt-BR" dirty="0"/>
+                        <a:t>Contribuição percentual</a:t>
+                      </a:r>
+                    </a:p>
+                  </a:txBody>
+                  <a:tcPr/>
+                </a:tc>
+                <a:extLst>
+                  <a:ext uri="{0D108BD9-81ED-4DB2-BD59-A6C34878D82A}">
+                    <a16:rowId xmlns:a16="http://schemas.microsoft.com/office/drawing/2014/main" val="4026858874"/>
+                  </a:ext>
+                </a:extLst>
+              </a:tr>
+              <a:tr h="409975">
+                <a:tc>
+                  <a:txBody>
+                    <a:bodyPr/>
+                    <a:lstStyle/>
+                    <a:p>
+                      <a:pPr lvl="0">
+                        <a:buNone/>
+                      </a:pPr>
+                      <a:r>
+                        <a:rPr lang="en-US" sz="1800" u="none" strike="noStrike" noProof="0" dirty="0"/>
+                        <a:t>19.775</a:t>
+                      </a:r>
+                      <a:endParaRPr lang="pt-BR" dirty="0"/>
+                    </a:p>
+                  </a:txBody>
+                  <a:tcPr/>
+                </a:tc>
+                <a:tc>
+                  <a:txBody>
+                    <a:bodyPr/>
+                    <a:lstStyle/>
+                    <a:p>
+                      <a:pPr algn="r"/>
+                      <a:r>
+                        <a:rPr lang="pt-BR" dirty="0"/>
+                        <a:t>6 L</a:t>
+                      </a:r>
+                    </a:p>
+                  </a:txBody>
+                  <a:tcPr/>
+                </a:tc>
+                <a:tc>
+                  <a:txBody>
+                    <a:bodyPr/>
+                    <a:lstStyle/>
+                    <a:p>
+                      <a:pPr algn="r"/>
+                      <a:r>
+                        <a:rPr lang="pt-BR" dirty="0"/>
+                        <a:t>0,6984</a:t>
+                      </a:r>
+                    </a:p>
+                  </a:txBody>
+                  <a:tcPr/>
+                </a:tc>
+                <a:extLst>
+                  <a:ext uri="{0D108BD9-81ED-4DB2-BD59-A6C34878D82A}">
+                    <a16:rowId xmlns:a16="http://schemas.microsoft.com/office/drawing/2014/main" val="1148270337"/>
+                  </a:ext>
+                </a:extLst>
+              </a:tr>
+              <a:tr h="400865">
+                <a:tc>
+                  <a:txBody>
+                    <a:bodyPr/>
+                    <a:lstStyle/>
+                    <a:p>
+                      <a:pPr lvl="0">
+                        <a:buNone/>
+                      </a:pPr>
+                      <a:r>
+                        <a:rPr lang="en-US" sz="1800" u="none" strike="noStrike" noProof="0" dirty="0"/>
+                        <a:t>6.657</a:t>
+                      </a:r>
+                      <a:endParaRPr lang="pt-BR" dirty="0"/>
+                    </a:p>
+                  </a:txBody>
+                  <a:tcPr/>
+                </a:tc>
+                <a:tc>
+                  <a:txBody>
+                    <a:bodyPr/>
+                    <a:lstStyle/>
+                    <a:p>
+                      <a:pPr algn="r"/>
+                      <a:r>
+                        <a:rPr lang="pt-BR" dirty="0"/>
+                        <a:t>330ml</a:t>
+                      </a:r>
+                    </a:p>
+                  </a:txBody>
+                  <a:tcPr/>
+                </a:tc>
+                <a:tc>
+                  <a:txBody>
+                    <a:bodyPr/>
+                    <a:lstStyle/>
+                    <a:p>
+                      <a:pPr algn="r"/>
+                      <a:r>
+                        <a:rPr lang="pt-BR" dirty="0"/>
+                        <a:t>0,2351</a:t>
+                      </a:r>
+                    </a:p>
+                  </a:txBody>
+                  <a:tcPr/>
+                </a:tc>
+                <a:extLst>
+                  <a:ext uri="{0D108BD9-81ED-4DB2-BD59-A6C34878D82A}">
+                    <a16:rowId xmlns:a16="http://schemas.microsoft.com/office/drawing/2014/main" val="2052215081"/>
+                  </a:ext>
+                </a:extLst>
+              </a:tr>
+              <a:tr h="400865">
+                <a:tc>
+                  <a:txBody>
+                    <a:bodyPr/>
+                    <a:lstStyle/>
+                    <a:p>
+                      <a:pPr lvl="0">
+                        <a:buNone/>
+                      </a:pPr>
+                      <a:r>
+                        <a:rPr lang="en-US" sz="1800" u="none" strike="noStrike" noProof="0" dirty="0"/>
+                        <a:t>1.627</a:t>
+                      </a:r>
+                      <a:endParaRPr lang="pt-BR" dirty="0"/>
+                    </a:p>
+                  </a:txBody>
+                  <a:tcPr/>
+                </a:tc>
+                <a:tc>
+                  <a:txBody>
+                    <a:bodyPr/>
+                    <a:lstStyle/>
+                    <a:p>
+                      <a:pPr algn="r"/>
+                      <a:r>
+                        <a:rPr lang="pt-BR" dirty="0"/>
+                        <a:t>355ml</a:t>
+                      </a:r>
+                    </a:p>
+                  </a:txBody>
+                  <a:tcPr/>
+                </a:tc>
+                <a:tc>
+                  <a:txBody>
+                    <a:bodyPr/>
+                    <a:lstStyle/>
+                    <a:p>
+                      <a:pPr algn="r"/>
+                      <a:r>
+                        <a:rPr lang="pt-BR" dirty="0"/>
+                        <a:t>0,0575</a:t>
+                      </a:r>
+                    </a:p>
+                  </a:txBody>
+                  <a:tcPr/>
+                </a:tc>
+                <a:extLst>
+                  <a:ext uri="{0D108BD9-81ED-4DB2-BD59-A6C34878D82A}">
+                    <a16:rowId xmlns:a16="http://schemas.microsoft.com/office/drawing/2014/main" val="3806463402"/>
+                  </a:ext>
+                </a:extLst>
+              </a:tr>
+            </a:tbl>
+          </a:graphicData>
+        </a:graphic>
+      </p:graphicFrame>
+      <p:graphicFrame>
+        <p:nvGraphicFramePr>
+          <p:cNvPr id="8" name="Tabela 7">
+            <a:extLst>
+              <a:ext uri="{FF2B5EF4-FFF2-40B4-BE49-F238E27FC236}">
+                <a16:creationId xmlns:a16="http://schemas.microsoft.com/office/drawing/2014/main" id="{C75FEEFF-9516-4300-8993-205E2E8D3784}"/>
+              </a:ext>
+            </a:extLst>
+          </p:cNvPr>
+          <p:cNvGraphicFramePr>
+            <a:graphicFrameLocks noGrp="1"/>
+          </p:cNvGraphicFramePr>
+          <p:nvPr>
+            <p:extLst>
+              <p:ext uri="{D42A27DB-BD31-4B8C-83A1-F6EECF244321}">
+                <p14:modId xmlns:p14="http://schemas.microsoft.com/office/powerpoint/2010/main" val="1098084468"/>
+              </p:ext>
+            </p:extLst>
+          </p:nvPr>
+        </p:nvGraphicFramePr>
+        <p:xfrm>
+          <a:off x="4113068" y="2961409"/>
+          <a:ext cx="7973332" cy="1863834"/>
+        </p:xfrm>
+        <a:graphic>
+          <a:graphicData uri="http://schemas.openxmlformats.org/drawingml/2006/table">
+            <a:tbl>
+              <a:tblPr firstRow="1" bandRow="1">
+                <a:tableStyleId>{793D81CF-94F2-401A-BA57-92F5A7B2D0C5}</a:tableStyleId>
+              </a:tblPr>
+              <a:tblGrid>
+                <a:gridCol w="3296764">
+                  <a:extLst>
+                    <a:ext uri="{9D8B030D-6E8A-4147-A177-3AD203B41FA5}">
+                      <a16:colId xmlns:a16="http://schemas.microsoft.com/office/drawing/2014/main" val="3485899939"/>
+                    </a:ext>
+                  </a:extLst>
+                </a:gridCol>
+                <a:gridCol w="1872013">
+                  <a:extLst>
+                    <a:ext uri="{9D8B030D-6E8A-4147-A177-3AD203B41FA5}">
+                      <a16:colId xmlns:a16="http://schemas.microsoft.com/office/drawing/2014/main" val="1936703294"/>
+                    </a:ext>
+                  </a:extLst>
+                </a:gridCol>
+                <a:gridCol w="2804555">
+                  <a:extLst>
+                    <a:ext uri="{9D8B030D-6E8A-4147-A177-3AD203B41FA5}">
+                      <a16:colId xmlns:a16="http://schemas.microsoft.com/office/drawing/2014/main" val="850656559"/>
+                    </a:ext>
+                  </a:extLst>
+                </a:gridCol>
+              </a:tblGrid>
+              <a:tr h="407918">
+                <a:tc>
+                  <a:txBody>
+                    <a:bodyPr/>
+                    <a:lstStyle/>
+                    <a:p>
+                      <a:pPr algn="l" rtl="0" fontAlgn="base"/>
+                      <a:r>
+                        <a:rPr lang="pt-BR" dirty="0">
+                          <a:effectLst/>
+                        </a:rPr>
+                        <a:t>De 1.743.298 </a:t>
+                      </a:r>
+                      <a:r>
+                        <a:rPr lang="pt-BR" u="sng" dirty="0">
+                          <a:effectLst/>
+                        </a:rPr>
+                        <a:t>ordens com marcas</a:t>
+                      </a:r>
+                      <a:r>
+                        <a:rPr lang="pt-BR" dirty="0">
+                          <a:effectLst/>
+                        </a:rPr>
+                        <a:t>,​</a:t>
+                      </a:r>
+                      <a:endParaRPr lang="pt-BR">
+                        <a:effectLst/>
+                      </a:endParaRPr>
+                    </a:p>
+                  </a:txBody>
+                  <a:tcPr/>
+                </a:tc>
+                <a:tc>
+                  <a:txBody>
+                    <a:bodyPr/>
+                    <a:lstStyle/>
+                    <a:p>
+                      <a:pPr algn="l" rtl="0" fontAlgn="base"/>
+                      <a:r>
+                        <a:rPr lang="pt-BR" dirty="0">
+                          <a:effectLst/>
+                        </a:rPr>
+                        <a:t>Volume​</a:t>
+                      </a:r>
+                      <a:endParaRPr lang="pt-BR">
+                        <a:effectLst/>
+                      </a:endParaRPr>
+                    </a:p>
+                  </a:txBody>
+                  <a:tcPr/>
+                </a:tc>
+                <a:tc>
+                  <a:txBody>
+                    <a:bodyPr/>
+                    <a:lstStyle/>
+                    <a:p>
+                      <a:pPr algn="l" rtl="0" fontAlgn="base"/>
+                      <a:r>
+                        <a:rPr lang="pt-BR" dirty="0">
+                          <a:effectLst/>
+                        </a:rPr>
+                        <a:t>Contribuição  percentual​</a:t>
+                      </a:r>
+                      <a:endParaRPr lang="pt-BR">
+                        <a:effectLst/>
+                      </a:endParaRPr>
+                    </a:p>
+                  </a:txBody>
+                  <a:tcPr/>
+                </a:tc>
+                <a:extLst>
+                  <a:ext uri="{0D108BD9-81ED-4DB2-BD59-A6C34878D82A}">
+                    <a16:rowId xmlns:a16="http://schemas.microsoft.com/office/drawing/2014/main" val="677062704"/>
+                  </a:ext>
+                </a:extLst>
+              </a:tr>
+              <a:tr h="407918">
+                <a:tc>
+                  <a:txBody>
+                    <a:bodyPr/>
+                    <a:lstStyle/>
+                    <a:p>
+                      <a:pPr lvl="0" algn="l">
+                        <a:buNone/>
+                      </a:pPr>
+                      <a:r>
+                        <a:rPr lang="en-US" sz="1800" u="none" strike="noStrike" noProof="0" dirty="0">
+                          <a:effectLst/>
+                        </a:rPr>
+                        <a:t>1.460.659</a:t>
+                      </a:r>
+                      <a:endParaRPr lang="pt-BR" dirty="0"/>
+                    </a:p>
+                  </a:txBody>
+                  <a:tcPr/>
+                </a:tc>
+                <a:tc>
+                  <a:txBody>
+                    <a:bodyPr/>
+                    <a:lstStyle/>
+                    <a:p>
+                      <a:pPr algn="r" rtl="0" fontAlgn="base"/>
+                      <a:r>
+                        <a:rPr lang="pt-BR" dirty="0">
+                          <a:effectLst/>
+                        </a:rPr>
+                        <a:t>6 L​</a:t>
+                      </a:r>
+                      <a:endParaRPr lang="pt-BR">
+                        <a:effectLst/>
+                      </a:endParaRPr>
+                    </a:p>
+                  </a:txBody>
+                  <a:tcPr/>
+                </a:tc>
+                <a:tc>
+                  <a:txBody>
+                    <a:bodyPr/>
+                    <a:lstStyle/>
+                    <a:p>
+                      <a:pPr lvl="0" algn="r">
+                        <a:buNone/>
+                      </a:pPr>
+                      <a:r>
+                        <a:rPr lang="en-US" sz="1800" u="none" strike="noStrike" noProof="0" dirty="0">
+                          <a:effectLst/>
+                        </a:rPr>
+                        <a:t>0,8379</a:t>
+                      </a:r>
+                      <a:endParaRPr lang="pt-BR" dirty="0"/>
+                    </a:p>
+                  </a:txBody>
+                  <a:tcPr/>
+                </a:tc>
+                <a:extLst>
+                  <a:ext uri="{0D108BD9-81ED-4DB2-BD59-A6C34878D82A}">
+                    <a16:rowId xmlns:a16="http://schemas.microsoft.com/office/drawing/2014/main" val="4248789742"/>
+                  </a:ext>
+                </a:extLst>
+              </a:tr>
+              <a:tr h="407918">
+                <a:tc>
+                  <a:txBody>
+                    <a:bodyPr/>
+                    <a:lstStyle/>
+                    <a:p>
+                      <a:pPr lvl="0" algn="l">
+                        <a:buNone/>
+                      </a:pPr>
+                      <a:r>
+                        <a:rPr lang="en-US" sz="1800" u="none" strike="noStrike" noProof="0" dirty="0">
+                          <a:effectLst/>
+                        </a:rPr>
+                        <a:t>174.620</a:t>
+                      </a:r>
+                      <a:endParaRPr lang="pt-BR" dirty="0"/>
+                    </a:p>
+                  </a:txBody>
+                  <a:tcPr/>
+                </a:tc>
+                <a:tc>
+                  <a:txBody>
+                    <a:bodyPr/>
+                    <a:lstStyle/>
+                    <a:p>
+                      <a:pPr algn="r" rtl="0" fontAlgn="base"/>
+                      <a:r>
+                        <a:rPr lang="pt-BR" dirty="0">
+                          <a:effectLst/>
+                        </a:rPr>
+                        <a:t>330ml​</a:t>
+                      </a:r>
+                      <a:endParaRPr lang="pt-BR">
+                        <a:effectLst/>
+                      </a:endParaRPr>
+                    </a:p>
+                  </a:txBody>
+                  <a:tcPr/>
+                </a:tc>
+                <a:tc>
+                  <a:txBody>
+                    <a:bodyPr/>
+                    <a:lstStyle/>
+                    <a:p>
+                      <a:pPr lvl="0" algn="r">
+                        <a:buNone/>
+                      </a:pPr>
+                      <a:r>
+                        <a:rPr lang="en-US" sz="1800" u="none" strike="noStrike" noProof="0" dirty="0">
+                          <a:effectLst/>
+                        </a:rPr>
+                        <a:t>0,1002</a:t>
+                      </a:r>
+                      <a:endParaRPr lang="pt-BR" dirty="0"/>
+                    </a:p>
+                  </a:txBody>
+                  <a:tcPr/>
+                </a:tc>
+                <a:extLst>
+                  <a:ext uri="{0D108BD9-81ED-4DB2-BD59-A6C34878D82A}">
+                    <a16:rowId xmlns:a16="http://schemas.microsoft.com/office/drawing/2014/main" val="3872807777"/>
+                  </a:ext>
+                </a:extLst>
+              </a:tr>
+              <a:tr h="407918">
+                <a:tc>
+                  <a:txBody>
+                    <a:bodyPr/>
+                    <a:lstStyle/>
+                    <a:p>
+                      <a:pPr lvl="0" algn="l">
+                        <a:buNone/>
+                      </a:pPr>
+                      <a:r>
+                        <a:rPr lang="en-US" sz="1800" u="none" strike="noStrike" noProof="0" dirty="0">
+                          <a:effectLst/>
+                        </a:rPr>
+                        <a:t>80.056</a:t>
+                      </a:r>
+                      <a:endParaRPr lang="pt-BR" dirty="0"/>
+                    </a:p>
+                  </a:txBody>
+                  <a:tcPr/>
+                </a:tc>
+                <a:tc>
+                  <a:txBody>
+                    <a:bodyPr/>
+                    <a:lstStyle/>
+                    <a:p>
+                      <a:pPr algn="r" rtl="0" fontAlgn="base"/>
+                      <a:r>
+                        <a:rPr lang="pt-BR" dirty="0">
+                          <a:effectLst/>
+                        </a:rPr>
+                        <a:t>355ml​</a:t>
+                      </a:r>
+                      <a:endParaRPr lang="pt-BR">
+                        <a:effectLst/>
+                      </a:endParaRPr>
+                    </a:p>
+                  </a:txBody>
+                  <a:tcPr/>
+                </a:tc>
+                <a:tc>
+                  <a:txBody>
+                    <a:bodyPr/>
+                    <a:lstStyle/>
+                    <a:p>
+                      <a:pPr lvl="0" algn="r">
+                        <a:buNone/>
+                      </a:pPr>
+                      <a:r>
+                        <a:rPr lang="en-US" sz="1800" u="none" strike="noStrike" noProof="0" dirty="0">
+                          <a:effectLst/>
+                        </a:rPr>
+                        <a:t>0,0459</a:t>
+                      </a:r>
+                      <a:endParaRPr lang="pt-BR" dirty="0"/>
+                    </a:p>
+                  </a:txBody>
+                  <a:tcPr/>
+                </a:tc>
+                <a:extLst>
+                  <a:ext uri="{0D108BD9-81ED-4DB2-BD59-A6C34878D82A}">
+                    <a16:rowId xmlns:a16="http://schemas.microsoft.com/office/drawing/2014/main" val="1294236359"/>
+                  </a:ext>
+                </a:extLst>
+              </a:tr>
+            </a:tbl>
+          </a:graphicData>
+        </a:graphic>
+      </p:graphicFrame>
+      <p:graphicFrame>
+        <p:nvGraphicFramePr>
+          <p:cNvPr id="13" name="Tabela 12">
+            <a:extLst>
+              <a:ext uri="{FF2B5EF4-FFF2-40B4-BE49-F238E27FC236}">
+                <a16:creationId xmlns:a16="http://schemas.microsoft.com/office/drawing/2014/main" id="{E517F5A5-1634-4CEC-B068-A59267B6E111}"/>
+              </a:ext>
+            </a:extLst>
+          </p:cNvPr>
+          <p:cNvGraphicFramePr>
+            <a:graphicFrameLocks noGrp="1"/>
+          </p:cNvGraphicFramePr>
+          <p:nvPr>
+            <p:extLst>
+              <p:ext uri="{D42A27DB-BD31-4B8C-83A1-F6EECF244321}">
+                <p14:modId xmlns:p14="http://schemas.microsoft.com/office/powerpoint/2010/main" val="2468838571"/>
+              </p:ext>
+            </p:extLst>
+          </p:nvPr>
+        </p:nvGraphicFramePr>
+        <p:xfrm>
+          <a:off x="8217477" y="935181"/>
+          <a:ext cx="3841590" cy="1925232"/>
+        </p:xfrm>
+        <a:graphic>
+          <a:graphicData uri="http://schemas.openxmlformats.org/drawingml/2006/table">
+            <a:tbl>
+              <a:tblPr firstRow="1" bandRow="1">
+                <a:tableStyleId>{793D81CF-94F2-401A-BA57-92F5A7B2D0C5}</a:tableStyleId>
+              </a:tblPr>
+              <a:tblGrid>
+                <a:gridCol w="1613815">
+                  <a:extLst>
+                    <a:ext uri="{9D8B030D-6E8A-4147-A177-3AD203B41FA5}">
+                      <a16:colId xmlns:a16="http://schemas.microsoft.com/office/drawing/2014/main" val="2238157720"/>
+                    </a:ext>
+                  </a:extLst>
+                </a:gridCol>
+                <a:gridCol w="844969">
+                  <a:extLst>
+                    <a:ext uri="{9D8B030D-6E8A-4147-A177-3AD203B41FA5}">
+                      <a16:colId xmlns:a16="http://schemas.microsoft.com/office/drawing/2014/main" val="1239546004"/>
+                    </a:ext>
+                  </a:extLst>
+                </a:gridCol>
+                <a:gridCol w="1382806">
+                  <a:extLst>
+                    <a:ext uri="{9D8B030D-6E8A-4147-A177-3AD203B41FA5}">
+                      <a16:colId xmlns:a16="http://schemas.microsoft.com/office/drawing/2014/main" val="3931434634"/>
+                    </a:ext>
+                  </a:extLst>
+                </a:gridCol>
+              </a:tblGrid>
+              <a:tr h="448704">
+                <a:tc>
+                  <a:txBody>
+                    <a:bodyPr/>
+                    <a:lstStyle/>
+                    <a:p>
+                      <a:pPr lvl="0">
+                        <a:buNone/>
+                      </a:pPr>
+                      <a:r>
+                        <a:rPr lang="pt-BR" sz="1600" u="none" strike="noStrike" noProof="0" dirty="0">
+                          <a:effectLst/>
+                        </a:rPr>
+                        <a:t>De 2.963.644</a:t>
+                      </a:r>
+                      <a:endParaRPr lang="pt-BR" sz="1600" u="none" strike="noStrike" noProof="0"/>
+                    </a:p>
+                    <a:p>
+                      <a:pPr lvl="0">
+                        <a:buNone/>
+                      </a:pPr>
+                      <a:r>
+                        <a:rPr lang="pt-BR" sz="1600" u="sng" strike="noStrike" noProof="0" dirty="0">
+                          <a:effectLst/>
+                        </a:rPr>
+                        <a:t>peças</a:t>
+                      </a:r>
+                      <a:r>
+                        <a:rPr lang="pt-BR" sz="1600" u="none" strike="noStrike" noProof="0" dirty="0">
+                          <a:effectLst/>
+                        </a:rPr>
+                        <a:t> entregues,</a:t>
+                      </a:r>
+                      <a:endParaRPr lang="pt-BR" sz="1600" u="none" strike="noStrike" noProof="0" dirty="0"/>
+                    </a:p>
+                  </a:txBody>
+                  <a:tcPr/>
+                </a:tc>
+                <a:tc>
+                  <a:txBody>
+                    <a:bodyPr/>
+                    <a:lstStyle/>
+                    <a:p>
+                      <a:pPr rtl="0" fontAlgn="base"/>
+                      <a:r>
+                        <a:rPr lang="pt-BR" sz="1600" dirty="0">
+                          <a:effectLst/>
+                        </a:rPr>
+                        <a:t>Volume​​</a:t>
+                      </a:r>
+                      <a:endParaRPr lang="pt-BR" sz="1600">
+                        <a:effectLst/>
+                      </a:endParaRPr>
+                    </a:p>
+                  </a:txBody>
+                  <a:tcPr/>
+                </a:tc>
+                <a:tc>
+                  <a:txBody>
+                    <a:bodyPr/>
+                    <a:lstStyle/>
+                    <a:p>
+                      <a:pPr rtl="0" fontAlgn="base"/>
+                      <a:r>
+                        <a:rPr lang="pt-BR" sz="1600" dirty="0">
+                          <a:effectLst/>
+                        </a:rPr>
+                        <a:t>Contribuição  percentual​​</a:t>
+                      </a:r>
+                      <a:endParaRPr lang="pt-BR" sz="1600">
+                        <a:effectLst/>
+                      </a:endParaRPr>
+                    </a:p>
+                  </a:txBody>
+                  <a:tcPr/>
+                </a:tc>
+                <a:extLst>
+                  <a:ext uri="{0D108BD9-81ED-4DB2-BD59-A6C34878D82A}">
+                    <a16:rowId xmlns:a16="http://schemas.microsoft.com/office/drawing/2014/main" val="72499005"/>
+                  </a:ext>
+                </a:extLst>
+              </a:tr>
+              <a:tr h="448704">
+                <a:tc>
+                  <a:txBody>
+                    <a:bodyPr/>
+                    <a:lstStyle/>
+                    <a:p>
+                      <a:pPr lvl="0">
+                        <a:buNone/>
+                      </a:pPr>
+                      <a:r>
+                        <a:rPr lang="en-US" sz="1600" u="none" strike="noStrike" noProof="0" dirty="0">
+                          <a:effectLst/>
+                        </a:rPr>
+                        <a:t>2.466.967</a:t>
+                      </a:r>
+                      <a:endParaRPr lang="en-US" sz="1600">
+                        <a:effectLst/>
+                      </a:endParaRPr>
+                    </a:p>
+                  </a:txBody>
+                  <a:tcPr/>
+                </a:tc>
+                <a:tc>
+                  <a:txBody>
+                    <a:bodyPr/>
+                    <a:lstStyle/>
+                    <a:p>
+                      <a:pPr algn="r" rtl="0" fontAlgn="base"/>
+                      <a:r>
+                        <a:rPr lang="pt-BR" sz="1600" dirty="0">
+                          <a:effectLst/>
+                        </a:rPr>
+                        <a:t>6 L​​</a:t>
+                      </a:r>
+                    </a:p>
+                  </a:txBody>
+                  <a:tcPr/>
+                </a:tc>
+                <a:tc>
+                  <a:txBody>
+                    <a:bodyPr/>
+                    <a:lstStyle/>
+                    <a:p>
+                      <a:pPr lvl="0" algn="r">
+                        <a:buNone/>
+                      </a:pPr>
+                      <a:r>
+                        <a:rPr lang="en-US" sz="1600" u="none" strike="noStrike" noProof="0" dirty="0">
+                          <a:effectLst/>
+                        </a:rPr>
+                        <a:t>0,8324</a:t>
+                      </a:r>
+                      <a:endParaRPr lang="en-US" sz="1600">
+                        <a:effectLst/>
+                      </a:endParaRPr>
+                    </a:p>
+                  </a:txBody>
+                  <a:tcPr/>
+                </a:tc>
+                <a:extLst>
+                  <a:ext uri="{0D108BD9-81ED-4DB2-BD59-A6C34878D82A}">
+                    <a16:rowId xmlns:a16="http://schemas.microsoft.com/office/drawing/2014/main" val="3929265122"/>
+                  </a:ext>
+                </a:extLst>
+              </a:tr>
+              <a:tr h="448704">
+                <a:tc>
+                  <a:txBody>
+                    <a:bodyPr/>
+                    <a:lstStyle/>
+                    <a:p>
+                      <a:pPr lvl="0">
+                        <a:buNone/>
+                      </a:pPr>
+                      <a:r>
+                        <a:rPr lang="en-US" sz="1600" u="none" strike="noStrike" noProof="0" dirty="0">
+                          <a:effectLst/>
+                        </a:rPr>
+                        <a:t>296.085</a:t>
+                      </a:r>
+                      <a:endParaRPr lang="en-US" sz="1600">
+                        <a:effectLst/>
+                      </a:endParaRPr>
+                    </a:p>
+                  </a:txBody>
+                  <a:tcPr/>
+                </a:tc>
+                <a:tc>
+                  <a:txBody>
+                    <a:bodyPr/>
+                    <a:lstStyle/>
+                    <a:p>
+                      <a:pPr algn="r" rtl="0" fontAlgn="base"/>
+                      <a:r>
+                        <a:rPr lang="pt-BR" sz="1600" dirty="0">
+                          <a:effectLst/>
+                        </a:rPr>
+                        <a:t>330ml​​</a:t>
+                      </a:r>
+                    </a:p>
+                  </a:txBody>
+                  <a:tcPr/>
+                </a:tc>
+                <a:tc>
+                  <a:txBody>
+                    <a:bodyPr/>
+                    <a:lstStyle/>
+                    <a:p>
+                      <a:pPr lvl="0" algn="r">
+                        <a:buNone/>
+                      </a:pPr>
+                      <a:r>
+                        <a:rPr lang="en-US" sz="1600" u="none" strike="noStrike" noProof="0" dirty="0">
+                          <a:effectLst/>
+                        </a:rPr>
+                        <a:t>0,0999</a:t>
+                      </a:r>
+                      <a:endParaRPr lang="en-US" sz="1600">
+                        <a:effectLst/>
+                      </a:endParaRPr>
+                    </a:p>
+                  </a:txBody>
+                  <a:tcPr/>
+                </a:tc>
+                <a:extLst>
+                  <a:ext uri="{0D108BD9-81ED-4DB2-BD59-A6C34878D82A}">
+                    <a16:rowId xmlns:a16="http://schemas.microsoft.com/office/drawing/2014/main" val="3860842850"/>
+                  </a:ext>
+                </a:extLst>
+              </a:tr>
+              <a:tr h="448704">
+                <a:tc>
+                  <a:txBody>
+                    <a:bodyPr/>
+                    <a:lstStyle/>
+                    <a:p>
+                      <a:pPr lvl="0">
+                        <a:buNone/>
+                      </a:pPr>
+                      <a:r>
+                        <a:rPr lang="en-US" sz="1600" u="none" strike="noStrike" noProof="0" dirty="0">
+                          <a:effectLst/>
+                        </a:rPr>
+                        <a:t>147.494</a:t>
+                      </a:r>
+                      <a:endParaRPr lang="en-US" sz="1600">
+                        <a:effectLst/>
+                      </a:endParaRPr>
+                    </a:p>
+                  </a:txBody>
+                  <a:tcPr/>
+                </a:tc>
+                <a:tc>
+                  <a:txBody>
+                    <a:bodyPr/>
+                    <a:lstStyle/>
+                    <a:p>
+                      <a:pPr algn="r" rtl="0" fontAlgn="base"/>
+                      <a:r>
+                        <a:rPr lang="pt-BR" sz="1600" dirty="0">
+                          <a:effectLst/>
+                        </a:rPr>
+                        <a:t>355ml​​</a:t>
+                      </a:r>
+                    </a:p>
+                  </a:txBody>
+                  <a:tcPr/>
+                </a:tc>
+                <a:tc>
+                  <a:txBody>
+                    <a:bodyPr/>
+                    <a:lstStyle/>
+                    <a:p>
+                      <a:pPr lvl="0" algn="r">
+                        <a:buNone/>
+                      </a:pPr>
+                      <a:r>
+                        <a:rPr lang="en-US" sz="1600" u="none" strike="noStrike" noProof="0" dirty="0">
+                          <a:effectLst/>
+                        </a:rPr>
+                        <a:t>0,0498</a:t>
+                      </a:r>
+                      <a:endParaRPr lang="en-US" sz="1600">
+                        <a:effectLst/>
+                      </a:endParaRPr>
+                    </a:p>
+                  </a:txBody>
+                  <a:tcPr/>
+                </a:tc>
+                <a:extLst>
+                  <a:ext uri="{0D108BD9-81ED-4DB2-BD59-A6C34878D82A}">
+                    <a16:rowId xmlns:a16="http://schemas.microsoft.com/office/drawing/2014/main" val="2551751640"/>
+                  </a:ext>
+                </a:extLst>
+              </a:tr>
+            </a:tbl>
+          </a:graphicData>
+        </a:graphic>
+      </p:graphicFrame>
+      <p:graphicFrame>
+        <p:nvGraphicFramePr>
+          <p:cNvPr id="17" name="Tabela 17">
+            <a:extLst>
+              <a:ext uri="{FF2B5EF4-FFF2-40B4-BE49-F238E27FC236}">
+                <a16:creationId xmlns:a16="http://schemas.microsoft.com/office/drawing/2014/main" id="{9870980F-455C-48D9-BCB8-9B84B862E7CD}"/>
+              </a:ext>
+            </a:extLst>
+          </p:cNvPr>
+          <p:cNvGraphicFramePr>
+            <a:graphicFrameLocks noGrp="1"/>
+          </p:cNvGraphicFramePr>
+          <p:nvPr>
+            <p:extLst>
+              <p:ext uri="{D42A27DB-BD31-4B8C-83A1-F6EECF244321}">
+                <p14:modId xmlns:p14="http://schemas.microsoft.com/office/powerpoint/2010/main" val="3835303709"/>
+              </p:ext>
+            </p:extLst>
+          </p:nvPr>
+        </p:nvGraphicFramePr>
+        <p:xfrm>
+          <a:off x="4095750" y="4927022"/>
+          <a:ext cx="8030802" cy="1628512"/>
+        </p:xfrm>
+        <a:graphic>
+          <a:graphicData uri="http://schemas.openxmlformats.org/drawingml/2006/table">
+            <a:tbl>
+              <a:tblPr firstRow="1" bandRow="1">
+                <a:tableStyleId>{793D81CF-94F2-401A-BA57-92F5A7B2D0C5}</a:tableStyleId>
+              </a:tblPr>
+              <a:tblGrid>
+                <a:gridCol w="982625">
+                  <a:extLst>
+                    <a:ext uri="{9D8B030D-6E8A-4147-A177-3AD203B41FA5}">
+                      <a16:colId xmlns:a16="http://schemas.microsoft.com/office/drawing/2014/main" val="2618480265"/>
+                    </a:ext>
+                  </a:extLst>
+                </a:gridCol>
+                <a:gridCol w="7048177">
+                  <a:extLst>
+                    <a:ext uri="{9D8B030D-6E8A-4147-A177-3AD203B41FA5}">
+                      <a16:colId xmlns:a16="http://schemas.microsoft.com/office/drawing/2014/main" val="3948146958"/>
+                    </a:ext>
+                  </a:extLst>
+                </a:gridCol>
+              </a:tblGrid>
+              <a:tr h="407128">
+                <a:tc>
+                  <a:txBody>
+                    <a:bodyPr/>
+                    <a:lstStyle/>
+                    <a:p>
+                      <a:r>
+                        <a:rPr lang="pt-BR" sz="1800" dirty="0"/>
+                        <a:t>Volume</a:t>
+                      </a:r>
+                    </a:p>
+                  </a:txBody>
+                  <a:tcPr/>
+                </a:tc>
+                <a:tc>
+                  <a:txBody>
+                    <a:bodyPr/>
+                    <a:lstStyle/>
+                    <a:p>
+                      <a:pPr lvl="0">
+                        <a:buNone/>
+                      </a:pPr>
+                      <a:r>
+                        <a:rPr lang="pt-BR" sz="1800" u="sng" strike="noStrike" noProof="0" dirty="0"/>
+                        <a:t>Relação</a:t>
+                      </a:r>
+                      <a:r>
+                        <a:rPr lang="pt-BR" sz="1800" u="none" strike="noStrike" noProof="0" dirty="0"/>
+                        <a:t> da quantidade de </a:t>
+                      </a:r>
+                      <a:r>
+                        <a:rPr lang="pt-BR" sz="1800" u="sng" strike="noStrike" noProof="0" dirty="0"/>
+                        <a:t>peças </a:t>
+                      </a:r>
+                      <a:r>
+                        <a:rPr lang="pt-BR" sz="1800" u="none" strike="noStrike" noProof="0" dirty="0"/>
+                        <a:t>entregues com a quantidade de </a:t>
+                      </a:r>
+                      <a:r>
+                        <a:rPr lang="pt-BR" sz="1800" u="sng" strike="noStrike" noProof="0" dirty="0"/>
+                        <a:t>ordens</a:t>
+                      </a:r>
+                      <a:endParaRPr lang="pt-BR" sz="1800" dirty="0"/>
+                    </a:p>
+                  </a:txBody>
+                  <a:tcPr/>
+                </a:tc>
+                <a:extLst>
+                  <a:ext uri="{0D108BD9-81ED-4DB2-BD59-A6C34878D82A}">
+                    <a16:rowId xmlns:a16="http://schemas.microsoft.com/office/drawing/2014/main" val="987136867"/>
+                  </a:ext>
+                </a:extLst>
+              </a:tr>
+              <a:tr h="407128">
+                <a:tc>
+                  <a:txBody>
+                    <a:bodyPr/>
+                    <a:lstStyle/>
+                    <a:p>
+                      <a:r>
+                        <a:rPr lang="pt-BR" sz="1800" dirty="0"/>
+                        <a:t>6 L</a:t>
+                      </a:r>
+                    </a:p>
+                  </a:txBody>
+                  <a:tcPr/>
+                </a:tc>
+                <a:tc>
+                  <a:txBody>
+                    <a:bodyPr/>
+                    <a:lstStyle/>
+                    <a:p>
+                      <a:pPr lvl="0" algn="r">
+                        <a:buNone/>
+                      </a:pPr>
+                      <a:r>
+                        <a:rPr lang="pt-BR" sz="1800" u="none" strike="noStrike" noProof="0" dirty="0"/>
+                        <a:t>1,6889</a:t>
+                      </a:r>
+                      <a:endParaRPr lang="pt-BR" sz="1800" dirty="0"/>
+                    </a:p>
+                  </a:txBody>
+                  <a:tcPr/>
+                </a:tc>
+                <a:extLst>
+                  <a:ext uri="{0D108BD9-81ED-4DB2-BD59-A6C34878D82A}">
+                    <a16:rowId xmlns:a16="http://schemas.microsoft.com/office/drawing/2014/main" val="2076191919"/>
+                  </a:ext>
+                </a:extLst>
+              </a:tr>
+              <a:tr h="407128">
+                <a:tc>
+                  <a:txBody>
+                    <a:bodyPr/>
+                    <a:lstStyle/>
+                    <a:p>
+                      <a:r>
+                        <a:rPr lang="pt-BR" sz="1800" dirty="0"/>
+                        <a:t>330ml</a:t>
+                      </a:r>
+                    </a:p>
+                  </a:txBody>
+                  <a:tcPr/>
+                </a:tc>
+                <a:tc>
+                  <a:txBody>
+                    <a:bodyPr/>
+                    <a:lstStyle/>
+                    <a:p>
+                      <a:pPr lvl="0" algn="r">
+                        <a:buNone/>
+                      </a:pPr>
+                      <a:r>
+                        <a:rPr lang="pt-BR" sz="1800" u="none" strike="noStrike" noProof="0" dirty="0"/>
+                        <a:t>1,6956</a:t>
+                      </a:r>
+                      <a:endParaRPr lang="pt-BR" sz="1800" dirty="0"/>
+                    </a:p>
+                  </a:txBody>
+                  <a:tcPr/>
+                </a:tc>
+                <a:extLst>
+                  <a:ext uri="{0D108BD9-81ED-4DB2-BD59-A6C34878D82A}">
+                    <a16:rowId xmlns:a16="http://schemas.microsoft.com/office/drawing/2014/main" val="1065682078"/>
+                  </a:ext>
+                </a:extLst>
+              </a:tr>
+              <a:tr h="407128">
+                <a:tc>
+                  <a:txBody>
+                    <a:bodyPr/>
+                    <a:lstStyle/>
+                    <a:p>
+                      <a:r>
+                        <a:rPr lang="pt-BR" sz="1800" dirty="0"/>
+                        <a:t>355ml</a:t>
+                      </a:r>
+                    </a:p>
+                  </a:txBody>
+                  <a:tcPr/>
+                </a:tc>
+                <a:tc>
+                  <a:txBody>
+                    <a:bodyPr/>
+                    <a:lstStyle/>
+                    <a:p>
+                      <a:pPr lvl="0" algn="r">
+                        <a:buNone/>
+                      </a:pPr>
+                      <a:r>
+                        <a:rPr lang="pt-BR" sz="1800" u="none" strike="noStrike" noProof="0" dirty="0"/>
+                        <a:t>1,8424</a:t>
+                      </a:r>
+                      <a:endParaRPr lang="pt-BR" sz="1800" dirty="0"/>
+                    </a:p>
+                  </a:txBody>
+                  <a:tcPr/>
+                </a:tc>
+                <a:extLst>
+                  <a:ext uri="{0D108BD9-81ED-4DB2-BD59-A6C34878D82A}">
+                    <a16:rowId xmlns:a16="http://schemas.microsoft.com/office/drawing/2014/main" val="3415426506"/>
+                  </a:ext>
+                </a:extLst>
+              </a:tr>
+            </a:tbl>
+          </a:graphicData>
+        </a:graphic>
+      </p:graphicFrame>
     </p:spTree>
     <p:extLst>
       <p:ext uri="{BB962C8B-B14F-4D97-AF65-F5344CB8AC3E}">
@@ -14822,42 +15630,586 @@
               <a:rPr lang="pt-BR">
                 <a:cs typeface="Calibri"/>
               </a:rPr>
-              <a:t>Averiguar relação de peças e ordens.</a:t>
+              <a:t>Na tabela consta até 97,3% dos pedidos realizados.</a:t>
             </a:r>
-            <a:endParaRPr lang="pt-BR"/>
+          </a:p>
+          <a:p>
+            <a:r>
+              <a:rPr lang="pt-BR">
+                <a:cs typeface="Calibri"/>
+              </a:rPr>
+              <a:t>Verificar correlação com MARCA, com CLIENTE e com VOLUME</a:t>
+            </a:r>
+            <a:endParaRPr lang="pt-BR" dirty="0">
+              <a:cs typeface="Calibri"/>
+            </a:endParaRPr>
           </a:p>
         </p:txBody>
       </p:sp>
-      <p:pic>
-        <p:nvPicPr>
-          <p:cNvPr id="4" name="Imagem 4" descr="Interface gráfica do usuário, Aplicativo&#10;&#10;Descrição gerada automaticamente">
+      <p:graphicFrame>
+        <p:nvGraphicFramePr>
+          <p:cNvPr id="5" name="Tabela 5">
             <a:extLst>
               <a:ext uri="{FF2B5EF4-FFF2-40B4-BE49-F238E27FC236}">
-                <a16:creationId xmlns:a16="http://schemas.microsoft.com/office/drawing/2014/main" id="{37EF92A1-88FC-40A4-8C4D-EB8E6E980B59}"/>
+                <a16:creationId xmlns:a16="http://schemas.microsoft.com/office/drawing/2014/main" id="{E23B4280-AE55-4DCC-9128-6564BBFE92CD}"/>
               </a:ext>
             </a:extLst>
           </p:cNvPr>
-          <p:cNvPicPr>
-            <a:picLocks noChangeAspect="1"/>
-          </p:cNvPicPr>
-          <p:nvPr/>
-        </p:nvPicPr>
-        <p:blipFill>
-          <a:blip r:embed="rId2"/>
-          <a:stretch>
-            <a:fillRect/>
-          </a:stretch>
-        </p:blipFill>
-        <p:spPr>
-          <a:xfrm>
-            <a:off x="1694985" y="3166838"/>
-            <a:ext cx="8290931" cy="1685907"/>
-          </a:xfrm>
-          <a:prstGeom prst="rect">
-            <a:avLst/>
-          </a:prstGeom>
-        </p:spPr>
-      </p:pic>
+          <p:cNvGraphicFramePr>
+            <a:graphicFrameLocks noGrp="1"/>
+          </p:cNvGraphicFramePr>
+          <p:nvPr>
+            <p:extLst>
+              <p:ext uri="{D42A27DB-BD31-4B8C-83A1-F6EECF244321}">
+                <p14:modId xmlns:p14="http://schemas.microsoft.com/office/powerpoint/2010/main" val="4128787780"/>
+              </p:ext>
+            </p:extLst>
+          </p:nvPr>
+        </p:nvGraphicFramePr>
+        <p:xfrm>
+          <a:off x="2470612" y="3043012"/>
+          <a:ext cx="5068679" cy="2966720"/>
+        </p:xfrm>
+        <a:graphic>
+          <a:graphicData uri="http://schemas.openxmlformats.org/drawingml/2006/table">
+            <a:tbl>
+              <a:tblPr firstRow="1" bandRow="1">
+                <a:tableStyleId>{7E9639D4-E3E2-4D34-9284-5A2195B3D0D7}</a:tableStyleId>
+              </a:tblPr>
+              <a:tblGrid>
+                <a:gridCol w="1186295">
+                  <a:extLst>
+                    <a:ext uri="{9D8B030D-6E8A-4147-A177-3AD203B41FA5}">
+                      <a16:colId xmlns:a16="http://schemas.microsoft.com/office/drawing/2014/main" val="890491137"/>
+                    </a:ext>
+                  </a:extLst>
+                </a:gridCol>
+                <a:gridCol w="1310636">
+                  <a:extLst>
+                    <a:ext uri="{9D8B030D-6E8A-4147-A177-3AD203B41FA5}">
+                      <a16:colId xmlns:a16="http://schemas.microsoft.com/office/drawing/2014/main" val="51625208"/>
+                    </a:ext>
+                  </a:extLst>
+                </a:gridCol>
+                <a:gridCol w="1160317">
+                  <a:extLst>
+                    <a:ext uri="{9D8B030D-6E8A-4147-A177-3AD203B41FA5}">
+                      <a16:colId xmlns:a16="http://schemas.microsoft.com/office/drawing/2014/main" val="4180383103"/>
+                    </a:ext>
+                  </a:extLst>
+                </a:gridCol>
+                <a:gridCol w="1411431">
+                  <a:extLst>
+                    <a:ext uri="{9D8B030D-6E8A-4147-A177-3AD203B41FA5}">
+                      <a16:colId xmlns:a16="http://schemas.microsoft.com/office/drawing/2014/main" val="1733926204"/>
+                    </a:ext>
+                  </a:extLst>
+                </a:gridCol>
+              </a:tblGrid>
+              <a:tr h="370840">
+                <a:tc>
+                  <a:txBody>
+                    <a:bodyPr/>
+                    <a:lstStyle/>
+                    <a:p>
+                      <a:r>
+                        <a:rPr lang="pt-BR"/>
+                        <a:t>Pedidos</a:t>
+                      </a:r>
+                    </a:p>
+                  </a:txBody>
+                  <a:tcPr/>
+                </a:tc>
+                <a:tc>
+                  <a:txBody>
+                    <a:bodyPr/>
+                    <a:lstStyle/>
+                    <a:p>
+                      <a:r>
+                        <a:rPr lang="pt-BR"/>
+                        <a:t>Percentual</a:t>
+                      </a:r>
+                    </a:p>
+                  </a:txBody>
+                  <a:tcPr/>
+                </a:tc>
+                <a:tc>
+                  <a:txBody>
+                    <a:bodyPr/>
+                    <a:lstStyle/>
+                    <a:p>
+                      <a:r>
+                        <a:rPr lang="pt-BR"/>
+                        <a:t>Clientes</a:t>
+                      </a:r>
+                    </a:p>
+                  </a:txBody>
+                  <a:tcPr/>
+                </a:tc>
+                <a:tc>
+                  <a:txBody>
+                    <a:bodyPr/>
+                    <a:lstStyle/>
+                    <a:p>
+                      <a:r>
+                        <a:rPr lang="pt-BR"/>
+                        <a:t>Proporção</a:t>
+                      </a:r>
+                    </a:p>
+                  </a:txBody>
+                  <a:tcPr/>
+                </a:tc>
+                <a:extLst>
+                  <a:ext uri="{0D108BD9-81ED-4DB2-BD59-A6C34878D82A}">
+                    <a16:rowId xmlns:a16="http://schemas.microsoft.com/office/drawing/2014/main" val="3404873640"/>
+                  </a:ext>
+                </a:extLst>
+              </a:tr>
+              <a:tr h="370840">
+                <a:tc>
+                  <a:txBody>
+                    <a:bodyPr/>
+                    <a:lstStyle/>
+                    <a:p>
+                      <a:pPr algn="r"/>
+                      <a:r>
+                        <a:rPr lang="pt-BR"/>
+                        <a:t>46.104</a:t>
+                      </a:r>
+                    </a:p>
+                  </a:txBody>
+                  <a:tcPr/>
+                </a:tc>
+                <a:tc>
+                  <a:txBody>
+                    <a:bodyPr/>
+                    <a:lstStyle/>
+                    <a:p>
+                      <a:pPr algn="r"/>
+                      <a:r>
+                        <a:rPr lang="pt-BR"/>
+                        <a:t>0,6258</a:t>
+                      </a:r>
+                    </a:p>
+                  </a:txBody>
+                  <a:tcPr/>
+                </a:tc>
+                <a:tc>
+                  <a:txBody>
+                    <a:bodyPr/>
+                    <a:lstStyle/>
+                    <a:p>
+                      <a:pPr algn="r"/>
+                      <a:r>
+                        <a:rPr lang="pt-BR"/>
+                        <a:t>178</a:t>
+                      </a:r>
+                    </a:p>
+                  </a:txBody>
+                  <a:tcPr/>
+                </a:tc>
+                <a:tc>
+                  <a:txBody>
+                    <a:bodyPr/>
+                    <a:lstStyle/>
+                    <a:p>
+                      <a:pPr algn="r"/>
+                      <a:r>
+                        <a:rPr lang="pt-BR"/>
+                        <a:t>1</a:t>
+                      </a:r>
+                    </a:p>
+                  </a:txBody>
+                  <a:tcPr/>
+                </a:tc>
+                <a:extLst>
+                  <a:ext uri="{0D108BD9-81ED-4DB2-BD59-A6C34878D82A}">
+                    <a16:rowId xmlns:a16="http://schemas.microsoft.com/office/drawing/2014/main" val="2199352597"/>
+                  </a:ext>
+                </a:extLst>
+              </a:tr>
+              <a:tr h="370840">
+                <a:tc>
+                  <a:txBody>
+                    <a:bodyPr/>
+                    <a:lstStyle/>
+                    <a:p>
+                      <a:pPr algn="r"/>
+                      <a:r>
+                        <a:rPr lang="pt-BR"/>
+                        <a:t>7.045</a:t>
+                      </a:r>
+                    </a:p>
+                  </a:txBody>
+                  <a:tcPr/>
+                </a:tc>
+                <a:tc>
+                  <a:txBody>
+                    <a:bodyPr/>
+                    <a:lstStyle/>
+                    <a:p>
+                      <a:pPr algn="r"/>
+                      <a:r>
+                        <a:rPr lang="pt-BR"/>
+                        <a:t>0,0956</a:t>
+                      </a:r>
+                    </a:p>
+                  </a:txBody>
+                  <a:tcPr/>
+                </a:tc>
+                <a:tc>
+                  <a:txBody>
+                    <a:bodyPr/>
+                    <a:lstStyle/>
+                    <a:p>
+                      <a:pPr algn="r"/>
+                      <a:r>
+                        <a:rPr lang="pt-BR"/>
+                        <a:t>156</a:t>
+                      </a:r>
+                    </a:p>
+                  </a:txBody>
+                  <a:tcPr/>
+                </a:tc>
+                <a:tc>
+                  <a:txBody>
+                    <a:bodyPr/>
+                    <a:lstStyle/>
+                    <a:p>
+                      <a:pPr algn="r"/>
+                      <a:r>
+                        <a:rPr lang="pt-BR"/>
+                        <a:t>70</a:t>
+                      </a:r>
+                    </a:p>
+                  </a:txBody>
+                  <a:tcPr/>
+                </a:tc>
+                <a:extLst>
+                  <a:ext uri="{0D108BD9-81ED-4DB2-BD59-A6C34878D82A}">
+                    <a16:rowId xmlns:a16="http://schemas.microsoft.com/office/drawing/2014/main" val="4199361665"/>
+                  </a:ext>
+                </a:extLst>
+              </a:tr>
+              <a:tr h="370840">
+                <a:tc>
+                  <a:txBody>
+                    <a:bodyPr/>
+                    <a:lstStyle/>
+                    <a:p>
+                      <a:pPr algn="r"/>
+                      <a:r>
+                        <a:rPr lang="pt-BR"/>
+                        <a:t>7.023</a:t>
+                      </a:r>
+                    </a:p>
+                  </a:txBody>
+                  <a:tcPr/>
+                </a:tc>
+                <a:tc>
+                  <a:txBody>
+                    <a:bodyPr/>
+                    <a:lstStyle/>
+                    <a:p>
+                      <a:pPr algn="r"/>
+                      <a:r>
+                        <a:rPr lang="pt-BR"/>
+                        <a:t>0,0953</a:t>
+                      </a:r>
+                    </a:p>
+                  </a:txBody>
+                  <a:tcPr/>
+                </a:tc>
+                <a:tc>
+                  <a:txBody>
+                    <a:bodyPr/>
+                    <a:lstStyle/>
+                    <a:p>
+                      <a:pPr algn="r"/>
+                      <a:r>
+                        <a:rPr lang="pt-BR"/>
+                        <a:t>166</a:t>
+                      </a:r>
+                    </a:p>
+                  </a:txBody>
+                  <a:tcPr/>
+                </a:tc>
+                <a:tc>
+                  <a:txBody>
+                    <a:bodyPr/>
+                    <a:lstStyle/>
+                    <a:p>
+                      <a:pPr algn="r"/>
+                      <a:r>
+                        <a:rPr lang="pt-BR"/>
+                        <a:t>8</a:t>
+                      </a:r>
+                    </a:p>
+                  </a:txBody>
+                  <a:tcPr/>
+                </a:tc>
+                <a:extLst>
+                  <a:ext uri="{0D108BD9-81ED-4DB2-BD59-A6C34878D82A}">
+                    <a16:rowId xmlns:a16="http://schemas.microsoft.com/office/drawing/2014/main" val="2583630461"/>
+                  </a:ext>
+                </a:extLst>
+              </a:tr>
+              <a:tr h="370840">
+                <a:tc>
+                  <a:txBody>
+                    <a:bodyPr/>
+                    <a:lstStyle/>
+                    <a:p>
+                      <a:pPr algn="r"/>
+                      <a:r>
+                        <a:rPr lang="pt-BR"/>
+                        <a:t>5.302</a:t>
+                      </a:r>
+                    </a:p>
+                  </a:txBody>
+                  <a:tcPr/>
+                </a:tc>
+                <a:tc>
+                  <a:txBody>
+                    <a:bodyPr/>
+                    <a:lstStyle/>
+                    <a:p>
+                      <a:pPr algn="r"/>
+                      <a:r>
+                        <a:rPr lang="pt-BR"/>
+                        <a:t>0,0720</a:t>
+                      </a:r>
+                    </a:p>
+                  </a:txBody>
+                  <a:tcPr/>
+                </a:tc>
+                <a:tc>
+                  <a:txBody>
+                    <a:bodyPr/>
+                    <a:lstStyle/>
+                    <a:p>
+                      <a:pPr algn="r"/>
+                      <a:r>
+                        <a:rPr lang="pt-BR"/>
+                        <a:t>165</a:t>
+                      </a:r>
+                    </a:p>
+                  </a:txBody>
+                  <a:tcPr/>
+                </a:tc>
+                <a:tc>
+                  <a:txBody>
+                    <a:bodyPr/>
+                    <a:lstStyle/>
+                    <a:p>
+                      <a:pPr algn="r"/>
+                      <a:r>
+                        <a:rPr lang="pt-BR"/>
+                        <a:t>0</a:t>
+                      </a:r>
+                    </a:p>
+                  </a:txBody>
+                  <a:tcPr/>
+                </a:tc>
+                <a:extLst>
+                  <a:ext uri="{0D108BD9-81ED-4DB2-BD59-A6C34878D82A}">
+                    <a16:rowId xmlns:a16="http://schemas.microsoft.com/office/drawing/2014/main" val="3592787314"/>
+                  </a:ext>
+                </a:extLst>
+              </a:tr>
+              <a:tr h="370840">
+                <a:tc>
+                  <a:txBody>
+                    <a:bodyPr/>
+                    <a:lstStyle/>
+                    <a:p>
+                      <a:pPr algn="r"/>
+                      <a:r>
+                        <a:rPr lang="pt-BR"/>
+                        <a:t>2.982</a:t>
+                      </a:r>
+                    </a:p>
+                  </a:txBody>
+                  <a:tcPr/>
+                </a:tc>
+                <a:tc>
+                  <a:txBody>
+                    <a:bodyPr/>
+                    <a:lstStyle/>
+                    <a:p>
+                      <a:pPr algn="r"/>
+                      <a:r>
+                        <a:rPr lang="pt-BR"/>
+                        <a:t>0,0405</a:t>
+                      </a:r>
+                    </a:p>
+                  </a:txBody>
+                  <a:tcPr/>
+                </a:tc>
+                <a:tc>
+                  <a:txBody>
+                    <a:bodyPr/>
+                    <a:lstStyle/>
+                    <a:p>
+                      <a:pPr algn="r"/>
+                      <a:r>
+                        <a:rPr lang="pt-BR"/>
+                        <a:t>154</a:t>
+                      </a:r>
+                    </a:p>
+                  </a:txBody>
+                  <a:tcPr/>
+                </a:tc>
+                <a:tc>
+                  <a:txBody>
+                    <a:bodyPr/>
+                    <a:lstStyle/>
+                    <a:p>
+                      <a:pPr algn="r"/>
+                      <a:r>
+                        <a:rPr lang="pt-BR"/>
+                        <a:t>20</a:t>
+                      </a:r>
+                    </a:p>
+                  </a:txBody>
+                  <a:tcPr/>
+                </a:tc>
+                <a:extLst>
+                  <a:ext uri="{0D108BD9-81ED-4DB2-BD59-A6C34878D82A}">
+                    <a16:rowId xmlns:a16="http://schemas.microsoft.com/office/drawing/2014/main" val="1124931743"/>
+                  </a:ext>
+                </a:extLst>
+              </a:tr>
+              <a:tr h="370840">
+                <a:tc>
+                  <a:txBody>
+                    <a:bodyPr/>
+                    <a:lstStyle/>
+                    <a:p>
+                      <a:pPr algn="r"/>
+                      <a:r>
+                        <a:rPr lang="pt-BR"/>
+                        <a:t>2.094</a:t>
+                      </a:r>
+                    </a:p>
+                  </a:txBody>
+                  <a:tcPr/>
+                </a:tc>
+                <a:tc>
+                  <a:txBody>
+                    <a:bodyPr/>
+                    <a:lstStyle/>
+                    <a:p>
+                      <a:pPr algn="r"/>
+                      <a:r>
+                        <a:rPr lang="pt-BR"/>
+                        <a:t>0,0284</a:t>
+                      </a:r>
+                    </a:p>
+                  </a:txBody>
+                  <a:tcPr/>
+                </a:tc>
+                <a:tc>
+                  <a:txBody>
+                    <a:bodyPr/>
+                    <a:lstStyle/>
+                    <a:p>
+                      <a:pPr algn="r"/>
+                      <a:r>
+                        <a:rPr lang="pt-BR"/>
+                        <a:t>131</a:t>
+                      </a:r>
+                    </a:p>
+                  </a:txBody>
+                  <a:tcPr/>
+                </a:tc>
+                <a:tc>
+                  <a:txBody>
+                    <a:bodyPr/>
+                    <a:lstStyle/>
+                    <a:p>
+                      <a:pPr algn="r"/>
+                      <a:r>
+                        <a:rPr lang="pt-BR"/>
+                        <a:t>6</a:t>
+                      </a:r>
+                    </a:p>
+                  </a:txBody>
+                  <a:tcPr/>
+                </a:tc>
+                <a:extLst>
+                  <a:ext uri="{0D108BD9-81ED-4DB2-BD59-A6C34878D82A}">
+                    <a16:rowId xmlns:a16="http://schemas.microsoft.com/office/drawing/2014/main" val="727442113"/>
+                  </a:ext>
+                </a:extLst>
+              </a:tr>
+              <a:tr h="370840">
+                <a:tc>
+                  <a:txBody>
+                    <a:bodyPr/>
+                    <a:lstStyle/>
+                    <a:p>
+                      <a:pPr algn="r"/>
+                      <a:r>
+                        <a:rPr lang="pt-BR"/>
+                        <a:t>1.332</a:t>
+                      </a:r>
+                    </a:p>
+                  </a:txBody>
+                  <a:tcPr/>
+                </a:tc>
+                <a:tc>
+                  <a:txBody>
+                    <a:bodyPr/>
+                    <a:lstStyle/>
+                    <a:p>
+                      <a:pPr algn="r"/>
+                      <a:r>
+                        <a:rPr lang="pt-BR"/>
+                        <a:t>0,0181</a:t>
+                      </a:r>
+                    </a:p>
+                  </a:txBody>
+                  <a:tcPr/>
+                </a:tc>
+                <a:tc>
+                  <a:txBody>
+                    <a:bodyPr/>
+                    <a:lstStyle/>
+                    <a:p>
+                      <a:pPr algn="r"/>
+                      <a:r>
+                        <a:rPr lang="pt-BR"/>
+                        <a:t>139</a:t>
+                      </a:r>
+                    </a:p>
+                  </a:txBody>
+                  <a:tcPr/>
+                </a:tc>
+                <a:tc>
+                  <a:txBody>
+                    <a:bodyPr/>
+                    <a:lstStyle/>
+                    <a:p>
+                      <a:pPr algn="r"/>
+                      <a:r>
+                        <a:rPr lang="pt-BR"/>
+                        <a:t>60</a:t>
+                      </a:r>
+                    </a:p>
+                  </a:txBody>
+                  <a:tcPr/>
+                </a:tc>
+                <a:extLst>
+                  <a:ext uri="{0D108BD9-81ED-4DB2-BD59-A6C34878D82A}">
+                    <a16:rowId xmlns:a16="http://schemas.microsoft.com/office/drawing/2014/main" val="794016950"/>
+                  </a:ext>
+                </a:extLst>
+              </a:tr>
+            </a:tbl>
+          </a:graphicData>
+        </a:graphic>
+      </p:graphicFrame>
     </p:spTree>
     <p:extLst>
       <p:ext uri="{BB962C8B-B14F-4D97-AF65-F5344CB8AC3E}">

</xml_diff>

<commit_message>
Breve atualização de sexta à tarde. Bom final de semana!
</commit_message>
<xml_diff>
--- a/Apresentação1.pptx
+++ b/Apresentação1.pptx
@@ -130,8 +130,9 @@
     <p1510:client id="{3DDC54BA-4075-6979-1A35-C7DCFB10469F}" v="934" dt="2021-10-20T00:12:26.392"/>
     <p1510:client id="{521AAFE5-9A30-F6FA-69E5-18C0254DB6B9}" v="704" dt="2021-10-21T00:11:16.760"/>
     <p1510:client id="{6227370F-7FE4-1758-DB8A-4C92D50D133C}" v="738" dt="2021-10-22T12:37:26.569"/>
-    <p1510:client id="{83F1D559-B501-536E-D835-FCBCD9B96138}" v="320" dt="2021-10-22T18:58:41.908"/>
+    <p1510:client id="{83F1D559-B501-536E-D835-FCBCD9B96138}" v="501" dt="2021-10-22T19:55:50.161"/>
     <p1510:client id="{CC30ADC3-F2FC-14EE-3D66-6C99CADAFB92}" v="3333" dt="2021-10-22T02:11:26.281"/>
+    <p1510:client id="{CD59B09F-84DC-9E16-94E3-3D329DEE6F2D}" v="1699" dt="2021-10-22T19:56:35.723"/>
     <p1510:client id="{D8C965DF-2039-0F1A-FCF3-D76005C0B460}" v="17" dt="2021-10-14T20:02:31.275"/>
     <p1510:client id="{DD34EB74-03A9-7CC1-0BA6-6F37897EA669}" v="2" dt="2021-10-19T23:19:18.156"/>
     <p1510:client id="{FF39032D-773E-417D-B62A-0A22B4029DE9}" v="19" dt="2021-10-14T20:02:19.512"/>
@@ -1080,16 +1081,16 @@
         <a:lstStyle/>
         <a:p>
           <a:r>
-            <a:rPr lang="pt-BR" b="0" dirty="0"/>
+            <a:rPr lang="pt-BR" b="0"/>
             <a:t>total:</a:t>
           </a:r>
           <a:r>
-            <a:rPr lang="pt-BR" b="0" dirty="0">
+            <a:rPr lang="pt-BR" b="0">
               <a:latin typeface="Calibri Light" panose="020F0302020204030204"/>
             </a:rPr>
             <a:t> </a:t>
           </a:r>
-          <a:endParaRPr lang="pt-BR" b="0" dirty="0">
+          <a:endParaRPr lang="pt-BR" b="0">
             <a:latin typeface="Calibri"/>
             <a:cs typeface="Calibri"/>
           </a:endParaRPr>
@@ -1127,24 +1128,24 @@
         <a:p>
           <a:pPr rtl="0"/>
           <a:r>
-            <a:rPr lang="pt-BR" dirty="0"/>
+            <a:rPr lang="pt-BR"/>
             <a:t>soma dos elementos de "</a:t>
           </a:r>
           <a:r>
-            <a:rPr lang="pt-BR" dirty="0" err="1"/>
+            <a:rPr lang="pt-BR" err="1"/>
             <a:t>volumeabsoluto</a:t>
           </a:r>
           <a:r>
-            <a:rPr lang="pt-BR" dirty="0"/>
+            <a:rPr lang="pt-BR"/>
             <a:t>" = 4.220.713</a:t>
           </a:r>
           <a:r>
-            <a:rPr lang="pt-BR" dirty="0">
+            <a:rPr lang="pt-BR">
               <a:latin typeface="Calibri Light" panose="020F0302020204030204"/>
             </a:rPr>
             <a:t>.</a:t>
           </a:r>
-          <a:endParaRPr lang="pt-BR" dirty="0"/>
+          <a:endParaRPr lang="pt-BR"/>
         </a:p>
       </dgm:t>
     </dgm:pt>
@@ -1178,7 +1179,7 @@
         <a:lstStyle/>
         <a:p>
           <a:r>
-            <a:rPr lang="pt-BR" dirty="0" err="1"/>
+            <a:rPr lang="pt-BR" err="1"/>
             <a:t>cumulativopedidos</a:t>
           </a:r>
         </a:p>
@@ -1215,20 +1216,20 @@
         <a:p>
           <a:pPr rtl="0"/>
           <a:r>
-            <a:rPr lang="pt-BR" dirty="0" err="1">
+            <a:rPr lang="pt-BR" err="1">
               <a:latin typeface="Calibri"/>
               <a:cs typeface="Calibri"/>
             </a:rPr>
             <a:t>volumetotal</a:t>
           </a:r>
           <a:r>
-            <a:rPr lang="pt-BR" dirty="0">
+            <a:rPr lang="pt-BR">
               <a:latin typeface="Calibri"/>
               <a:cs typeface="Calibri"/>
             </a:rPr>
             <a:t>: </a:t>
           </a:r>
-          <a:endParaRPr lang="pt-BR" dirty="0"/>
+          <a:endParaRPr lang="pt-BR"/>
         </a:p>
       </dgm:t>
     </dgm:pt>
@@ -1256,15 +1257,15 @@
         <a:p>
           <a:pPr rtl="0"/>
           <a:r>
-            <a:rPr lang="pt-BR" dirty="0"/>
+            <a:rPr lang="pt-BR"/>
             <a:t>soma das frequências das ordens; deveria equivaler ao total de pedidos (linhas, 73.670), porém por conta do arredondamento em "</a:t>
           </a:r>
           <a:r>
-            <a:rPr lang="pt-BR" dirty="0" err="1"/>
+            <a:rPr lang="pt-BR" err="1"/>
             <a:t>volumevalores</a:t>
           </a:r>
           <a:r>
-            <a:rPr lang="pt-BR" dirty="0"/>
+            <a:rPr lang="pt-BR"/>
             <a:t>", resulta 73.610.</a:t>
           </a:r>
         </a:p>
@@ -1294,23 +1295,23 @@
         <a:p>
           <a:pPr rtl="0"/>
           <a:r>
-            <a:rPr lang="pt-BR" dirty="0"/>
+            <a:rPr lang="pt-BR"/>
             <a:t>contribuição percentual acumulada do "</a:t>
           </a:r>
           <a:r>
-            <a:rPr lang="pt-BR" dirty="0" err="1"/>
+            <a:rPr lang="pt-BR" err="1"/>
             <a:t>volumeabsoluto</a:t>
           </a:r>
           <a:r>
-            <a:rPr lang="pt-BR" dirty="0"/>
+            <a:rPr lang="pt-BR"/>
             <a:t>" de cada ordem; </a:t>
           </a:r>
           <a:r>
-            <a:rPr lang="pt-BR" i="1" dirty="0"/>
+            <a:rPr lang="pt-BR" i="1"/>
             <a:t>e.g. </a:t>
           </a:r>
           <a:r>
-            <a:rPr lang="pt-BR" dirty="0"/>
+            <a:rPr lang="pt-BR"/>
             <a:t>pedidos de uma ordem correspondem a 0,0021% do total de ordens.</a:t>
           </a:r>
         </a:p>
@@ -1340,7 +1341,7 @@
         <a:p>
           <a:pPr rtl="0"/>
           <a:r>
-            <a:rPr lang="pt-BR" dirty="0" err="1">
+            <a:rPr lang="pt-BR" err="1">
               <a:latin typeface="Calibri Light" panose="020F0302020204030204"/>
             </a:rPr>
             <a:t>cumulativolume</a:t>
@@ -1372,23 +1373,23 @@
         <a:p>
           <a:pPr algn="l" rtl="0"/>
           <a:r>
-            <a:rPr lang="pt-BR" dirty="0"/>
+            <a:rPr lang="pt-BR"/>
             <a:t>contribuição percentual acumulada de "</a:t>
           </a:r>
           <a:r>
-            <a:rPr lang="pt-BR" dirty="0" err="1"/>
+            <a:rPr lang="pt-BR" err="1"/>
             <a:t>volumevalores</a:t>
           </a:r>
           <a:r>
-            <a:rPr lang="pt-BR" dirty="0"/>
+            <a:rPr lang="pt-BR"/>
             <a:t>" (frequência de cada ordem); </a:t>
           </a:r>
           <a:r>
-            <a:rPr lang="pt-BR" i="1" dirty="0"/>
+            <a:rPr lang="pt-BR" i="1"/>
             <a:t>e.g. </a:t>
           </a:r>
           <a:r>
-            <a:rPr lang="pt-BR" dirty="0"/>
+            <a:rPr lang="pt-BR"/>
             <a:t>pedidos com uma ordem correspondem a 11.50% das ordens efetuadas.</a:t>
           </a:r>
         </a:p>
@@ -1418,13 +1419,13 @@
         <a:p>
           <a:pPr rtl="0"/>
           <a:r>
-            <a:rPr lang="pt-BR" b="0" dirty="0" err="1">
+            <a:rPr lang="pt-BR" b="0" err="1">
               <a:latin typeface="Calibri Light" panose="020F0302020204030204"/>
             </a:rPr>
             <a:t>volumevalores</a:t>
           </a:r>
           <a:r>
-            <a:rPr lang="pt-BR" b="0" dirty="0">
+            <a:rPr lang="pt-BR" b="0">
               <a:latin typeface="Calibri Light" panose="020F0302020204030204"/>
             </a:rPr>
             <a:t>:</a:t>
@@ -1456,13 +1457,13 @@
         <a:p>
           <a:pPr rtl="0"/>
           <a:r>
-            <a:rPr lang="pt-BR" b="0" dirty="0" err="1">
+            <a:rPr lang="pt-BR" b="0" err="1">
               <a:latin typeface="Calibri Light" panose="020F0302020204030204"/>
             </a:rPr>
             <a:t>volumeabsoluto</a:t>
           </a:r>
           <a:r>
-            <a:rPr lang="pt-BR" b="0" dirty="0">
+            <a:rPr lang="pt-BR" b="0">
               <a:latin typeface="Calibri Light" panose="020F0302020204030204"/>
             </a:rPr>
             <a:t>:</a:t>
@@ -1493,10 +1494,10 @@
         <a:lstStyle/>
         <a:p>
           <a:r>
-            <a:rPr lang="pt-BR" b="0" dirty="0"/>
+            <a:rPr lang="pt-BR" b="0"/>
             <a:t>frequência da ordem vezes sua quantidade.</a:t>
           </a:r>
-          <a:endParaRPr lang="pt-BR" dirty="0"/>
+          <a:endParaRPr lang="pt-BR"/>
         </a:p>
       </dgm:t>
     </dgm:pt>
@@ -1524,11 +1525,11 @@
         <a:p>
           <a:pPr rtl="0"/>
           <a:r>
-            <a:rPr lang="pt-BR" b="0" dirty="0"/>
+            <a:rPr lang="pt-BR" b="0"/>
             <a:t>frequência da ordem</a:t>
           </a:r>
           <a:r>
-            <a:rPr lang="pt-BR" b="0" dirty="0">
+            <a:rPr lang="pt-BR" b="0">
               <a:latin typeface="Calibri Light" panose="020F0302020204030204"/>
             </a:rPr>
             <a:t>.</a:t>
@@ -1909,11 +1910,11 @@
             <a:buChar char="•"/>
           </a:pPr>
           <a:r>
-            <a:rPr lang="pt-BR" sz="1300" b="0" kern="1200" dirty="0"/>
+            <a:rPr lang="pt-BR" sz="1300" b="0" kern="1200"/>
             <a:t>frequência da ordem</a:t>
           </a:r>
           <a:r>
-            <a:rPr lang="pt-BR" sz="1300" b="0" kern="1200" dirty="0">
+            <a:rPr lang="pt-BR" sz="1300" b="0" kern="1200">
               <a:latin typeface="Calibri Light" panose="020F0302020204030204"/>
             </a:rPr>
             <a:t>.</a:t>
@@ -1993,13 +1994,13 @@
             <a:buNone/>
           </a:pPr>
           <a:r>
-            <a:rPr lang="pt-BR" sz="1300" b="0" kern="1200" dirty="0" err="1">
+            <a:rPr lang="pt-BR" sz="1300" b="0" kern="1200" err="1">
               <a:latin typeface="Calibri Light" panose="020F0302020204030204"/>
             </a:rPr>
             <a:t>volumevalores</a:t>
           </a:r>
           <a:r>
-            <a:rPr lang="pt-BR" sz="1300" b="0" kern="1200" dirty="0">
+            <a:rPr lang="pt-BR" sz="1300" b="0" kern="1200">
               <a:latin typeface="Calibri Light" panose="020F0302020204030204"/>
             </a:rPr>
             <a:t>:</a:t>
@@ -2078,10 +2079,10 @@
             <a:buChar char="•"/>
           </a:pPr>
           <a:r>
-            <a:rPr lang="pt-BR" sz="1300" b="0" kern="1200" dirty="0"/>
+            <a:rPr lang="pt-BR" sz="1300" b="0" kern="1200"/>
             <a:t>frequência da ordem vezes sua quantidade.</a:t>
           </a:r>
-          <a:endParaRPr lang="pt-BR" sz="1300" kern="1200" dirty="0"/>
+          <a:endParaRPr lang="pt-BR" sz="1300" kern="1200"/>
         </a:p>
       </dsp:txBody>
       <dsp:txXfrm>
@@ -2157,13 +2158,13 @@
             <a:buNone/>
           </a:pPr>
           <a:r>
-            <a:rPr lang="pt-BR" sz="1300" b="0" kern="1200" dirty="0" err="1">
+            <a:rPr lang="pt-BR" sz="1300" b="0" kern="1200" err="1">
               <a:latin typeface="Calibri Light" panose="020F0302020204030204"/>
             </a:rPr>
             <a:t>volumeabsoluto</a:t>
           </a:r>
           <a:r>
-            <a:rPr lang="pt-BR" sz="1300" b="0" kern="1200" dirty="0">
+            <a:rPr lang="pt-BR" sz="1300" b="0" kern="1200">
               <a:latin typeface="Calibri Light" panose="020F0302020204030204"/>
             </a:rPr>
             <a:t>:</a:t>
@@ -2242,24 +2243,24 @@
             <a:buChar char="•"/>
           </a:pPr>
           <a:r>
-            <a:rPr lang="pt-BR" sz="1300" kern="1200" dirty="0"/>
+            <a:rPr lang="pt-BR" sz="1300" kern="1200"/>
             <a:t>soma dos elementos de "</a:t>
           </a:r>
           <a:r>
-            <a:rPr lang="pt-BR" sz="1300" kern="1200" dirty="0" err="1"/>
+            <a:rPr lang="pt-BR" sz="1300" kern="1200" err="1"/>
             <a:t>volumeabsoluto</a:t>
           </a:r>
           <a:r>
-            <a:rPr lang="pt-BR" sz="1300" kern="1200" dirty="0"/>
+            <a:rPr lang="pt-BR" sz="1300" kern="1200"/>
             <a:t>" = 4.220.713</a:t>
           </a:r>
           <a:r>
-            <a:rPr lang="pt-BR" sz="1300" kern="1200" dirty="0">
+            <a:rPr lang="pt-BR" sz="1300" kern="1200">
               <a:latin typeface="Calibri Light" panose="020F0302020204030204"/>
             </a:rPr>
             <a:t>.</a:t>
           </a:r>
-          <a:endParaRPr lang="pt-BR" sz="1300" kern="1200" dirty="0"/>
+          <a:endParaRPr lang="pt-BR" sz="1300" kern="1200"/>
         </a:p>
       </dsp:txBody>
       <dsp:txXfrm>
@@ -2335,16 +2336,16 @@
             <a:buNone/>
           </a:pPr>
           <a:r>
-            <a:rPr lang="pt-BR" sz="1300" b="0" kern="1200" dirty="0"/>
+            <a:rPr lang="pt-BR" sz="1300" b="0" kern="1200"/>
             <a:t>total:</a:t>
           </a:r>
           <a:r>
-            <a:rPr lang="pt-BR" sz="1300" b="0" kern="1200" dirty="0">
+            <a:rPr lang="pt-BR" sz="1300" b="0" kern="1200">
               <a:latin typeface="Calibri Light" panose="020F0302020204030204"/>
             </a:rPr>
             <a:t> </a:t>
           </a:r>
-          <a:endParaRPr lang="pt-BR" sz="1300" b="0" kern="1200" dirty="0">
+          <a:endParaRPr lang="pt-BR" sz="1300" b="0" kern="1200">
             <a:latin typeface="Calibri"/>
             <a:cs typeface="Calibri"/>
           </a:endParaRPr>
@@ -2422,15 +2423,15 @@
             <a:buChar char="•"/>
           </a:pPr>
           <a:r>
-            <a:rPr lang="pt-BR" sz="1300" kern="1200" dirty="0"/>
+            <a:rPr lang="pt-BR" sz="1300" kern="1200"/>
             <a:t>soma das frequências das ordens; deveria equivaler ao total de pedidos (linhas, 73.670), porém por conta do arredondamento em "</a:t>
           </a:r>
           <a:r>
-            <a:rPr lang="pt-BR" sz="1300" kern="1200" dirty="0" err="1"/>
+            <a:rPr lang="pt-BR" sz="1300" kern="1200" err="1"/>
             <a:t>volumevalores</a:t>
           </a:r>
           <a:r>
-            <a:rPr lang="pt-BR" sz="1300" kern="1200" dirty="0"/>
+            <a:rPr lang="pt-BR" sz="1300" kern="1200"/>
             <a:t>", resulta 73.610.</a:t>
           </a:r>
         </a:p>
@@ -2508,20 +2509,20 @@
             <a:buNone/>
           </a:pPr>
           <a:r>
-            <a:rPr lang="pt-BR" sz="1300" kern="1200" dirty="0" err="1">
+            <a:rPr lang="pt-BR" sz="1300" kern="1200" err="1">
               <a:latin typeface="Calibri"/>
               <a:cs typeface="Calibri"/>
             </a:rPr>
             <a:t>volumetotal</a:t>
           </a:r>
           <a:r>
-            <a:rPr lang="pt-BR" sz="1300" kern="1200" dirty="0">
+            <a:rPr lang="pt-BR" sz="1300" kern="1200">
               <a:latin typeface="Calibri"/>
               <a:cs typeface="Calibri"/>
             </a:rPr>
             <a:t>: </a:t>
           </a:r>
-          <a:endParaRPr lang="pt-BR" sz="1300" kern="1200" dirty="0"/>
+          <a:endParaRPr lang="pt-BR" sz="1300" kern="1200"/>
         </a:p>
       </dsp:txBody>
       <dsp:txXfrm>
@@ -2596,23 +2597,23 @@
             <a:buChar char="•"/>
           </a:pPr>
           <a:r>
-            <a:rPr lang="pt-BR" sz="1300" kern="1200" dirty="0"/>
+            <a:rPr lang="pt-BR" sz="1300" kern="1200"/>
             <a:t>contribuição percentual acumulada do "</a:t>
           </a:r>
           <a:r>
-            <a:rPr lang="pt-BR" sz="1300" kern="1200" dirty="0" err="1"/>
+            <a:rPr lang="pt-BR" sz="1300" kern="1200" err="1"/>
             <a:t>volumeabsoluto</a:t>
           </a:r>
           <a:r>
-            <a:rPr lang="pt-BR" sz="1300" kern="1200" dirty="0"/>
+            <a:rPr lang="pt-BR" sz="1300" kern="1200"/>
             <a:t>" de cada ordem; </a:t>
           </a:r>
           <a:r>
-            <a:rPr lang="pt-BR" sz="1300" i="1" kern="1200" dirty="0"/>
+            <a:rPr lang="pt-BR" sz="1300" i="1" kern="1200"/>
             <a:t>e.g. </a:t>
           </a:r>
           <a:r>
-            <a:rPr lang="pt-BR" sz="1300" kern="1200" dirty="0"/>
+            <a:rPr lang="pt-BR" sz="1300" kern="1200"/>
             <a:t>pedidos de uma ordem correspondem a 0,0021% do total de ordens.</a:t>
           </a:r>
         </a:p>
@@ -2690,7 +2691,7 @@
             <a:buNone/>
           </a:pPr>
           <a:r>
-            <a:rPr lang="pt-BR" sz="1300" kern="1200" dirty="0" err="1"/>
+            <a:rPr lang="pt-BR" sz="1300" kern="1200" err="1"/>
             <a:t>cumulativopedidos</a:t>
           </a:r>
         </a:p>
@@ -2767,23 +2768,23 @@
             <a:buChar char="•"/>
           </a:pPr>
           <a:r>
-            <a:rPr lang="pt-BR" sz="1300" kern="1200" dirty="0"/>
+            <a:rPr lang="pt-BR" sz="1300" kern="1200"/>
             <a:t>contribuição percentual acumulada de "</a:t>
           </a:r>
           <a:r>
-            <a:rPr lang="pt-BR" sz="1300" kern="1200" dirty="0" err="1"/>
+            <a:rPr lang="pt-BR" sz="1300" kern="1200" err="1"/>
             <a:t>volumevalores</a:t>
           </a:r>
           <a:r>
-            <a:rPr lang="pt-BR" sz="1300" kern="1200" dirty="0"/>
+            <a:rPr lang="pt-BR" sz="1300" kern="1200"/>
             <a:t>" (frequência de cada ordem); </a:t>
           </a:r>
           <a:r>
-            <a:rPr lang="pt-BR" sz="1300" i="1" kern="1200" dirty="0"/>
+            <a:rPr lang="pt-BR" sz="1300" i="1" kern="1200"/>
             <a:t>e.g. </a:t>
           </a:r>
           <a:r>
-            <a:rPr lang="pt-BR" sz="1300" kern="1200" dirty="0"/>
+            <a:rPr lang="pt-BR" sz="1300" kern="1200"/>
             <a:t>pedidos com uma ordem correspondem a 11.50% das ordens efetuadas.</a:t>
           </a:r>
         </a:p>
@@ -2861,7 +2862,7 @@
             <a:buNone/>
           </a:pPr>
           <a:r>
-            <a:rPr lang="pt-BR" sz="1300" kern="1200" dirty="0" err="1">
+            <a:rPr lang="pt-BR" sz="1300" kern="1200" err="1">
               <a:latin typeface="Calibri Light" panose="020F0302020204030204"/>
             </a:rPr>
             <a:t>cumulativolume</a:t>
@@ -8064,14 +8065,14 @@
             <p:ph idx="1"/>
             <p:extLst>
               <p:ext uri="{D42A27DB-BD31-4B8C-83A1-F6EECF244321}">
-                <p14:modId xmlns:p14="http://schemas.microsoft.com/office/powerpoint/2010/main" val="1292658061"/>
+                <p14:modId xmlns:p14="http://schemas.microsoft.com/office/powerpoint/2010/main" val="1214327029"/>
               </p:ext>
             </p:extLst>
           </p:nvPr>
         </p:nvGraphicFramePr>
         <p:xfrm>
           <a:off x="4648018" y="1158583"/>
-          <a:ext cx="6900514" cy="4500624"/>
+          <a:ext cx="6900511" cy="5201970"/>
         </p:xfrm>
         <a:graphic>
           <a:graphicData uri="http://schemas.openxmlformats.org/drawingml/2006/table">
@@ -8080,34 +8081,41 @@
                 <a:tableStyleId>{9DCAF9ED-07DC-4A11-8D7F-57B35C25682E}</a:tableStyleId>
               </a:tblPr>
               <a:tblGrid>
-                <a:gridCol w="1412232">
+                <a:gridCol w="1130337">
                   <a:extLst>
                     <a:ext uri="{9D8B030D-6E8A-4147-A177-3AD203B41FA5}">
                       <a16:colId xmlns:a16="http://schemas.microsoft.com/office/drawing/2014/main" val="561607338"/>
                     </a:ext>
                   </a:extLst>
                 </a:gridCol>
-                <a:gridCol w="2663819">
+                <a:gridCol w="2132096">
                   <a:extLst>
                     <a:ext uri="{9D8B030D-6E8A-4147-A177-3AD203B41FA5}">
                       <a16:colId xmlns:a16="http://schemas.microsoft.com/office/drawing/2014/main" val="2997243364"/>
                     </a:ext>
                   </a:extLst>
                 </a:gridCol>
-                <a:gridCol w="1103547">
+                <a:gridCol w="883268">
                   <a:extLst>
                     <a:ext uri="{9D8B030D-6E8A-4147-A177-3AD203B41FA5}">
                       <a16:colId xmlns:a16="http://schemas.microsoft.com/office/drawing/2014/main" val="1968638382"/>
                     </a:ext>
                   </a:extLst>
                 </a:gridCol>
-                <a:gridCol w="1720916">
+                <a:gridCol w="1377405">
                   <a:extLst>
                     <a:ext uri="{9D8B030D-6E8A-4147-A177-3AD203B41FA5}">
                       <a16:colId xmlns:a16="http://schemas.microsoft.com/office/drawing/2014/main" val="1974084179"/>
                     </a:ext>
                   </a:extLst>
                 </a:gridCol>
+                <a:gridCol w="1377405">
+                  <a:extLst>
+                    <a:ext uri="{9D8B030D-6E8A-4147-A177-3AD203B41FA5}">
+                      <a16:colId xmlns:a16="http://schemas.microsoft.com/office/drawing/2014/main" val="3357232261"/>
+                    </a:ext>
+                  </a:extLst>
+                </a:gridCol>
               </a:tblGrid>
               <a:tr h="685280">
                 <a:tc>
@@ -8174,6 +8182,24 @@
                           <a:effectLst/>
                         </a:rPr>
                         <a:t>Material</a:t>
+                      </a:r>
+                    </a:p>
+                  </a:txBody>
+                  <a:tcPr marL="92605" marR="92605" marT="46303" marB="46303"/>
+                </a:tc>
+                <a:tc>
+                  <a:txBody>
+                    <a:bodyPr/>
+                    <a:lstStyle/>
+                    <a:p>
+                      <a:pPr lvl="0">
+                        <a:buNone/>
+                      </a:pPr>
+                      <a:r>
+                        <a:rPr lang="pt-BR" sz="1800">
+                          <a:effectLst/>
+                        </a:rPr>
+                        <a:t>Maco</a:t>
                       </a:r>
                     </a:p>
                   </a:txBody>
@@ -8261,6 +8287,24 @@
                   </a:txBody>
                   <a:tcPr marL="92605" marR="92605" marT="46303" marB="46303"/>
                 </a:tc>
+                <a:tc>
+                  <a:txBody>
+                    <a:bodyPr/>
+                    <a:lstStyle/>
+                    <a:p>
+                      <a:pPr lvl="0" algn="r">
+                        <a:buNone/>
+                      </a:pPr>
+                      <a:r>
+                        <a:rPr lang="en-US" sz="1800" u="none" strike="noStrike" noProof="0">
+                          <a:effectLst/>
+                        </a:rPr>
+                        <a:t>--</a:t>
+                      </a:r>
+                    </a:p>
+                  </a:txBody>
+                  <a:tcPr marL="92605" marR="92605" marT="46303" marB="46303"/>
+                </a:tc>
                 <a:extLst>
                   <a:ext uri="{0D108BD9-81ED-4DB2-BD59-A6C34878D82A}">
                     <a16:rowId xmlns:a16="http://schemas.microsoft.com/office/drawing/2014/main" val="3257412839"/>
@@ -8332,6 +8376,24 @@
                   </a:txBody>
                   <a:tcPr marL="92605" marR="92605" marT="46303" marB="46303"/>
                 </a:tc>
+                <a:tc>
+                  <a:txBody>
+                    <a:bodyPr/>
+                    <a:lstStyle/>
+                    <a:p>
+                      <a:pPr lvl="0" algn="r">
+                        <a:buNone/>
+                      </a:pPr>
+                      <a:r>
+                        <a:rPr lang="en-US" sz="1800" u="none" strike="noStrike" noProof="0">
+                          <a:effectLst/>
+                        </a:rPr>
+                        <a:t>--</a:t>
+                      </a:r>
+                    </a:p>
+                  </a:txBody>
+                  <a:tcPr marL="92605" marR="92605" marT="46303" marB="46303"/>
+                </a:tc>
                 <a:extLst>
                   <a:ext uri="{0D108BD9-81ED-4DB2-BD59-A6C34878D82A}">
                     <a16:rowId xmlns:a16="http://schemas.microsoft.com/office/drawing/2014/main" val="3676720756"/>
@@ -8417,6 +8479,24 @@
                   </a:txBody>
                   <a:tcPr marL="92605" marR="92605" marT="46303" marB="46303"/>
                 </a:tc>
+                <a:tc>
+                  <a:txBody>
+                    <a:bodyPr/>
+                    <a:lstStyle/>
+                    <a:p>
+                      <a:pPr lvl="0" algn="r">
+                        <a:buNone/>
+                      </a:pPr>
+                      <a:r>
+                        <a:rPr lang="en-US" sz="1800" u="none" strike="noStrike" noProof="0">
+                          <a:effectLst/>
+                        </a:rPr>
+                        <a:t>--</a:t>
+                      </a:r>
+                    </a:p>
+                  </a:txBody>
+                  <a:tcPr marL="92605" marR="92605" marT="46303" marB="46303"/>
+                </a:tc>
                 <a:extLst>
                   <a:ext uri="{0D108BD9-81ED-4DB2-BD59-A6C34878D82A}">
                     <a16:rowId xmlns:a16="http://schemas.microsoft.com/office/drawing/2014/main" val="435801689"/>
@@ -8495,6 +8575,24 @@
                   </a:txBody>
                   <a:tcPr marL="92605" marR="92605" marT="46303" marB="46303"/>
                 </a:tc>
+                <a:tc>
+                  <a:txBody>
+                    <a:bodyPr/>
+                    <a:lstStyle/>
+                    <a:p>
+                      <a:pPr lvl="0" algn="r">
+                        <a:buNone/>
+                      </a:pPr>
+                      <a:r>
+                        <a:rPr lang="en-US" sz="1800" u="none" strike="noStrike" noProof="0">
+                          <a:effectLst/>
+                        </a:rPr>
+                        <a:t>--</a:t>
+                      </a:r>
+                    </a:p>
+                  </a:txBody>
+                  <a:tcPr marL="92605" marR="92605" marT="46303" marB="46303"/>
+                </a:tc>
                 <a:extLst>
                   <a:ext uri="{0D108BD9-81ED-4DB2-BD59-A6C34878D82A}">
                     <a16:rowId xmlns:a16="http://schemas.microsoft.com/office/drawing/2014/main" val="1476444970"/>
@@ -8574,6 +8672,24 @@
                   </a:txBody>
                   <a:tcPr marL="92605" marR="92605" marT="46303" marB="46303"/>
                 </a:tc>
+                <a:tc>
+                  <a:txBody>
+                    <a:bodyPr/>
+                    <a:lstStyle/>
+                    <a:p>
+                      <a:pPr lvl="0" algn="r">
+                        <a:buNone/>
+                      </a:pPr>
+                      <a:r>
+                        <a:rPr lang="en-US" sz="1800" u="none" strike="noStrike" noProof="0">
+                          <a:effectLst/>
+                        </a:rPr>
+                        <a:t>--</a:t>
+                      </a:r>
+                    </a:p>
+                  </a:txBody>
+                  <a:tcPr marL="92605" marR="92605" marT="46303" marB="46303"/>
+                </a:tc>
                 <a:extLst>
                   <a:ext uri="{0D108BD9-81ED-4DB2-BD59-A6C34878D82A}">
                     <a16:rowId xmlns:a16="http://schemas.microsoft.com/office/drawing/2014/main" val="1587142533"/>
@@ -8652,6 +8768,24 @@
                   </a:txBody>
                   <a:tcPr marL="92605" marR="92605" marT="46303" marB="46303"/>
                 </a:tc>
+                <a:tc>
+                  <a:txBody>
+                    <a:bodyPr/>
+                    <a:lstStyle/>
+                    <a:p>
+                      <a:pPr lvl="0" algn="r">
+                        <a:buNone/>
+                      </a:pPr>
+                      <a:r>
+                        <a:rPr lang="en-US" sz="1800" u="none" strike="noStrike" noProof="0">
+                          <a:effectLst/>
+                        </a:rPr>
+                        <a:t>--</a:t>
+                      </a:r>
+                    </a:p>
+                  </a:txBody>
+                  <a:tcPr marL="92605" marR="92605" marT="46303" marB="46303"/>
+                </a:tc>
                 <a:extLst>
                   <a:ext uri="{0D108BD9-81ED-4DB2-BD59-A6C34878D82A}">
                     <a16:rowId xmlns:a16="http://schemas.microsoft.com/office/drawing/2014/main" val="2151159747"/>
@@ -8729,6 +8863,24 @@
                   </a:txBody>
                   <a:tcPr marL="92605" marR="92605" marT="46303" marB="46303"/>
                 </a:tc>
+                <a:tc>
+                  <a:txBody>
+                    <a:bodyPr/>
+                    <a:lstStyle/>
+                    <a:p>
+                      <a:pPr lvl="0" algn="r">
+                        <a:buNone/>
+                      </a:pPr>
+                      <a:r>
+                        <a:rPr lang="en-US" sz="1800" u="none" strike="noStrike" noProof="0">
+                          <a:effectLst/>
+                        </a:rPr>
+                        <a:t>--</a:t>
+                      </a:r>
+                    </a:p>
+                  </a:txBody>
+                  <a:tcPr marL="92605" marR="92605" marT="46303" marB="46303"/>
+                </a:tc>
                 <a:extLst>
                   <a:ext uri="{0D108BD9-81ED-4DB2-BD59-A6C34878D82A}">
                     <a16:rowId xmlns:a16="http://schemas.microsoft.com/office/drawing/2014/main" val="1965925465"/>
@@ -8808,6 +8960,24 @@
                         <a:t>59939</a:t>
                       </a:r>
                       <a:endParaRPr lang="pt-BR" sz="1800"/>
+                    </a:p>
+                  </a:txBody>
+                  <a:tcPr marL="92605" marR="92605" marT="46303" marB="46303"/>
+                </a:tc>
+                <a:tc>
+                  <a:txBody>
+                    <a:bodyPr/>
+                    <a:lstStyle/>
+                    <a:p>
+                      <a:pPr lvl="0" algn="r">
+                        <a:buNone/>
+                      </a:pPr>
+                      <a:r>
+                        <a:rPr lang="pt-BR" sz="1800" u="none" strike="noStrike" noProof="0">
+                          <a:effectLst/>
+                        </a:rPr>
+                        <a:t>--</a:t>
+                      </a:r>
                     </a:p>
                   </a:txBody>
                   <a:tcPr marL="92605" marR="92605" marT="46303" marB="46303"/>
@@ -8862,10 +9032,10 @@
       </p:grpSpPr>
       <p:sp useBgFill="1">
         <p:nvSpPr>
-          <p:cNvPr id="11" name="Rectangle 14">
+          <p:cNvPr id="25" name="Rectangle 24">
             <a:extLst>
               <a:ext uri="{FF2B5EF4-FFF2-40B4-BE49-F238E27FC236}">
-                <a16:creationId xmlns:a16="http://schemas.microsoft.com/office/drawing/2014/main" id="{A1F6BF70-C7D1-4AF9-8DB4-BEEB8A9C3529}"/>
+                <a16:creationId xmlns:a16="http://schemas.microsoft.com/office/drawing/2014/main" id="{47942995-B07F-4636-9A06-C6A104B260A8}"/>
               </a:ext>
               <a:ext uri="{C183D7F6-B498-43B3-948B-1728B52AA6E4}">
                 <adec:decorative xmlns:adec="http://schemas.microsoft.com/office/drawing/2017/decorative" val="1"/>
@@ -8938,50 +9108,69 @@
         </p:nvSpPr>
         <p:spPr>
           <a:xfrm>
-            <a:off x="645065" y="1097280"/>
-            <a:ext cx="3796306" cy="4666207"/>
+            <a:off x="1113810" y="2960716"/>
+            <a:ext cx="4036334" cy="2387600"/>
           </a:xfrm>
         </p:spPr>
         <p:txBody>
-          <a:bodyPr anchor="ctr">
+          <a:bodyPr vert="horz" lIns="91440" tIns="45720" rIns="91440" bIns="45720" rtlCol="0" anchor="t">
             <a:normAutofit/>
           </a:bodyPr>
           <a:lstStyle/>
           <a:p>
             <a:r>
-              <a:rPr lang="pt-BR" sz="3000" b="1">
-                <a:cs typeface="Calibri Light"/>
+              <a:rPr lang="en-US" sz="3000" b="1" kern="1200">
+                <a:solidFill>
+                  <a:schemeClr val="tx1"/>
+                </a:solidFill>
+                <a:latin typeface="+mj-lt"/>
+                <a:ea typeface="+mj-ea"/>
+                <a:cs typeface="+mj-cs"/>
               </a:rPr>
               <a:t>Submarcas</a:t>
             </a:r>
             <a:r>
-              <a:rPr lang="pt-BR" sz="3000">
-                <a:cs typeface="Calibri Light"/>
+              <a:rPr lang="en-US" sz="3000" kern="1200">
+                <a:solidFill>
+                  <a:schemeClr val="tx1"/>
+                </a:solidFill>
+                <a:latin typeface="+mj-lt"/>
+                <a:ea typeface="+mj-ea"/>
+                <a:cs typeface="+mj-cs"/>
               </a:rPr>
               <a:t> ["Subrand"] e </a:t>
             </a:r>
             <a:r>
-              <a:rPr lang="pt-BR" sz="3000" b="1">
-                <a:cs typeface="Calibri Light"/>
+              <a:rPr lang="en-US" sz="3000" b="1" kern="1200">
+                <a:solidFill>
+                  <a:schemeClr val="tx1"/>
+                </a:solidFill>
+                <a:latin typeface="+mj-lt"/>
+                <a:ea typeface="+mj-ea"/>
+                <a:cs typeface="+mj-cs"/>
               </a:rPr>
               <a:t>Material </a:t>
             </a:r>
             <a:r>
-              <a:rPr lang="pt-BR" sz="3000">
-                <a:cs typeface="Calibri Light"/>
+              <a:rPr lang="en-US" sz="3000" kern="1200">
+                <a:solidFill>
+                  <a:schemeClr val="tx1"/>
+                </a:solidFill>
+                <a:latin typeface="+mj-lt"/>
+                <a:ea typeface="+mj-ea"/>
+                <a:cs typeface="+mj-cs"/>
               </a:rPr>
               <a:t>["Material"]</a:t>
             </a:r>
-            <a:endParaRPr lang="pt-BR" sz="3000"/>
           </a:p>
         </p:txBody>
       </p:sp>
       <p:grpSp>
         <p:nvGrpSpPr>
-          <p:cNvPr id="13" name="Group 16">
+          <p:cNvPr id="27" name="Group 26">
             <a:extLst>
               <a:ext uri="{FF2B5EF4-FFF2-40B4-BE49-F238E27FC236}">
-                <a16:creationId xmlns:a16="http://schemas.microsoft.com/office/drawing/2014/main" id="{0C66A8B6-1F6E-4FCC-93B9-B9986B6FD111}"/>
+                <a16:creationId xmlns:a16="http://schemas.microsoft.com/office/drawing/2014/main" id="{032D8612-31EB-44CF-A1D0-14FD4C705424}"/>
               </a:ext>
               <a:ext uri="{C183D7F6-B498-43B3-948B-1728B52AA6E4}">
                 <adec:decorative xmlns:adec="http://schemas.microsoft.com/office/drawing/2017/decorative" val="1"/>
@@ -9001,18 +9190,21 @@
         </p:nvGrpSpPr>
         <p:grpSpPr>
           <a:xfrm>
-            <a:off x="82576" y="5945955"/>
-            <a:ext cx="12109423" cy="525780"/>
-            <a:chOff x="82576" y="5945955"/>
-            <a:chExt cx="12109423" cy="525780"/>
+            <a:off x="0" y="2984992"/>
+            <a:ext cx="731521" cy="673460"/>
+            <a:chOff x="3940602" y="308034"/>
+            <a:chExt cx="2116791" cy="3428999"/>
           </a:xfrm>
+          <a:solidFill>
+            <a:schemeClr val="accent4"/>
+          </a:solidFill>
         </p:grpSpPr>
         <p:sp>
           <p:nvSpPr>
-            <p:cNvPr id="18" name="Rectangle 17">
+            <p:cNvPr id="28" name="Rectangle 27">
               <a:extLst>
                 <a:ext uri="{FF2B5EF4-FFF2-40B4-BE49-F238E27FC236}">
-                  <a16:creationId xmlns:a16="http://schemas.microsoft.com/office/drawing/2014/main" id="{CAF7C4FD-65AD-4BBE-886A-D2E923F94C6C}"/>
+                  <a16:creationId xmlns:a16="http://schemas.microsoft.com/office/drawing/2014/main" id="{F19A4A0F-1B59-4DB0-9764-D10936E98770}"/>
                 </a:ext>
                 <a:ext uri="{C183D7F6-B498-43B3-948B-1728B52AA6E4}">
                   <adec:decorative xmlns:adec="http://schemas.microsoft.com/office/drawing/2017/decorative" val="1"/>
@@ -9029,16 +9221,14 @@
             </p:nvPr>
           </p:nvSpPr>
           <p:spPr>
-            <a:xfrm rot="5400000">
-              <a:off x="-103361" y="6131892"/>
-              <a:ext cx="524256" cy="152382"/>
+            <a:xfrm>
+              <a:off x="3940602" y="308034"/>
+              <a:ext cx="566743" cy="3428999"/>
             </a:xfrm>
             <a:prstGeom prst="rect">
               <a:avLst/>
             </a:prstGeom>
-            <a:solidFill>
-              <a:schemeClr val="accent4"/>
-            </a:solidFill>
+            <a:grpFill/>
             <a:ln>
               <a:noFill/>
             </a:ln>
@@ -9070,10 +9260,10 @@
         </p:sp>
         <p:sp>
           <p:nvSpPr>
-            <p:cNvPr id="19" name="Rectangle 18">
+            <p:cNvPr id="29" name="Rectangle 28">
               <a:extLst>
                 <a:ext uri="{FF2B5EF4-FFF2-40B4-BE49-F238E27FC236}">
-                  <a16:creationId xmlns:a16="http://schemas.microsoft.com/office/drawing/2014/main" id="{1BA8278B-6DF7-481F-B1FA-FFE7D6C3C7B6}"/>
+                  <a16:creationId xmlns:a16="http://schemas.microsoft.com/office/drawing/2014/main" id="{F399A70F-F8CD-4992-9EF5-6CF15472E73F}"/>
                 </a:ext>
                 <a:ext uri="{C183D7F6-B498-43B3-948B-1728B52AA6E4}">
                   <adec:decorative xmlns:adec="http://schemas.microsoft.com/office/drawing/2017/decorative" val="1"/>
@@ -9090,16 +9280,73 @@
             </p:nvPr>
           </p:nvSpPr>
           <p:spPr>
-            <a:xfrm rot="16200000" flipH="1">
-              <a:off x="5998176" y="277912"/>
-              <a:ext cx="524256" cy="11863390"/>
+            <a:xfrm>
+              <a:off x="4715626" y="308034"/>
+              <a:ext cx="566743" cy="3428999"/>
             </a:xfrm>
             <a:prstGeom prst="rect">
               <a:avLst/>
             </a:prstGeom>
-            <a:solidFill>
-              <a:schemeClr val="accent4"/>
-            </a:solidFill>
+            <a:grpFill/>
+            <a:ln>
+              <a:noFill/>
+            </a:ln>
+          </p:spPr>
+          <p:style>
+            <a:lnRef idx="2">
+              <a:schemeClr val="accent1">
+                <a:shade val="50000"/>
+              </a:schemeClr>
+            </a:lnRef>
+            <a:fillRef idx="1">
+              <a:schemeClr val="accent1"/>
+            </a:fillRef>
+            <a:effectRef idx="0">
+              <a:schemeClr val="accent1"/>
+            </a:effectRef>
+            <a:fontRef idx="minor">
+              <a:schemeClr val="lt1"/>
+            </a:fontRef>
+          </p:style>
+          <p:txBody>
+            <a:bodyPr rtlCol="0" anchor="ctr"/>
+            <a:lstStyle/>
+            <a:p>
+              <a:pPr algn="ctr"/>
+              <a:endParaRPr lang="en-US"/>
+            </a:p>
+          </p:txBody>
+        </p:sp>
+        <p:sp>
+          <p:nvSpPr>
+            <p:cNvPr id="30" name="Rectangle 29">
+              <a:extLst>
+                <a:ext uri="{FF2B5EF4-FFF2-40B4-BE49-F238E27FC236}">
+                  <a16:creationId xmlns:a16="http://schemas.microsoft.com/office/drawing/2014/main" id="{48F4FEDC-6D80-458C-A665-075D9B9500FD}"/>
+                </a:ext>
+                <a:ext uri="{C183D7F6-B498-43B3-948B-1728B52AA6E4}">
+                  <adec:decorative xmlns:adec="http://schemas.microsoft.com/office/drawing/2017/decorative" val="1"/>
+                </a:ext>
+              </a:extLst>
+            </p:cNvPr>
+            <p:cNvSpPr/>
+            <p:nvPr>
+              <p:extLst>
+                <p:ext uri="{386F3935-93C4-4BCD-93E2-E3B085C9AB24}">
+                  <p16:designElem xmlns:p16="http://schemas.microsoft.com/office/powerpoint/2015/main" val="1"/>
+                </p:ext>
+              </p:extLst>
+            </p:nvPr>
+          </p:nvSpPr>
+          <p:spPr>
+            <a:xfrm>
+              <a:off x="5490650" y="308034"/>
+              <a:ext cx="566743" cy="3428999"/>
+            </a:xfrm>
+            <a:prstGeom prst="rect">
+              <a:avLst/>
+            </a:prstGeom>
+            <a:grpFill/>
             <a:ln>
               <a:noFill/>
             </a:ln>
@@ -9132,10 +9379,73 @@
       </p:grpSp>
       <p:sp>
         <p:nvSpPr>
-          <p:cNvPr id="16" name="Rectangle 20">
+          <p:cNvPr id="32" name="Rectangle 31">
             <a:extLst>
               <a:ext uri="{FF2B5EF4-FFF2-40B4-BE49-F238E27FC236}">
-                <a16:creationId xmlns:a16="http://schemas.microsoft.com/office/drawing/2014/main" id="{2C1BBA94-3F40-40AA-8BB9-E69E25E537C1}"/>
+                <a16:creationId xmlns:a16="http://schemas.microsoft.com/office/drawing/2014/main" id="{B81933D1-5615-42C7-9C0B-4EB7105CCE2D}"/>
+              </a:ext>
+              <a:ext uri="{C183D7F6-B498-43B3-948B-1728B52AA6E4}">
+                <adec:decorative xmlns:adec="http://schemas.microsoft.com/office/drawing/2017/decorative" val="1"/>
+              </a:ext>
+            </a:extLst>
+          </p:cNvPr>
+          <p:cNvSpPr>
+            <a:spLocks noGrp="1" noRot="1" noChangeAspect="1" noMove="1" noResize="1" noEditPoints="1" noAdjustHandles="1" noChangeArrowheads="1" noChangeShapeType="1" noTextEdit="1"/>
+          </p:cNvSpPr>
+          <p:nvPr>
+            <p:extLst>
+              <p:ext uri="{386F3935-93C4-4BCD-93E2-E3B085C9AB24}">
+                <p16:designElem xmlns:p16="http://schemas.microsoft.com/office/powerpoint/2015/main" val="1"/>
+              </p:ext>
+            </p:extLst>
+          </p:nvPr>
+        </p:nvSpPr>
+        <p:spPr>
+          <a:xfrm flipH="1">
+            <a:off x="10697670" y="0"/>
+            <a:ext cx="1494330" cy="6858000"/>
+          </a:xfrm>
+          <a:prstGeom prst="rect">
+            <a:avLst/>
+          </a:prstGeom>
+          <a:solidFill>
+            <a:schemeClr val="accent4"/>
+          </a:solidFill>
+          <a:ln>
+            <a:noFill/>
+          </a:ln>
+        </p:spPr>
+        <p:style>
+          <a:lnRef idx="2">
+            <a:schemeClr val="accent1">
+              <a:shade val="50000"/>
+            </a:schemeClr>
+          </a:lnRef>
+          <a:fillRef idx="1">
+            <a:schemeClr val="accent1"/>
+          </a:fillRef>
+          <a:effectRef idx="0">
+            <a:schemeClr val="accent1"/>
+          </a:effectRef>
+          <a:fontRef idx="minor">
+            <a:schemeClr val="lt1"/>
+          </a:fontRef>
+        </p:style>
+        <p:txBody>
+          <a:bodyPr rtlCol="0" anchor="ctr"/>
+          <a:lstStyle/>
+          <a:p>
+            <a:pPr algn="ctr"/>
+            <a:endParaRPr lang="en-US"/>
+          </a:p>
+        </p:txBody>
+      </p:sp>
+      <p:sp>
+        <p:nvSpPr>
+          <p:cNvPr id="34" name="Rectangle 33">
+            <a:extLst>
+              <a:ext uri="{FF2B5EF4-FFF2-40B4-BE49-F238E27FC236}">
+                <a16:creationId xmlns:a16="http://schemas.microsoft.com/office/drawing/2014/main" id="{19C9EAEA-39D0-4B0E-A0EB-51E7B26740B1}"/>
               </a:ext>
               <a:ext uri="{C183D7F6-B498-43B3-948B-1728B52AA6E4}">
                 <adec:decorative xmlns:adec="http://schemas.microsoft.com/office/drawing/2017/decorative" val="1"/>
@@ -9155,8 +9465,8 @@
         </p:nvSpPr>
         <p:spPr>
           <a:xfrm>
-            <a:off x="5133706" y="587829"/>
-            <a:ext cx="6505300" cy="5682342"/>
+            <a:off x="5685810" y="391886"/>
+            <a:ext cx="6009366" cy="6017078"/>
           </a:xfrm>
           <a:prstGeom prst="rect">
             <a:avLst/>
@@ -9214,11 +9524,16 @@
           </p:cNvGraphicFramePr>
           <p:nvPr>
             <p:ph idx="1"/>
+            <p:extLst>
+              <p:ext uri="{D42A27DB-BD31-4B8C-83A1-F6EECF244321}">
+                <p14:modId xmlns:p14="http://schemas.microsoft.com/office/powerpoint/2010/main" val="2463725920"/>
+              </p:ext>
+            </p:extLst>
           </p:nvPr>
         </p:nvGraphicFramePr>
         <p:xfrm>
-          <a:off x="5431536" y="1037060"/>
-          <a:ext cx="5918187" cy="4933522"/>
+          <a:off x="5922492" y="1101325"/>
+          <a:ext cx="5536004" cy="4596605"/>
         </p:xfrm>
         <a:graphic>
           <a:graphicData uri="http://schemas.openxmlformats.org/drawingml/2006/table">
@@ -9227,36 +9542,43 @@
                 <a:tableStyleId>{10A1B5D5-9B99-4C35-A422-299274C87663}</a:tableStyleId>
               </a:tblPr>
               <a:tblGrid>
-                <a:gridCol w="1549960">
+                <a:gridCol w="1043392">
                   <a:extLst>
                     <a:ext uri="{9D8B030D-6E8A-4147-A177-3AD203B41FA5}">
                       <a16:colId xmlns:a16="http://schemas.microsoft.com/office/drawing/2014/main" val="1754422313"/>
                     </a:ext>
                   </a:extLst>
                 </a:gridCol>
-                <a:gridCol w="1928177">
+                <a:gridCol w="1800418">
                   <a:extLst>
                     <a:ext uri="{9D8B030D-6E8A-4147-A177-3AD203B41FA5}">
                       <a16:colId xmlns:a16="http://schemas.microsoft.com/office/drawing/2014/main" val="2045682995"/>
                     </a:ext>
                   </a:extLst>
                 </a:gridCol>
-                <a:gridCol w="1220025">
+                <a:gridCol w="713156">
                   <a:extLst>
                     <a:ext uri="{9D8B030D-6E8A-4147-A177-3AD203B41FA5}">
                       <a16:colId xmlns:a16="http://schemas.microsoft.com/office/drawing/2014/main" val="2068637328"/>
                     </a:ext>
                   </a:extLst>
                 </a:gridCol>
-                <a:gridCol w="1220025">
+                <a:gridCol w="1069979">
                   <a:extLst>
                     <a:ext uri="{9D8B030D-6E8A-4147-A177-3AD203B41FA5}">
                       <a16:colId xmlns:a16="http://schemas.microsoft.com/office/drawing/2014/main" val="4181328837"/>
                     </a:ext>
                   </a:extLst>
                 </a:gridCol>
+                <a:gridCol w="909059">
+                  <a:extLst>
+                    <a:ext uri="{9D8B030D-6E8A-4147-A177-3AD203B41FA5}">
+                      <a16:colId xmlns:a16="http://schemas.microsoft.com/office/drawing/2014/main" val="938961432"/>
+                    </a:ext>
+                  </a:extLst>
+                </a:gridCol>
               </a:tblGrid>
-              <a:tr h="496033">
+              <a:tr h="265960">
                 <a:tc>
                   <a:txBody>
                     <a:bodyPr/>
@@ -9264,14 +9586,14 @@
                     <a:p>
                       <a:pPr rtl="0" fontAlgn="base"/>
                       <a:r>
-                        <a:rPr lang="pt-BR" sz="1300">
+                        <a:rPr lang="pt-BR" sz="1100">
                           <a:effectLst/>
                         </a:rPr>
                         <a:t>Submarca​</a:t>
                       </a:r>
                     </a:p>
                   </a:txBody>
-                  <a:tcPr marL="67031" marR="67031" marT="33516" marB="33516"/>
+                  <a:tcPr marL="59085" marR="59085" marT="29543" marB="29543"/>
                 </a:tc>
                 <a:tc>
                   <a:txBody>
@@ -9282,15 +9604,15 @@
                         <a:buNone/>
                       </a:pPr>
                       <a:r>
-                        <a:rPr lang="pt-BR" sz="1300">
+                        <a:rPr lang="pt-BR" sz="1100">
                           <a:effectLst/>
                         </a:rPr>
                         <a:t>Contribuição  percentual​</a:t>
                       </a:r>
-                      <a:endParaRPr lang="pt-BR" sz="1300"/>
-                    </a:p>
-                  </a:txBody>
-                  <a:tcPr marL="67031" marR="67031" marT="33516" marB="33516"/>
+                      <a:endParaRPr lang="pt-BR" sz="1100"/>
+                    </a:p>
+                  </a:txBody>
+                  <a:tcPr marL="59085" marR="59085" marT="29543" marB="29543"/>
                 </a:tc>
                 <a:tc>
                   <a:txBody>
@@ -9299,14 +9621,14 @@
                     <a:p>
                       <a:pPr rtl="0" fontAlgn="base"/>
                       <a:r>
-                        <a:rPr lang="pt-BR" sz="1300">
+                        <a:rPr lang="pt-BR" sz="1100">
                           <a:effectLst/>
                         </a:rPr>
                         <a:t>Vendas​</a:t>
                       </a:r>
                     </a:p>
                   </a:txBody>
-                  <a:tcPr marL="67031" marR="67031" marT="33516" marB="33516"/>
+                  <a:tcPr marL="59085" marR="59085" marT="29543" marB="29543"/>
                 </a:tc>
                 <a:tc>
                   <a:txBody>
@@ -9317,14 +9639,32 @@
                         <a:buNone/>
                       </a:pPr>
                       <a:r>
-                        <a:rPr lang="pt-BR" sz="1300">
+                        <a:rPr lang="pt-BR" sz="1100">
                           <a:effectLst/>
                         </a:rPr>
                         <a:t>Material</a:t>
                       </a:r>
                     </a:p>
                   </a:txBody>
-                  <a:tcPr marL="67031" marR="67031" marT="33516" marB="33516"/>
+                  <a:tcPr marL="59085" marR="59085" marT="29543" marB="29543"/>
+                </a:tc>
+                <a:tc>
+                  <a:txBody>
+                    <a:bodyPr/>
+                    <a:lstStyle/>
+                    <a:p>
+                      <a:pPr lvl="0">
+                        <a:buNone/>
+                      </a:pPr>
+                      <a:r>
+                        <a:rPr lang="pt-BR" sz="1100">
+                          <a:effectLst/>
+                        </a:rPr>
+                        <a:t>Maco</a:t>
+                      </a:r>
+                    </a:p>
+                  </a:txBody>
+                  <a:tcPr marL="59085" marR="59085" marT="29542" marB="29542"/>
                 </a:tc>
                 <a:extLst>
                   <a:ext uri="{0D108BD9-81ED-4DB2-BD59-A6C34878D82A}">
@@ -9332,7 +9672,7 @@
                   </a:ext>
                 </a:extLst>
               </a:tr>
-              <a:tr h="496033">
+              <a:tr h="440593">
                 <a:tc>
                   <a:txBody>
                     <a:bodyPr/>
@@ -9340,14 +9680,14 @@
                     <a:p>
                       <a:pPr rtl="0" fontAlgn="base"/>
                       <a:r>
-                        <a:rPr lang="pt-BR" sz="1300">
+                        <a:rPr lang="pt-BR" sz="1100">
                           <a:effectLst/>
                         </a:rPr>
                         <a:t>CAMDEN PALE ALE​</a:t>
                       </a:r>
                     </a:p>
                   </a:txBody>
-                  <a:tcPr marL="67031" marR="67031" marT="33516" marB="33516"/>
+                  <a:tcPr marL="59085" marR="59085" marT="29543" marB="29543"/>
                 </a:tc>
                 <a:tc>
                   <a:txBody>
@@ -9358,15 +9698,15 @@
                         <a:buNone/>
                       </a:pPr>
                       <a:r>
-                        <a:rPr lang="pt-BR" sz="1300">
+                        <a:rPr lang="pt-BR" sz="1100">
                           <a:effectLst/>
                         </a:rPr>
                         <a:t>0,7841 ​</a:t>
                       </a:r>
-                      <a:endParaRPr lang="pt-BR" sz="1300"/>
-                    </a:p>
-                  </a:txBody>
-                  <a:tcPr marL="67031" marR="67031" marT="33516" marB="33516"/>
+                      <a:endParaRPr lang="pt-BR" sz="1100"/>
+                    </a:p>
+                  </a:txBody>
+                  <a:tcPr marL="59085" marR="59085" marT="29543" marB="29543"/>
                 </a:tc>
                 <a:tc>
                   <a:txBody>
@@ -9375,14 +9715,14 @@
                     <a:p>
                       <a:pPr algn="r" rtl="0" fontAlgn="base"/>
                       <a:r>
-                        <a:rPr lang="pt-BR" sz="1300">
+                        <a:rPr lang="pt-BR" sz="1100">
                           <a:effectLst/>
                         </a:rPr>
                         <a:t>247​</a:t>
                       </a:r>
                     </a:p>
                   </a:txBody>
-                  <a:tcPr marL="67031" marR="67031" marT="33516" marB="33516"/>
+                  <a:tcPr marL="59085" marR="59085" marT="29543" marB="29543"/>
                 </a:tc>
                 <a:tc>
                   <a:txBody>
@@ -9393,43 +9733,61 @@
                         <a:buNone/>
                       </a:pPr>
                       <a:r>
-                        <a:rPr lang="pt-BR" sz="1300">
+                        <a:rPr lang="pt-BR" sz="1100">
                           <a:effectLst/>
                         </a:rPr>
                         <a:t>330ml: </a:t>
                       </a:r>
                       <a:r>
-                        <a:rPr lang="en-US" sz="1300" b="0" i="0" u="none" strike="noStrike" noProof="0">
+                        <a:rPr lang="en-US" sz="1100" b="0" i="0" u="none" strike="noStrike" noProof="0">
                           <a:effectLst/>
                           <a:latin typeface="Calibri"/>
                         </a:rPr>
                         <a:t>64601</a:t>
                       </a:r>
                       <a:br>
-                        <a:rPr lang="en-US" sz="1300" b="0" i="0" u="none" strike="noStrike" noProof="0">
+                        <a:rPr lang="en-US" sz="1100" b="0" i="0" u="none" strike="noStrike" noProof="0">
                           <a:effectLst/>
                           <a:latin typeface="Calibri"/>
                         </a:rPr>
                       </a:br>
                       <a:r>
-                        <a:rPr lang="en-US" sz="1300" b="0" i="0" u="none" strike="noStrike" noProof="0">
+                        <a:rPr lang="en-US" sz="1100" b="0" i="0" u="none" strike="noStrike" noProof="0">
                           <a:effectLst/>
                           <a:latin typeface="Calibri"/>
                         </a:rPr>
                         <a:t>330ml: </a:t>
                       </a:r>
                       <a:r>
-                        <a:rPr lang="en-US" sz="1300" b="0" i="0" u="none" strike="noStrike" noProof="0">
+                        <a:rPr lang="en-US" sz="1100" b="0" i="0" u="none" strike="noStrike" noProof="0">
                           <a:effectLst/>
                         </a:rPr>
                         <a:t>79923</a:t>
                       </a:r>
-                      <a:endParaRPr lang="pt-BR" sz="1300">
+                      <a:endParaRPr lang="pt-BR" sz="1100">
                         <a:effectLst/>
                       </a:endParaRPr>
                     </a:p>
                   </a:txBody>
-                  <a:tcPr marL="67031" marR="67031" marT="33516" marB="33516"/>
+                  <a:tcPr marL="59085" marR="59085" marT="29543" marB="29543"/>
+                </a:tc>
+                <a:tc>
+                  <a:txBody>
+                    <a:bodyPr/>
+                    <a:lstStyle/>
+                    <a:p>
+                      <a:pPr lvl="0" algn="r">
+                        <a:buNone/>
+                      </a:pPr>
+                      <a:r>
+                        <a:rPr lang="en-US" sz="1100" b="0" i="0" u="none" strike="noStrike" noProof="0">
+                          <a:effectLst/>
+                        </a:rPr>
+                        <a:t>--</a:t>
+                      </a:r>
+                    </a:p>
+                  </a:txBody>
+                  <a:tcPr marL="59085" marR="59085" marT="29542" marB="29542"/>
                 </a:tc>
                 <a:extLst>
                   <a:ext uri="{0D108BD9-81ED-4DB2-BD59-A6C34878D82A}">
@@ -9437,7 +9795,7 @@
                   </a:ext>
                 </a:extLst>
               </a:tr>
-              <a:tr h="496033">
+              <a:tr h="440593">
                 <a:tc>
                   <a:txBody>
                     <a:bodyPr/>
@@ -9445,14 +9803,14 @@
                     <a:p>
                       <a:pPr rtl="0" fontAlgn="base"/>
                       <a:r>
-                        <a:rPr lang="pt-BR" sz="1300">
+                        <a:rPr lang="pt-BR" sz="1100">
                           <a:effectLst/>
                         </a:rPr>
                         <a:t>CAMDEN HELLS​</a:t>
                       </a:r>
                     </a:p>
                   </a:txBody>
-                  <a:tcPr marL="67031" marR="67031" marT="33516" marB="33516"/>
+                  <a:tcPr marL="59085" marR="59085" marT="29543" marB="29543"/>
                 </a:tc>
                 <a:tc>
                   <a:txBody>
@@ -9463,15 +9821,15 @@
                         <a:buNone/>
                       </a:pPr>
                       <a:r>
-                        <a:rPr lang="pt-BR" sz="1300">
+                        <a:rPr lang="pt-BR" sz="1100">
                           <a:effectLst/>
                         </a:rPr>
                         <a:t>0,2159​</a:t>
                       </a:r>
-                      <a:endParaRPr lang="pt-BR" sz="1300"/>
-                    </a:p>
-                  </a:txBody>
-                  <a:tcPr marL="67031" marR="67031" marT="33516" marB="33516"/>
+                      <a:endParaRPr lang="pt-BR" sz="1100"/>
+                    </a:p>
+                  </a:txBody>
+                  <a:tcPr marL="59085" marR="59085" marT="29543" marB="29543"/>
                 </a:tc>
                 <a:tc>
                   <a:txBody>
@@ -9480,14 +9838,14 @@
                     <a:p>
                       <a:pPr algn="r" rtl="0" fontAlgn="base"/>
                       <a:r>
-                        <a:rPr lang="pt-BR" sz="1300">
+                        <a:rPr lang="pt-BR" sz="1100">
                           <a:effectLst/>
                         </a:rPr>
                         <a:t>68​</a:t>
                       </a:r>
                     </a:p>
                   </a:txBody>
-                  <a:tcPr marL="67031" marR="67031" marT="33516" marB="33516"/>
+                  <a:tcPr marL="59085" marR="59085" marT="29543" marB="29543"/>
                 </a:tc>
                 <a:tc>
                   <a:txBody>
@@ -9498,44 +9856,62 @@
                         <a:buNone/>
                       </a:pPr>
                       <a:r>
-                        <a:rPr lang="pt-BR" sz="1300">
+                        <a:rPr lang="pt-BR" sz="1100">
                           <a:effectLst/>
                         </a:rPr>
                         <a:t>330ml: </a:t>
                       </a:r>
                       <a:r>
-                        <a:rPr lang="en-US" sz="1300" b="0" i="0" u="none" strike="noStrike" noProof="0">
+                        <a:rPr lang="en-US" sz="1100" b="0" i="0" u="none" strike="noStrike" noProof="0">
                           <a:effectLst/>
                           <a:latin typeface="Calibri"/>
                         </a:rPr>
                         <a:t>64590</a:t>
                       </a:r>
                       <a:br>
-                        <a:rPr lang="en-US" sz="1300" b="0" i="0" u="none" strike="noStrike" noProof="0">
+                        <a:rPr lang="en-US" sz="1100" b="0" i="0" u="none" strike="noStrike" noProof="0">
                           <a:effectLst/>
                           <a:latin typeface="Calibri"/>
                         </a:rPr>
                       </a:br>
                       <a:r>
-                        <a:rPr lang="en-US" sz="1300" b="0" i="0" u="none" strike="noStrike" noProof="0">
+                        <a:rPr lang="en-US" sz="1100" b="0" i="0" u="none" strike="noStrike" noProof="0">
                           <a:effectLst/>
                           <a:latin typeface="Calibri"/>
                         </a:rPr>
                         <a:t>330ml: </a:t>
                       </a:r>
                       <a:r>
-                        <a:rPr lang="en-US" sz="1300" b="0" i="0" u="none" strike="noStrike" noProof="0">
+                        <a:rPr lang="en-US" sz="1100" b="0" i="0" u="none" strike="noStrike" noProof="0">
                           <a:effectLst/>
                         </a:rPr>
                         <a:t>79894</a:t>
                       </a:r>
-                      <a:endParaRPr lang="en-US" sz="1300" b="0" i="0" u="none" strike="noStrike" noProof="0">
+                      <a:endParaRPr lang="en-US" sz="1100" b="0" i="0" u="none" strike="noStrike" noProof="0">
                         <a:effectLst/>
                         <a:latin typeface="Calibri"/>
                       </a:endParaRPr>
                     </a:p>
                   </a:txBody>
-                  <a:tcPr marL="67031" marR="67031" marT="33516" marB="33516"/>
+                  <a:tcPr marL="59085" marR="59085" marT="29543" marB="29543"/>
+                </a:tc>
+                <a:tc>
+                  <a:txBody>
+                    <a:bodyPr/>
+                    <a:lstStyle/>
+                    <a:p>
+                      <a:pPr lvl="0" algn="r">
+                        <a:buNone/>
+                      </a:pPr>
+                      <a:r>
+                        <a:rPr lang="en-US" sz="1100" b="0" i="0" u="none" strike="noStrike" noProof="0">
+                          <a:effectLst/>
+                        </a:rPr>
+                        <a:t>--</a:t>
+                      </a:r>
+                    </a:p>
+                  </a:txBody>
+                  <a:tcPr marL="59085" marR="59085" marT="29542" marB="29542"/>
                 </a:tc>
                 <a:extLst>
                   <a:ext uri="{0D108BD9-81ED-4DB2-BD59-A6C34878D82A}">
@@ -9543,7 +9919,7 @@
                   </a:ext>
                 </a:extLst>
               </a:tr>
-              <a:tr h="294939">
+              <a:tr h="265960">
                 <a:tc rowSpan="2">
                   <a:txBody>
                     <a:bodyPr/>
@@ -9551,14 +9927,14 @@
                     <a:p>
                       <a:pPr rtl="0" fontAlgn="base"/>
                       <a:r>
-                        <a:rPr lang="pt-BR" sz="1300">
+                        <a:rPr lang="pt-BR" sz="1100">
                           <a:effectLst/>
                         </a:rPr>
                         <a:t>TRIPLE KARMELIET​</a:t>
                       </a:r>
                     </a:p>
                   </a:txBody>
-                  <a:tcPr marL="67031" marR="67031" marT="33516" marB="33516"/>
+                  <a:tcPr marL="59085" marR="59085" marT="29543" marB="29543"/>
                 </a:tc>
                 <a:tc rowSpan="2">
                   <a:txBody>
@@ -9569,27 +9945,27 @@
                         <a:buNone/>
                       </a:pPr>
                       <a:r>
-                        <a:rPr lang="pt-BR" sz="1300">
+                        <a:rPr lang="pt-BR" sz="1100">
                           <a:effectLst/>
                         </a:rPr>
                         <a:t>1,0000​</a:t>
                       </a:r>
-                      <a:endParaRPr lang="pt-BR" sz="1300"/>
+                      <a:endParaRPr lang="pt-BR" sz="1100"/>
                     </a:p>
                     <a:p>
                       <a:pPr lvl="0" algn="r" rtl="0">
                         <a:buNone/>
                       </a:pPr>
                       <a:r>
-                        <a:rPr lang="pt-BR" sz="1300">
+                        <a:rPr lang="pt-BR" sz="1100">
                           <a:effectLst/>
                         </a:rPr>
                         <a:t>​</a:t>
                       </a:r>
-                      <a:endParaRPr lang="pt-BR" sz="1300"/>
-                    </a:p>
-                  </a:txBody>
-                  <a:tcPr marL="67031" marR="67031" marT="33516" marB="33516"/>
+                      <a:endParaRPr lang="pt-BR" sz="1100"/>
+                    </a:p>
+                  </a:txBody>
+                  <a:tcPr marL="59085" marR="59085" marT="29543" marB="29543"/>
                 </a:tc>
                 <a:tc>
                   <a:txBody>
@@ -9600,14 +9976,14 @@
                         <a:buNone/>
                       </a:pPr>
                       <a:r>
-                        <a:rPr lang="pt-BR" sz="1300">
+                        <a:rPr lang="pt-BR" sz="1100">
                           <a:effectLst/>
                         </a:rPr>
                         <a:t>2020</a:t>
                       </a:r>
                     </a:p>
                   </a:txBody>
-                  <a:tcPr marL="67031" marR="67031" marT="33516" marB="33516"/>
+                  <a:tcPr marL="59085" marR="59085" marT="29543" marB="29543"/>
                 </a:tc>
                 <a:tc>
                   <a:txBody>
@@ -9618,24 +9994,44 @@
                         <a:buNone/>
                       </a:pPr>
                       <a:r>
-                        <a:rPr lang="pt-BR" sz="1300">
+                        <a:rPr lang="pt-BR" sz="1100">
                           <a:effectLst/>
                         </a:rPr>
                         <a:t>6 L : </a:t>
                       </a:r>
                       <a:r>
-                        <a:rPr lang="pt-BR" sz="1300" b="0" i="0" u="none" strike="noStrike" noProof="0">
+                        <a:rPr lang="pt-BR" sz="1100" b="0" i="0" u="none" strike="noStrike" noProof="0">
                           <a:effectLst/>
                           <a:latin typeface="Calibri"/>
                         </a:rPr>
                         <a:t>66989</a:t>
                       </a:r>
-                      <a:endParaRPr lang="pt-BR" sz="1300">
+                      <a:endParaRPr lang="pt-BR" sz="1100">
                         <a:effectLst/>
                       </a:endParaRPr>
                     </a:p>
                   </a:txBody>
-                  <a:tcPr marL="67031" marR="67031" marT="33516" marB="33516"/>
+                  <a:tcPr marL="59085" marR="59085" marT="29543" marB="29543"/>
+                </a:tc>
+                <a:tc>
+                  <a:txBody>
+                    <a:bodyPr/>
+                    <a:lstStyle/>
+                    <a:p>
+                      <a:pPr lvl="0" algn="r">
+                        <a:buNone/>
+                      </a:pPr>
+                      <a:r>
+                        <a:rPr lang="pt-BR" sz="1100" b="0" i="0" u="none" strike="noStrike" noProof="0">
+                          <a:effectLst/>
+                          <a:latin typeface="Calibri"/>
+                        </a:rPr>
+                        <a:t>195.33404</a:t>
+                      </a:r>
+                      <a:endParaRPr lang="pt-BR" sz="1600"/>
+                    </a:p>
+                  </a:txBody>
+                  <a:tcPr marL="59085" marR="59085" marT="29542" marB="29542"/>
                 </a:tc>
                 <a:extLst>
                   <a:ext uri="{0D108BD9-81ED-4DB2-BD59-A6C34878D82A}">
@@ -9643,7 +10039,7 @@
                   </a:ext>
                 </a:extLst>
               </a:tr>
-              <a:tr h="294939">
+              <a:tr h="265960">
                 <a:tc vMerge="1">
                   <a:txBody>
                     <a:bodyPr/>
@@ -9679,14 +10075,14 @@
                         <a:buNone/>
                       </a:pPr>
                       <a:r>
-                        <a:rPr lang="pt-BR" sz="1300">
+                        <a:rPr lang="pt-BR" sz="1100">
                           <a:effectLst/>
                         </a:rPr>
                         <a:t>1262</a:t>
                       </a:r>
                     </a:p>
                   </a:txBody>
-                  <a:tcPr marL="67031" marR="67031" marT="33516" marB="33516"/>
+                  <a:tcPr marL="59085" marR="59085" marT="29543" marB="29543"/>
                 </a:tc>
                 <a:tc>
                   <a:txBody>
@@ -9697,24 +10093,43 @@
                         <a:buNone/>
                       </a:pPr>
                       <a:r>
-                        <a:rPr lang="pt-BR" sz="1300">
+                        <a:rPr lang="pt-BR" sz="1100">
                           <a:effectLst/>
                         </a:rPr>
                         <a:t>330ml: </a:t>
                       </a:r>
                       <a:r>
-                        <a:rPr lang="pt-BR" sz="1300" b="0" i="0" u="none" strike="noStrike" noProof="0">
+                        <a:rPr lang="pt-BR" sz="1100" b="0" i="0" u="none" strike="noStrike" noProof="0">
                           <a:effectLst/>
                           <a:latin typeface="Calibri"/>
                         </a:rPr>
                         <a:t>59874</a:t>
                       </a:r>
-                      <a:endParaRPr lang="pt-BR" sz="1300">
+                      <a:endParaRPr lang="pt-BR" sz="1100">
                         <a:effectLst/>
                       </a:endParaRPr>
                     </a:p>
                   </a:txBody>
-                  <a:tcPr marL="67031" marR="67031" marT="33516" marB="33516"/>
+                  <a:tcPr marL="59085" marR="59085" marT="29543" marB="29543"/>
+                </a:tc>
+                <a:tc>
+                  <a:txBody>
+                    <a:bodyPr/>
+                    <a:lstStyle/>
+                    <a:p>
+                      <a:pPr lvl="0" algn="r">
+                        <a:buNone/>
+                      </a:pPr>
+                      <a:r>
+                        <a:rPr lang="pt-BR" sz="1100" b="0" i="0" u="none" strike="noStrike" noProof="0">
+                          <a:effectLst/>
+                          <a:latin typeface="Calibri"/>
+                        </a:rPr>
+                        <a:t>186.9042</a:t>
+                      </a:r>
+                    </a:p>
+                  </a:txBody>
+                  <a:tcPr marL="59085" marR="59085" marT="29542" marB="29542"/>
                 </a:tc>
                 <a:extLst>
                   <a:ext uri="{0D108BD9-81ED-4DB2-BD59-A6C34878D82A}">
@@ -9722,7 +10137,7 @@
                   </a:ext>
                 </a:extLst>
               </a:tr>
-              <a:tr h="294939">
+              <a:tr h="265960">
                 <a:tc rowSpan="2">
                   <a:txBody>
                     <a:bodyPr/>
@@ -9730,14 +10145,14 @@
                     <a:p>
                       <a:pPr rtl="0" fontAlgn="base"/>
                       <a:r>
-                        <a:rPr lang="pt-BR" sz="1300">
+                        <a:rPr lang="pt-BR" sz="1100">
                           <a:effectLst/>
                         </a:rPr>
                         <a:t>KWAK​</a:t>
                       </a:r>
                     </a:p>
                   </a:txBody>
-                  <a:tcPr marL="67031" marR="67031" marT="33516" marB="33516"/>
+                  <a:tcPr marL="59085" marR="59085" marT="29543" marB="29543"/>
                 </a:tc>
                 <a:tc rowSpan="2">
                   <a:txBody>
@@ -9748,15 +10163,15 @@
                         <a:buNone/>
                       </a:pPr>
                       <a:r>
-                        <a:rPr lang="pt-BR" sz="1300">
+                        <a:rPr lang="pt-BR" sz="1100">
                           <a:effectLst/>
                         </a:rPr>
                         <a:t>1,0000​</a:t>
                       </a:r>
-                      <a:endParaRPr lang="pt-BR" sz="1300"/>
-                    </a:p>
-                  </a:txBody>
-                  <a:tcPr marL="67031" marR="67031" marT="33516" marB="33516"/>
+                      <a:endParaRPr lang="pt-BR" sz="1100"/>
+                    </a:p>
+                  </a:txBody>
+                  <a:tcPr marL="59085" marR="59085" marT="29543" marB="29543"/>
                 </a:tc>
                 <a:tc>
                   <a:txBody>
@@ -9765,14 +10180,14 @@
                     <a:p>
                       <a:pPr algn="r" rtl="0" fontAlgn="base"/>
                       <a:r>
-                        <a:rPr lang="pt-BR" sz="1300">
+                        <a:rPr lang="pt-BR" sz="1100">
                           <a:effectLst/>
                         </a:rPr>
                         <a:t>1882</a:t>
                       </a:r>
                     </a:p>
                   </a:txBody>
-                  <a:tcPr marL="67031" marR="67031" marT="33516" marB="33516"/>
+                  <a:tcPr marL="59085" marR="59085" marT="29543" marB="29543"/>
                 </a:tc>
                 <a:tc>
                   <a:txBody>
@@ -9783,24 +10198,43 @@
                         <a:buNone/>
                       </a:pPr>
                       <a:r>
-                        <a:rPr lang="pt-BR" sz="1300">
+                        <a:rPr lang="pt-BR" sz="1100">
                           <a:effectLst/>
                         </a:rPr>
                         <a:t>6 L : </a:t>
                       </a:r>
                       <a:r>
-                        <a:rPr lang="en-US" sz="1300" b="0" i="0" u="none" strike="noStrike" noProof="0">
+                        <a:rPr lang="en-US" sz="1100" b="0" i="0" u="none" strike="noStrike" noProof="0">
                           <a:effectLst/>
                           <a:latin typeface="Calibri"/>
                         </a:rPr>
                         <a:t>61629</a:t>
                       </a:r>
-                      <a:endParaRPr lang="pt-BR" sz="1300">
+                      <a:endParaRPr lang="pt-BR" sz="1100">
                         <a:effectLst/>
                       </a:endParaRPr>
                     </a:p>
                   </a:txBody>
-                  <a:tcPr marL="67031" marR="67031" marT="33516" marB="33516"/>
+                  <a:tcPr marL="59085" marR="59085" marT="29543" marB="29543"/>
+                </a:tc>
+                <a:tc>
+                  <a:txBody>
+                    <a:bodyPr/>
+                    <a:lstStyle/>
+                    <a:p>
+                      <a:pPr lvl="0" algn="r">
+                        <a:buNone/>
+                      </a:pPr>
+                      <a:r>
+                        <a:rPr lang="en-US" sz="1100" b="0" i="0" u="none" strike="noStrike" noProof="0">
+                          <a:effectLst/>
+                        </a:rPr>
+                        <a:t>128.26441</a:t>
+                      </a:r>
+                      <a:endParaRPr lang="pt-BR" sz="1600"/>
+                    </a:p>
+                  </a:txBody>
+                  <a:tcPr marL="59085" marR="59085" marT="29542" marB="29542"/>
                 </a:tc>
                 <a:extLst>
                   <a:ext uri="{0D108BD9-81ED-4DB2-BD59-A6C34878D82A}">
@@ -9808,7 +10242,7 @@
                   </a:ext>
                 </a:extLst>
               </a:tr>
-              <a:tr h="294939">
+              <a:tr h="265960">
                 <a:tc vMerge="1">
                   <a:txBody>
                     <a:bodyPr/>
@@ -9844,14 +10278,14 @@
                         <a:buNone/>
                       </a:pPr>
                       <a:r>
-                        <a:rPr lang="pt-BR" sz="1300">
+                        <a:rPr lang="pt-BR" sz="1100">
                           <a:effectLst/>
                         </a:rPr>
                         <a:t>841</a:t>
                       </a:r>
                     </a:p>
                   </a:txBody>
-                  <a:tcPr marL="67031" marR="67031" marT="33516" marB="33516"/>
+                  <a:tcPr marL="59085" marR="59085" marT="29543" marB="29543"/>
                 </a:tc>
                 <a:tc>
                   <a:txBody>
@@ -9862,24 +10296,43 @@
                         <a:buNone/>
                       </a:pPr>
                       <a:r>
-                        <a:rPr lang="pt-BR" sz="1300">
+                        <a:rPr lang="pt-BR" sz="1100">
                           <a:effectLst/>
                         </a:rPr>
                         <a:t>330ml: </a:t>
                       </a:r>
                       <a:r>
-                        <a:rPr lang="en-US" sz="1300" b="0" i="0" u="none" strike="noStrike" noProof="0">
+                        <a:rPr lang="en-US" sz="1100" b="0" i="0" u="none" strike="noStrike" noProof="0">
                           <a:effectLst/>
                           <a:latin typeface="Calibri"/>
                         </a:rPr>
                         <a:t>59873</a:t>
                       </a:r>
-                      <a:endParaRPr lang="pt-BR" sz="1300">
+                      <a:endParaRPr lang="pt-BR" sz="1100">
                         <a:effectLst/>
                       </a:endParaRPr>
                     </a:p>
                   </a:txBody>
-                  <a:tcPr marL="67031" marR="67031" marT="33516" marB="33516"/>
+                  <a:tcPr marL="59085" marR="59085" marT="29543" marB="29543"/>
+                </a:tc>
+                <a:tc>
+                  <a:txBody>
+                    <a:bodyPr/>
+                    <a:lstStyle/>
+                    <a:p>
+                      <a:pPr lvl="0" algn="r">
+                        <a:buNone/>
+                      </a:pPr>
+                      <a:r>
+                        <a:rPr lang="en-US" sz="1100" b="0" i="0" u="none" strike="noStrike" noProof="0">
+                          <a:effectLst/>
+                        </a:rPr>
+                        <a:t>118.14</a:t>
+                      </a:r>
+                      <a:endParaRPr lang="pt-BR" sz="1600"/>
+                    </a:p>
+                  </a:txBody>
+                  <a:tcPr marL="59085" marR="59085" marT="29542" marB="29542"/>
                 </a:tc>
                 <a:extLst>
                   <a:ext uri="{0D108BD9-81ED-4DB2-BD59-A6C34878D82A}">
@@ -9887,7 +10340,7 @@
                   </a:ext>
                 </a:extLst>
               </a:tr>
-              <a:tr h="294939">
+              <a:tr h="265960">
                 <a:tc rowSpan="2">
                   <a:txBody>
                     <a:bodyPr/>
@@ -9895,14 +10348,14 @@
                     <a:p>
                       <a:pPr rtl="0" fontAlgn="base"/>
                       <a:r>
-                        <a:rPr lang="pt-BR" sz="1300">
+                        <a:rPr lang="pt-BR" sz="1100">
                           <a:effectLst/>
                         </a:rPr>
                         <a:t>BUD​</a:t>
                       </a:r>
                     </a:p>
                   </a:txBody>
-                  <a:tcPr marL="67031" marR="67031" marT="33516" marB="33516"/>
+                  <a:tcPr marL="59085" marR="59085" marT="29543" marB="29543"/>
                 </a:tc>
                 <a:tc rowSpan="2">
                   <a:txBody>
@@ -9913,15 +10366,15 @@
                         <a:buNone/>
                       </a:pPr>
                       <a:r>
-                        <a:rPr lang="pt-BR" sz="1300">
+                        <a:rPr lang="pt-BR" sz="1100">
                           <a:effectLst/>
                         </a:rPr>
                         <a:t>1,0000​</a:t>
                       </a:r>
-                      <a:endParaRPr lang="pt-BR" sz="1300"/>
-                    </a:p>
-                  </a:txBody>
-                  <a:tcPr marL="67031" marR="67031" marT="33516" marB="33516"/>
+                      <a:endParaRPr lang="pt-BR" sz="1100"/>
+                    </a:p>
+                  </a:txBody>
+                  <a:tcPr marL="59085" marR="59085" marT="29543" marB="29543"/>
                 </a:tc>
                 <a:tc>
                   <a:txBody>
@@ -9930,14 +10383,14 @@
                     <a:p>
                       <a:pPr algn="r" rtl="0" fontAlgn="base"/>
                       <a:r>
-                        <a:rPr lang="pt-BR" sz="1300">
+                        <a:rPr lang="pt-BR" sz="1100">
                           <a:effectLst/>
                         </a:rPr>
                         <a:t>1095</a:t>
                       </a:r>
                     </a:p>
                   </a:txBody>
-                  <a:tcPr marL="67031" marR="67031" marT="33516" marB="33516"/>
+                  <a:tcPr marL="59085" marR="59085" marT="29543" marB="29543"/>
                 </a:tc>
                 <a:tc>
                   <a:txBody>
@@ -9948,24 +10401,43 @@
                         <a:buNone/>
                       </a:pPr>
                       <a:r>
-                        <a:rPr lang="pt-BR" sz="1300">
+                        <a:rPr lang="pt-BR" sz="1100">
                           <a:effectLst/>
                         </a:rPr>
                         <a:t>6 L : </a:t>
                       </a:r>
                       <a:r>
-                        <a:rPr lang="en-US" sz="1300" b="0" i="0" u="none" strike="noStrike" noProof="0">
+                        <a:rPr lang="en-US" sz="1100" b="0" i="0" u="none" strike="noStrike" noProof="0">
                           <a:effectLst/>
                           <a:latin typeface="Calibri"/>
                         </a:rPr>
                         <a:t>71316</a:t>
                       </a:r>
-                      <a:endParaRPr lang="pt-BR" sz="1300">
+                      <a:endParaRPr lang="pt-BR" sz="1100">
                         <a:effectLst/>
                       </a:endParaRPr>
                     </a:p>
                   </a:txBody>
-                  <a:tcPr marL="67031" marR="67031" marT="33516" marB="33516"/>
+                  <a:tcPr marL="59085" marR="59085" marT="29543" marB="29543"/>
+                </a:tc>
+                <a:tc>
+                  <a:txBody>
+                    <a:bodyPr/>
+                    <a:lstStyle/>
+                    <a:p>
+                      <a:pPr lvl="0" algn="r">
+                        <a:buNone/>
+                      </a:pPr>
+                      <a:r>
+                        <a:rPr lang="en-US" sz="1100" b="0" i="0" u="none" strike="noStrike" noProof="0">
+                          <a:effectLst/>
+                        </a:rPr>
+                        <a:t>127.98431</a:t>
+                      </a:r>
+                      <a:endParaRPr lang="pt-BR" sz="1600"/>
+                    </a:p>
+                  </a:txBody>
+                  <a:tcPr marL="59085" marR="59085" marT="29542" marB="29542"/>
                 </a:tc>
                 <a:extLst>
                   <a:ext uri="{0D108BD9-81ED-4DB2-BD59-A6C34878D82A}">
@@ -9973,7 +10445,7 @@
                   </a:ext>
                 </a:extLst>
               </a:tr>
-              <a:tr h="294939">
+              <a:tr h="265960">
                 <a:tc vMerge="1">
                   <a:txBody>
                     <a:bodyPr/>
@@ -10009,14 +10481,14 @@
                         <a:buNone/>
                       </a:pPr>
                       <a:r>
-                        <a:rPr lang="pt-BR" sz="1300">
+                        <a:rPr lang="pt-BR" sz="1100">
                           <a:effectLst/>
                         </a:rPr>
                         <a:t>538</a:t>
                       </a:r>
                     </a:p>
                   </a:txBody>
-                  <a:tcPr marL="67031" marR="67031" marT="33516" marB="33516"/>
+                  <a:tcPr marL="59085" marR="59085" marT="29543" marB="29543"/>
                 </a:tc>
                 <a:tc>
                   <a:txBody>
@@ -10027,24 +10499,43 @@
                         <a:buNone/>
                       </a:pPr>
                       <a:r>
-                        <a:rPr lang="pt-BR" sz="1300">
+                        <a:rPr lang="pt-BR" sz="1100">
                           <a:effectLst/>
                         </a:rPr>
                         <a:t>330ml: </a:t>
                       </a:r>
                       <a:r>
-                        <a:rPr lang="en-US" sz="1300" b="0" i="0" u="none" strike="noStrike" noProof="0">
+                        <a:rPr lang="en-US" sz="1100" b="0" i="0" u="none" strike="noStrike" noProof="0">
                           <a:effectLst/>
                           <a:latin typeface="Calibri"/>
                         </a:rPr>
                         <a:t>77589</a:t>
                       </a:r>
-                      <a:endParaRPr lang="pt-BR" sz="1300">
+                      <a:endParaRPr lang="pt-BR" sz="1100">
                         <a:effectLst/>
                       </a:endParaRPr>
                     </a:p>
                   </a:txBody>
-                  <a:tcPr marL="67031" marR="67031" marT="33516" marB="33516"/>
+                  <a:tcPr marL="59085" marR="59085" marT="29543" marB="29543"/>
+                </a:tc>
+                <a:tc>
+                  <a:txBody>
+                    <a:bodyPr/>
+                    <a:lstStyle/>
+                    <a:p>
+                      <a:pPr lvl="0" algn="r">
+                        <a:buNone/>
+                      </a:pPr>
+                      <a:r>
+                        <a:rPr lang="en-US" sz="1100" b="0" i="0" u="none" strike="noStrike" noProof="0">
+                          <a:effectLst/>
+                        </a:rPr>
+                        <a:t>102.05403</a:t>
+                      </a:r>
+                      <a:endParaRPr lang="pt-BR" sz="1600"/>
+                    </a:p>
+                  </a:txBody>
+                  <a:tcPr marL="59085" marR="59085" marT="29542" marB="29542"/>
                 </a:tc>
                 <a:extLst>
                   <a:ext uri="{0D108BD9-81ED-4DB2-BD59-A6C34878D82A}">
@@ -10052,7 +10543,7 @@
                   </a:ext>
                 </a:extLst>
               </a:tr>
-              <a:tr h="294939">
+              <a:tr h="265960">
                 <a:tc rowSpan="2">
                   <a:txBody>
                     <a:bodyPr/>
@@ -10060,14 +10551,14 @@
                     <a:p>
                       <a:pPr rtl="0" fontAlgn="base"/>
                       <a:r>
-                        <a:rPr lang="pt-BR" sz="1300">
+                        <a:rPr lang="pt-BR" sz="1100">
                           <a:effectLst/>
                         </a:rPr>
                         <a:t>GOOSE​</a:t>
                       </a:r>
                     </a:p>
                   </a:txBody>
-                  <a:tcPr marL="67031" marR="67031" marT="33516" marB="33516"/>
+                  <a:tcPr marL="59085" marR="59085" marT="29543" marB="29543"/>
                 </a:tc>
                 <a:tc rowSpan="2">
                   <a:txBody>
@@ -10078,15 +10569,15 @@
                         <a:buNone/>
                       </a:pPr>
                       <a:r>
-                        <a:rPr lang="pt-BR" sz="1300">
+                        <a:rPr lang="pt-BR" sz="1100">
                           <a:effectLst/>
                         </a:rPr>
                         <a:t>1,0000​</a:t>
                       </a:r>
-                      <a:endParaRPr lang="pt-BR" sz="1300"/>
-                    </a:p>
-                  </a:txBody>
-                  <a:tcPr marL="67031" marR="67031" marT="33516" marB="33516"/>
+                      <a:endParaRPr lang="pt-BR" sz="1100"/>
+                    </a:p>
+                  </a:txBody>
+                  <a:tcPr marL="59085" marR="59085" marT="29543" marB="29543"/>
                 </a:tc>
                 <a:tc>
                   <a:txBody>
@@ -10095,14 +10586,14 @@
                     <a:p>
                       <a:pPr algn="r" rtl="0" fontAlgn="base"/>
                       <a:r>
-                        <a:rPr lang="pt-BR" sz="1300">
+                        <a:rPr lang="pt-BR" sz="1100">
                           <a:effectLst/>
                         </a:rPr>
                         <a:t>1003​</a:t>
                       </a:r>
                     </a:p>
                   </a:txBody>
-                  <a:tcPr marL="67031" marR="67031" marT="33516" marB="33516"/>
+                  <a:tcPr marL="59085" marR="59085" marT="29543" marB="29543"/>
                 </a:tc>
                 <a:tc>
                   <a:txBody>
@@ -10113,16 +10604,35 @@
                         <a:buNone/>
                       </a:pPr>
                       <a:r>
-                        <a:rPr lang="en-US" sz="1300" b="0" i="0" u="none" strike="noStrike" noProof="0">
+                        <a:rPr lang="en-US" sz="1100" b="0" i="0" u="none" strike="noStrike" noProof="0">
                           <a:effectLst/>
                           <a:latin typeface="Calibri"/>
                         </a:rPr>
                         <a:t>6 L : 70601</a:t>
                       </a:r>
-                      <a:endParaRPr lang="pt-BR" sz="1300"/>
-                    </a:p>
-                  </a:txBody>
-                  <a:tcPr marL="67031" marR="67031" marT="33516" marB="33516"/>
+                      <a:endParaRPr lang="pt-BR" sz="1100"/>
+                    </a:p>
+                  </a:txBody>
+                  <a:tcPr marL="59085" marR="59085" marT="29543" marB="29543"/>
+                </a:tc>
+                <a:tc>
+                  <a:txBody>
+                    <a:bodyPr/>
+                    <a:lstStyle/>
+                    <a:p>
+                      <a:pPr lvl="0" algn="r">
+                        <a:buNone/>
+                      </a:pPr>
+                      <a:r>
+                        <a:rPr lang="en-US" sz="1100" b="0" i="0" u="none" strike="noStrike" noProof="0">
+                          <a:effectLst/>
+                        </a:rPr>
+                        <a:t>186.7079</a:t>
+                      </a:r>
+                      <a:endParaRPr lang="pt-BR" sz="1600"/>
+                    </a:p>
+                  </a:txBody>
+                  <a:tcPr marL="59085" marR="59085" marT="29542" marB="29542"/>
                 </a:tc>
                 <a:extLst>
                   <a:ext uri="{0D108BD9-81ED-4DB2-BD59-A6C34878D82A}">
@@ -10130,7 +10640,7 @@
                   </a:ext>
                 </a:extLst>
               </a:tr>
-              <a:tr h="294939">
+              <a:tr h="265960">
                 <a:tc vMerge="1">
                   <a:txBody>
                     <a:bodyPr/>
@@ -10166,16 +10676,16 @@
                         <a:buNone/>
                       </a:pPr>
                       <a:r>
-                        <a:rPr lang="en-US" sz="1300" b="0" i="0" u="none" strike="noStrike" noProof="0">
+                        <a:rPr lang="en-US" sz="1100" b="0" i="0" u="none" strike="noStrike" noProof="0">
                           <a:effectLst/>
                           <a:latin typeface="Calibri"/>
                         </a:rPr>
                         <a:t>264</a:t>
                       </a:r>
-                      <a:endParaRPr lang="pt-BR" sz="1300"/>
-                    </a:p>
-                  </a:txBody>
-                  <a:tcPr marL="67031" marR="67031" marT="33516" marB="33516"/>
+                      <a:endParaRPr lang="pt-BR" sz="1100"/>
+                    </a:p>
+                  </a:txBody>
+                  <a:tcPr marL="59085" marR="59085" marT="29543" marB="29543"/>
                 </a:tc>
                 <a:tc>
                   <a:txBody>
@@ -10186,24 +10696,43 @@
                         <a:buNone/>
                       </a:pPr>
                       <a:r>
-                        <a:rPr lang="pt-BR" sz="1300">
+                        <a:rPr lang="pt-BR" sz="1100">
                           <a:effectLst/>
                         </a:rPr>
                         <a:t>330ml: </a:t>
                       </a:r>
                       <a:r>
-                        <a:rPr lang="en-US" sz="1300" b="0" i="0" u="none" strike="noStrike" noProof="0">
+                        <a:rPr lang="en-US" sz="1100" b="0" i="0" u="none" strike="noStrike" noProof="0">
                           <a:effectLst/>
                           <a:latin typeface="Calibri"/>
                         </a:rPr>
                         <a:t>63445</a:t>
                       </a:r>
-                      <a:endParaRPr lang="pt-BR" sz="1300">
+                      <a:endParaRPr lang="pt-BR" sz="1100">
                         <a:effectLst/>
                       </a:endParaRPr>
                     </a:p>
                   </a:txBody>
-                  <a:tcPr marL="67031" marR="67031" marT="33516" marB="33516"/>
+                  <a:tcPr marL="59085" marR="59085" marT="29543" marB="29543"/>
+                </a:tc>
+                <a:tc>
+                  <a:txBody>
+                    <a:bodyPr/>
+                    <a:lstStyle/>
+                    <a:p>
+                      <a:pPr lvl="0" algn="r">
+                        <a:buNone/>
+                      </a:pPr>
+                      <a:r>
+                        <a:rPr lang="en-US" sz="1100" b="0" i="0" u="none" strike="noStrike" noProof="0">
+                          <a:effectLst/>
+                        </a:rPr>
+                        <a:t>135.30281</a:t>
+                      </a:r>
+                      <a:endParaRPr lang="pt-BR" sz="1600"/>
+                    </a:p>
+                  </a:txBody>
+                  <a:tcPr marL="59085" marR="59085" marT="29542" marB="29542"/>
                 </a:tc>
                 <a:extLst>
                   <a:ext uri="{0D108BD9-81ED-4DB2-BD59-A6C34878D82A}">
@@ -10211,7 +10740,7 @@
                   </a:ext>
                 </a:extLst>
               </a:tr>
-              <a:tr h="294939">
+              <a:tr h="440593">
                 <a:tc rowSpan="2">
                   <a:txBody>
                     <a:bodyPr/>
@@ -10219,14 +10748,14 @@
                     <a:p>
                       <a:pPr rtl="0" fontAlgn="base"/>
                       <a:r>
-                        <a:rPr lang="pt-BR" sz="1300">
+                        <a:rPr lang="pt-BR" sz="1100">
                           <a:effectLst/>
                         </a:rPr>
                         <a:t>CORONA EXTRA​</a:t>
                       </a:r>
                     </a:p>
                   </a:txBody>
-                  <a:tcPr marL="67031" marR="67031" marT="33516" marB="33516"/>
+                  <a:tcPr marL="59085" marR="59085" marT="29543" marB="29543"/>
                 </a:tc>
                 <a:tc rowSpan="2">
                   <a:txBody>
@@ -10237,15 +10766,15 @@
                         <a:buNone/>
                       </a:pPr>
                       <a:r>
-                        <a:rPr lang="pt-BR" sz="1300">
+                        <a:rPr lang="pt-BR" sz="1100">
                           <a:effectLst/>
                         </a:rPr>
                         <a:t>1,0000​</a:t>
                       </a:r>
-                      <a:endParaRPr lang="pt-BR" sz="1300"/>
-                    </a:p>
-                  </a:txBody>
-                  <a:tcPr marL="67031" marR="67031" marT="33516" marB="33516"/>
+                      <a:endParaRPr lang="pt-BR" sz="1100"/>
+                    </a:p>
+                  </a:txBody>
+                  <a:tcPr marL="59085" marR="59085" marT="29543" marB="29543"/>
                 </a:tc>
                 <a:tc>
                   <a:txBody>
@@ -10256,18 +10785,18 @@
                         <a:buNone/>
                       </a:pPr>
                       <a:r>
-                        <a:rPr lang="en-US" sz="1300" b="0" i="0" u="none" strike="noStrike" noProof="0">
+                        <a:rPr lang="en-US" sz="1100" b="0" i="0" u="none" strike="noStrike" noProof="0">
                           <a:effectLst/>
                           <a:latin typeface="Calibri"/>
                         </a:rPr>
                         <a:t>MACO &lt; 695</a:t>
                       </a:r>
-                      <a:endParaRPr lang="pt-BR" sz="1300">
+                      <a:endParaRPr lang="pt-BR" sz="1100">
                         <a:effectLst/>
                       </a:endParaRPr>
                     </a:p>
                   </a:txBody>
-                  <a:tcPr marL="67031" marR="67031" marT="33516" marB="33516"/>
+                  <a:tcPr marL="59085" marR="59085" marT="29543" marB="29543"/>
                 </a:tc>
                 <a:tc>
                   <a:txBody>
@@ -10278,24 +10807,43 @@
                         <a:buNone/>
                       </a:pPr>
                       <a:r>
-                        <a:rPr lang="pt-BR" sz="1300">
+                        <a:rPr lang="pt-BR" sz="1100">
                           <a:effectLst/>
                         </a:rPr>
                         <a:t>355ml: </a:t>
                       </a:r>
                       <a:r>
-                        <a:rPr lang="en-US" sz="1300" b="0" i="0" u="none" strike="noStrike" noProof="0">
+                        <a:rPr lang="en-US" sz="1100" b="0" i="0" u="none" strike="noStrike" noProof="0">
                           <a:effectLst/>
                           <a:latin typeface="Calibri"/>
                         </a:rPr>
                         <a:t>77313</a:t>
                       </a:r>
-                      <a:endParaRPr lang="pt-BR" sz="1300">
+                      <a:endParaRPr lang="pt-BR" sz="1100">
                         <a:effectLst/>
                       </a:endParaRPr>
                     </a:p>
                   </a:txBody>
-                  <a:tcPr marL="67031" marR="67031" marT="33516" marB="33516"/>
+                  <a:tcPr marL="59085" marR="59085" marT="29543" marB="29543"/>
+                </a:tc>
+                <a:tc>
+                  <a:txBody>
+                    <a:bodyPr/>
+                    <a:lstStyle/>
+                    <a:p>
+                      <a:pPr lvl="0" algn="r">
+                        <a:buNone/>
+                      </a:pPr>
+                      <a:r>
+                        <a:rPr lang="en-US" sz="1100" b="0" i="0" u="none" strike="noStrike" noProof="0">
+                          <a:effectLst/>
+                        </a:rPr>
+                        <a:t>128.52556</a:t>
+                      </a:r>
+                      <a:endParaRPr lang="pt-BR" sz="1600"/>
+                    </a:p>
+                  </a:txBody>
+                  <a:tcPr marL="59085" marR="59085" marT="29542" marB="29542"/>
                 </a:tc>
                 <a:extLst>
                   <a:ext uri="{0D108BD9-81ED-4DB2-BD59-A6C34878D82A}">
@@ -10303,7 +10851,7 @@
                   </a:ext>
                 </a:extLst>
               </a:tr>
-              <a:tr h="294939">
+              <a:tr h="440593">
                 <a:tc vMerge="1">
                   <a:txBody>
                     <a:bodyPr/>
@@ -10339,16 +10887,16 @@
                         <a:buNone/>
                       </a:pPr>
                       <a:r>
-                        <a:rPr lang="en-US" sz="1300" b="0" i="0" u="none" strike="noStrike" noProof="0">
+                        <a:rPr lang="en-US" sz="1100" b="0" i="0" u="none" strike="noStrike" noProof="0">
                           <a:effectLst/>
                           <a:latin typeface="Calibri"/>
                         </a:rPr>
                         <a:t>MACO &gt; 609</a:t>
                       </a:r>
-                      <a:endParaRPr lang="pt-BR" sz="1300"/>
-                    </a:p>
-                  </a:txBody>
-                  <a:tcPr marL="67031" marR="67031" marT="33516" marB="33516"/>
+                      <a:endParaRPr lang="pt-BR" sz="1100"/>
+                    </a:p>
+                  </a:txBody>
+                  <a:tcPr marL="59085" marR="59085" marT="29543" marB="29543"/>
                 </a:tc>
                 <a:tc>
                   <a:txBody>
@@ -10359,25 +10907,45 @@
                         <a:buNone/>
                       </a:pPr>
                       <a:r>
-                        <a:rPr lang="en-US" sz="1300" b="0" i="0" u="none" strike="noStrike" noProof="0">
+                        <a:rPr lang="en-US" sz="1100" b="0" i="0" u="none" strike="noStrike" noProof="0">
                           <a:effectLst/>
                           <a:latin typeface="Calibri"/>
                         </a:rPr>
                         <a:t>355ml: </a:t>
                       </a:r>
                       <a:r>
-                        <a:rPr lang="en-US" sz="1300" b="0" i="0" u="none" strike="noStrike" noProof="0">
+                        <a:rPr lang="en-US" sz="1100" b="0" i="0" u="none" strike="noStrike" noProof="0">
                           <a:effectLst/>
                         </a:rPr>
                         <a:t>54232</a:t>
                       </a:r>
-                      <a:endParaRPr lang="en-US" sz="1300" b="0" i="0" u="none" strike="noStrike" noProof="0">
+                      <a:endParaRPr lang="en-US" sz="1100" b="0" i="0" u="none" strike="noStrike" noProof="0">
                         <a:effectLst/>
                         <a:latin typeface="Calibri"/>
                       </a:endParaRPr>
                     </a:p>
                   </a:txBody>
-                  <a:tcPr marL="67031" marR="67031" marT="33516" marB="33516"/>
+                  <a:tcPr marL="59085" marR="59085" marT="29543" marB="29543"/>
+                </a:tc>
+                <a:tc>
+                  <a:txBody>
+                    <a:bodyPr/>
+                    <a:lstStyle/>
+                    <a:p>
+                      <a:pPr lvl="0" algn="r">
+                        <a:buNone/>
+                      </a:pPr>
+                      <a:r>
+                        <a:rPr lang="en-US" sz="1100" b="0" i="0" u="none" strike="noStrike" noProof="0">
+                          <a:effectLst/>
+                          <a:latin typeface="Calibri"/>
+                        </a:rPr>
+                        <a:t>143.84416</a:t>
+                      </a:r>
+                      <a:endParaRPr lang="pt-BR" sz="1600"/>
+                    </a:p>
+                  </a:txBody>
+                  <a:tcPr marL="59085" marR="59085" marT="29542" marB="29542"/>
                 </a:tc>
                 <a:extLst>
                   <a:ext uri="{0D108BD9-81ED-4DB2-BD59-A6C34878D82A}">
@@ -10385,7 +10953,7 @@
                   </a:ext>
                 </a:extLst>
               </a:tr>
-              <a:tr h="496033">
+              <a:tr h="440593">
                 <a:tc>
                   <a:txBody>
                     <a:bodyPr/>
@@ -10393,14 +10961,14 @@
                     <a:p>
                       <a:pPr rtl="0" fontAlgn="base"/>
                       <a:r>
-                        <a:rPr lang="pt-BR" sz="1300">
+                        <a:rPr lang="pt-BR" sz="1100">
                           <a:effectLst/>
                         </a:rPr>
                         <a:t>BIRRA DEL BORGO​</a:t>
                       </a:r>
                     </a:p>
                   </a:txBody>
-                  <a:tcPr marL="67031" marR="67031" marT="33516" marB="33516"/>
+                  <a:tcPr marL="59085" marR="59085" marT="29543" marB="29543"/>
                 </a:tc>
                 <a:tc>
                   <a:txBody>
@@ -10411,15 +10979,15 @@
                         <a:buNone/>
                       </a:pPr>
                       <a:r>
-                        <a:rPr lang="pt-BR" sz="1300">
+                        <a:rPr lang="pt-BR" sz="1100">
                           <a:effectLst/>
                         </a:rPr>
                         <a:t>1,0000​</a:t>
                       </a:r>
-                      <a:endParaRPr lang="pt-BR" sz="1300"/>
-                    </a:p>
-                  </a:txBody>
-                  <a:tcPr marL="67031" marR="67031" marT="33516" marB="33516"/>
+                      <a:endParaRPr lang="pt-BR" sz="1100"/>
+                    </a:p>
+                  </a:txBody>
+                  <a:tcPr marL="59085" marR="59085" marT="29543" marB="29543"/>
                 </a:tc>
                 <a:tc>
                   <a:txBody>
@@ -10428,14 +10996,14 @@
                     <a:p>
                       <a:pPr algn="r" rtl="0" fontAlgn="base"/>
                       <a:r>
-                        <a:rPr lang="pt-BR" sz="1300">
+                        <a:rPr lang="pt-BR" sz="1100">
                           <a:effectLst/>
                         </a:rPr>
                         <a:t>62​</a:t>
                       </a:r>
                     </a:p>
                   </a:txBody>
-                  <a:tcPr marL="67031" marR="67031" marT="33516" marB="33516"/>
+                  <a:tcPr marL="59085" marR="59085" marT="29543" marB="29543"/>
                 </a:tc>
                 <a:tc>
                   <a:txBody>
@@ -10446,24 +11014,43 @@
                         <a:buNone/>
                       </a:pPr>
                       <a:r>
-                        <a:rPr lang="pt-BR" sz="1300">
+                        <a:rPr lang="pt-BR" sz="1100">
                           <a:effectLst/>
                         </a:rPr>
                         <a:t>6 L : </a:t>
                       </a:r>
                       <a:r>
-                        <a:rPr lang="en-US" sz="1300" b="0" i="0" u="none" strike="noStrike" noProof="0">
+                        <a:rPr lang="en-US" sz="1100" b="0" i="0" u="none" strike="noStrike" noProof="0">
                           <a:effectLst/>
                           <a:latin typeface="Calibri"/>
                         </a:rPr>
                         <a:t>70605</a:t>
                       </a:r>
-                      <a:endParaRPr lang="pt-BR" sz="1300">
+                      <a:endParaRPr lang="pt-BR" sz="1100">
                         <a:effectLst/>
                       </a:endParaRPr>
                     </a:p>
                   </a:txBody>
-                  <a:tcPr marL="67031" marR="67031" marT="33516" marB="33516"/>
+                  <a:tcPr marL="59085" marR="59085" marT="29543" marB="29543"/>
+                </a:tc>
+                <a:tc>
+                  <a:txBody>
+                    <a:bodyPr/>
+                    <a:lstStyle/>
+                    <a:p>
+                      <a:pPr lvl="0" algn="r">
+                        <a:buNone/>
+                      </a:pPr>
+                      <a:r>
+                        <a:rPr lang="en-US" sz="1100" b="0" i="0" u="none" strike="noStrike" noProof="0">
+                          <a:effectLst/>
+                          <a:latin typeface="Calibri"/>
+                        </a:rPr>
+                        <a:t>--</a:t>
+                      </a:r>
+                    </a:p>
+                  </a:txBody>
+                  <a:tcPr marL="59085" marR="59085" marT="29542" marB="29542"/>
                 </a:tc>
                 <a:extLst>
                   <a:ext uri="{0D108BD9-81ED-4DB2-BD59-A6C34878D82A}">
@@ -10634,7 +11221,7 @@
           <a:lstStyle/>
           <a:p>
             <a:r>
-              <a:rPr lang="pt-BR" sz="4000" b="1" kern="1200" dirty="0">
+              <a:rPr lang="pt-BR" sz="4000" b="1" kern="1200">
                 <a:solidFill>
                   <a:srgbClr val="FFFFFF"/>
                 </a:solidFill>
@@ -10645,7 +11232,7 @@
               <a:t>Volume da embalagem </a:t>
             </a:r>
             <a:r>
-              <a:rPr lang="pt-BR" sz="4000" kern="1200" dirty="0">
+              <a:rPr lang="pt-BR" sz="4000" kern="1200">
                 <a:solidFill>
                   <a:srgbClr val="FFFFFF"/>
                 </a:solidFill>
@@ -10656,7 +11243,7 @@
               <a:t>["Container </a:t>
             </a:r>
             <a:r>
-              <a:rPr lang="pt-BR" sz="4000" kern="1200" dirty="0" err="1">
+              <a:rPr lang="pt-BR" sz="4000" kern="1200" err="1">
                 <a:solidFill>
                   <a:srgbClr val="FFFFFF"/>
                 </a:solidFill>
@@ -10667,7 +11254,7 @@
               <a:t>Size</a:t>
             </a:r>
             <a:r>
-              <a:rPr lang="pt-BR" sz="4000" kern="1200" dirty="0">
+              <a:rPr lang="pt-BR" sz="4000" kern="1200">
                 <a:solidFill>
                   <a:srgbClr val="FFFFFF"/>
                 </a:solidFill>
@@ -10795,15 +11382,15 @@
                     <a:lstStyle/>
                     <a:p>
                       <a:r>
-                        <a:rPr lang="pt-BR" dirty="0"/>
+                        <a:rPr lang="pt-BR"/>
                         <a:t>De 28.316 </a:t>
                       </a:r>
                       <a:r>
-                        <a:rPr lang="pt-BR" u="sng" dirty="0"/>
+                        <a:rPr lang="pt-BR" u="sng"/>
                         <a:t>pedidos</a:t>
                       </a:r>
                       <a:r>
-                        <a:rPr lang="pt-BR" dirty="0"/>
+                        <a:rPr lang="pt-BR"/>
                         <a:t>,</a:t>
                       </a:r>
                     </a:p>
@@ -10816,7 +11403,7 @@
                     <a:lstStyle/>
                     <a:p>
                       <a:r>
-                        <a:rPr lang="pt-BR" dirty="0"/>
+                        <a:rPr lang="pt-BR"/>
                         <a:t>Volume</a:t>
                       </a:r>
                     </a:p>
@@ -10829,7 +11416,7 @@
                     <a:lstStyle/>
                     <a:p>
                       <a:r>
-                        <a:rPr lang="pt-BR" dirty="0"/>
+                        <a:rPr lang="pt-BR"/>
                         <a:t>Contribuição percentual</a:t>
                       </a:r>
                     </a:p>
@@ -10852,10 +11439,10 @@
                         <a:buNone/>
                       </a:pPr>
                       <a:r>
-                        <a:rPr lang="en-US" sz="1800" u="none" strike="noStrike" noProof="0" dirty="0"/>
+                        <a:rPr lang="en-US" sz="1800" u="none" strike="noStrike" noProof="0"/>
                         <a:t>19.775</a:t>
                       </a:r>
-                      <a:endParaRPr lang="pt-BR" dirty="0"/>
+                      <a:endParaRPr lang="pt-BR"/>
                     </a:p>
                   </a:txBody>
                   <a:tcPr/>
@@ -10867,7 +11454,7 @@
                     <a:p>
                       <a:pPr algn="r"/>
                       <a:r>
-                        <a:rPr lang="pt-BR" dirty="0"/>
+                        <a:rPr lang="pt-BR"/>
                         <a:t>6 L</a:t>
                       </a:r>
                     </a:p>
@@ -10881,7 +11468,7 @@
                     <a:p>
                       <a:pPr algn="r"/>
                       <a:r>
-                        <a:rPr lang="pt-BR" dirty="0"/>
+                        <a:rPr lang="pt-BR"/>
                         <a:t>0,6984</a:t>
                       </a:r>
                     </a:p>
@@ -10904,10 +11491,10 @@
                         <a:buNone/>
                       </a:pPr>
                       <a:r>
-                        <a:rPr lang="en-US" sz="1800" u="none" strike="noStrike" noProof="0" dirty="0"/>
+                        <a:rPr lang="en-US" sz="1800" u="none" strike="noStrike" noProof="0"/>
                         <a:t>6.657</a:t>
                       </a:r>
-                      <a:endParaRPr lang="pt-BR" dirty="0"/>
+                      <a:endParaRPr lang="pt-BR"/>
                     </a:p>
                   </a:txBody>
                   <a:tcPr/>
@@ -10919,7 +11506,7 @@
                     <a:p>
                       <a:pPr algn="r"/>
                       <a:r>
-                        <a:rPr lang="pt-BR" dirty="0"/>
+                        <a:rPr lang="pt-BR"/>
                         <a:t>330ml</a:t>
                       </a:r>
                     </a:p>
@@ -10933,7 +11520,7 @@
                     <a:p>
                       <a:pPr algn="r"/>
                       <a:r>
-                        <a:rPr lang="pt-BR" dirty="0"/>
+                        <a:rPr lang="pt-BR"/>
                         <a:t>0,2351</a:t>
                       </a:r>
                     </a:p>
@@ -10956,10 +11543,10 @@
                         <a:buNone/>
                       </a:pPr>
                       <a:r>
-                        <a:rPr lang="en-US" sz="1800" u="none" strike="noStrike" noProof="0" dirty="0"/>
+                        <a:rPr lang="en-US" sz="1800" u="none" strike="noStrike" noProof="0"/>
                         <a:t>1.627</a:t>
                       </a:r>
-                      <a:endParaRPr lang="pt-BR" dirty="0"/>
+                      <a:endParaRPr lang="pt-BR"/>
                     </a:p>
                   </a:txBody>
                   <a:tcPr/>
@@ -10971,7 +11558,7 @@
                     <a:p>
                       <a:pPr algn="r"/>
                       <a:r>
-                        <a:rPr lang="pt-BR" dirty="0"/>
+                        <a:rPr lang="pt-BR"/>
                         <a:t>355ml</a:t>
                       </a:r>
                     </a:p>
@@ -10985,7 +11572,7 @@
                     <a:p>
                       <a:pPr algn="r"/>
                       <a:r>
-                        <a:rPr lang="pt-BR" dirty="0"/>
+                        <a:rPr lang="pt-BR"/>
                         <a:t>0,0575</a:t>
                       </a:r>
                     </a:p>
@@ -11063,26 +11650,23 @@
                     <a:p>
                       <a:pPr algn="l" rtl="0" fontAlgn="base"/>
                       <a:r>
-                        <a:rPr lang="pt-BR" dirty="0">
+                        <a:rPr lang="pt-BR">
                           <a:effectLst/>
                         </a:rPr>
                         <a:t>De 1.743.298 </a:t>
                       </a:r>
                       <a:r>
-                        <a:rPr lang="pt-BR" u="sng" dirty="0">
+                        <a:rPr lang="pt-BR" u="sng">
                           <a:effectLst/>
                         </a:rPr>
                         <a:t>ordens com marcas</a:t>
                       </a:r>
                       <a:r>
-                        <a:rPr lang="pt-BR" dirty="0">
+                        <a:rPr lang="pt-BR">
                           <a:effectLst/>
                         </a:rPr>
                         <a:t>,​</a:t>
                       </a:r>
-                      <a:endParaRPr lang="pt-BR">
-                        <a:effectLst/>
-                      </a:endParaRPr>
                     </a:p>
                   </a:txBody>
                   <a:tcPr/>
@@ -11094,14 +11678,11 @@
                     <a:p>
                       <a:pPr algn="l" rtl="0" fontAlgn="base"/>
                       <a:r>
-                        <a:rPr lang="pt-BR" dirty="0">
+                        <a:rPr lang="pt-BR">
                           <a:effectLst/>
                         </a:rPr>
                         <a:t>Volume​</a:t>
                       </a:r>
-                      <a:endParaRPr lang="pt-BR">
-                        <a:effectLst/>
-                      </a:endParaRPr>
                     </a:p>
                   </a:txBody>
                   <a:tcPr/>
@@ -11113,14 +11694,11 @@
                     <a:p>
                       <a:pPr algn="l" rtl="0" fontAlgn="base"/>
                       <a:r>
-                        <a:rPr lang="pt-BR" dirty="0">
+                        <a:rPr lang="pt-BR">
                           <a:effectLst/>
                         </a:rPr>
                         <a:t>Contribuição  percentual​</a:t>
                       </a:r>
-                      <a:endParaRPr lang="pt-BR">
-                        <a:effectLst/>
-                      </a:endParaRPr>
                     </a:p>
                   </a:txBody>
                   <a:tcPr/>
@@ -11141,12 +11719,12 @@
                         <a:buNone/>
                       </a:pPr>
                       <a:r>
-                        <a:rPr lang="en-US" sz="1800" u="none" strike="noStrike" noProof="0" dirty="0">
+                        <a:rPr lang="en-US" sz="1800" u="none" strike="noStrike" noProof="0">
                           <a:effectLst/>
                         </a:rPr>
                         <a:t>1.460.659</a:t>
                       </a:r>
-                      <a:endParaRPr lang="pt-BR" dirty="0"/>
+                      <a:endParaRPr lang="pt-BR"/>
                     </a:p>
                   </a:txBody>
                   <a:tcPr/>
@@ -11158,14 +11736,11 @@
                     <a:p>
                       <a:pPr algn="r" rtl="0" fontAlgn="base"/>
                       <a:r>
-                        <a:rPr lang="pt-BR" dirty="0">
+                        <a:rPr lang="pt-BR">
                           <a:effectLst/>
                         </a:rPr>
                         <a:t>6 L​</a:t>
                       </a:r>
-                      <a:endParaRPr lang="pt-BR">
-                        <a:effectLst/>
-                      </a:endParaRPr>
                     </a:p>
                   </a:txBody>
                   <a:tcPr/>
@@ -11179,12 +11754,12 @@
                         <a:buNone/>
                       </a:pPr>
                       <a:r>
-                        <a:rPr lang="en-US" sz="1800" u="none" strike="noStrike" noProof="0" dirty="0">
+                        <a:rPr lang="en-US" sz="1800" u="none" strike="noStrike" noProof="0">
                           <a:effectLst/>
                         </a:rPr>
                         <a:t>0,8379</a:t>
                       </a:r>
-                      <a:endParaRPr lang="pt-BR" dirty="0"/>
+                      <a:endParaRPr lang="pt-BR"/>
                     </a:p>
                   </a:txBody>
                   <a:tcPr/>
@@ -11205,12 +11780,12 @@
                         <a:buNone/>
                       </a:pPr>
                       <a:r>
-                        <a:rPr lang="en-US" sz="1800" u="none" strike="noStrike" noProof="0" dirty="0">
+                        <a:rPr lang="en-US" sz="1800" u="none" strike="noStrike" noProof="0">
                           <a:effectLst/>
                         </a:rPr>
                         <a:t>174.620</a:t>
                       </a:r>
-                      <a:endParaRPr lang="pt-BR" dirty="0"/>
+                      <a:endParaRPr lang="pt-BR"/>
                     </a:p>
                   </a:txBody>
                   <a:tcPr/>
@@ -11222,14 +11797,11 @@
                     <a:p>
                       <a:pPr algn="r" rtl="0" fontAlgn="base"/>
                       <a:r>
-                        <a:rPr lang="pt-BR" dirty="0">
+                        <a:rPr lang="pt-BR">
                           <a:effectLst/>
                         </a:rPr>
                         <a:t>330ml​</a:t>
                       </a:r>
-                      <a:endParaRPr lang="pt-BR">
-                        <a:effectLst/>
-                      </a:endParaRPr>
                     </a:p>
                   </a:txBody>
                   <a:tcPr/>
@@ -11243,12 +11815,12 @@
                         <a:buNone/>
                       </a:pPr>
                       <a:r>
-                        <a:rPr lang="en-US" sz="1800" u="none" strike="noStrike" noProof="0" dirty="0">
+                        <a:rPr lang="en-US" sz="1800" u="none" strike="noStrike" noProof="0">
                           <a:effectLst/>
                         </a:rPr>
                         <a:t>0,1002</a:t>
                       </a:r>
-                      <a:endParaRPr lang="pt-BR" dirty="0"/>
+                      <a:endParaRPr lang="pt-BR"/>
                     </a:p>
                   </a:txBody>
                   <a:tcPr/>
@@ -11269,12 +11841,12 @@
                         <a:buNone/>
                       </a:pPr>
                       <a:r>
-                        <a:rPr lang="en-US" sz="1800" u="none" strike="noStrike" noProof="0" dirty="0">
+                        <a:rPr lang="en-US" sz="1800" u="none" strike="noStrike" noProof="0">
                           <a:effectLst/>
                         </a:rPr>
                         <a:t>80.056</a:t>
                       </a:r>
-                      <a:endParaRPr lang="pt-BR" dirty="0"/>
+                      <a:endParaRPr lang="pt-BR"/>
                     </a:p>
                   </a:txBody>
                   <a:tcPr/>
@@ -11286,14 +11858,11 @@
                     <a:p>
                       <a:pPr algn="r" rtl="0" fontAlgn="base"/>
                       <a:r>
-                        <a:rPr lang="pt-BR" dirty="0">
+                        <a:rPr lang="pt-BR">
                           <a:effectLst/>
                         </a:rPr>
                         <a:t>355ml​</a:t>
                       </a:r>
-                      <a:endParaRPr lang="pt-BR">
-                        <a:effectLst/>
-                      </a:endParaRPr>
                     </a:p>
                   </a:txBody>
                   <a:tcPr/>
@@ -11307,12 +11876,12 @@
                         <a:buNone/>
                       </a:pPr>
                       <a:r>
-                        <a:rPr lang="en-US" sz="1800" u="none" strike="noStrike" noProof="0" dirty="0">
+                        <a:rPr lang="en-US" sz="1800" u="none" strike="noStrike" noProof="0">
                           <a:effectLst/>
                         </a:rPr>
                         <a:t>0,0459</a:t>
                       </a:r>
-                      <a:endParaRPr lang="pt-BR" dirty="0"/>
+                      <a:endParaRPr lang="pt-BR"/>
                     </a:p>
                   </a:txBody>
                   <a:tcPr/>
@@ -11390,7 +11959,7 @@
                         <a:buNone/>
                       </a:pPr>
                       <a:r>
-                        <a:rPr lang="pt-BR" sz="1600" u="none" strike="noStrike" noProof="0" dirty="0">
+                        <a:rPr lang="pt-BR" sz="1600" u="none" strike="noStrike" noProof="0">
                           <a:effectLst/>
                         </a:rPr>
                         <a:t>De 2.963.644</a:t>
@@ -11402,18 +11971,18 @@
                         <a:buNone/>
                       </a:pPr>
                       <a:r>
-                        <a:rPr lang="pt-BR" sz="1600" u="sng" strike="noStrike" noProof="0" dirty="0">
+                        <a:rPr lang="pt-BR" sz="1600" u="sng" strike="noStrike" noProof="0">
                           <a:effectLst/>
                         </a:rPr>
                         <a:t>peças</a:t>
                       </a:r>
                       <a:r>
-                        <a:rPr lang="pt-BR" sz="1600" u="none" strike="noStrike" noProof="0" dirty="0">
+                        <a:rPr lang="pt-BR" sz="1600" u="none" strike="noStrike" noProof="0">
                           <a:effectLst/>
                         </a:rPr>
                         <a:t> entregues,</a:t>
                       </a:r>
-                      <a:endParaRPr lang="pt-BR" sz="1600" u="none" strike="noStrike" noProof="0" dirty="0"/>
+                      <a:endParaRPr lang="pt-BR" sz="1600" u="none" strike="noStrike" noProof="0"/>
                     </a:p>
                   </a:txBody>
                   <a:tcPr/>
@@ -11425,14 +11994,11 @@
                     <a:p>
                       <a:pPr rtl="0" fontAlgn="base"/>
                       <a:r>
-                        <a:rPr lang="pt-BR" sz="1600" dirty="0">
+                        <a:rPr lang="pt-BR" sz="1600">
                           <a:effectLst/>
                         </a:rPr>
                         <a:t>Volume​​</a:t>
                       </a:r>
-                      <a:endParaRPr lang="pt-BR" sz="1600">
-                        <a:effectLst/>
-                      </a:endParaRPr>
                     </a:p>
                   </a:txBody>
                   <a:tcPr/>
@@ -11444,14 +12010,11 @@
                     <a:p>
                       <a:pPr rtl="0" fontAlgn="base"/>
                       <a:r>
-                        <a:rPr lang="pt-BR" sz="1600" dirty="0">
+                        <a:rPr lang="pt-BR" sz="1600">
                           <a:effectLst/>
                         </a:rPr>
                         <a:t>Contribuição  percentual​​</a:t>
                       </a:r>
-                      <a:endParaRPr lang="pt-BR" sz="1600">
-                        <a:effectLst/>
-                      </a:endParaRPr>
                     </a:p>
                   </a:txBody>
                   <a:tcPr/>
@@ -11472,7 +12035,7 @@
                         <a:buNone/>
                       </a:pPr>
                       <a:r>
-                        <a:rPr lang="en-US" sz="1600" u="none" strike="noStrike" noProof="0" dirty="0">
+                        <a:rPr lang="en-US" sz="1600" u="none" strike="noStrike" noProof="0">
                           <a:effectLst/>
                         </a:rPr>
                         <a:t>2.466.967</a:t>
@@ -11491,7 +12054,7 @@
                     <a:p>
                       <a:pPr algn="r" rtl="0" fontAlgn="base"/>
                       <a:r>
-                        <a:rPr lang="pt-BR" sz="1600" dirty="0">
+                        <a:rPr lang="pt-BR" sz="1600">
                           <a:effectLst/>
                         </a:rPr>
                         <a:t>6 L​​</a:t>
@@ -11509,7 +12072,7 @@
                         <a:buNone/>
                       </a:pPr>
                       <a:r>
-                        <a:rPr lang="en-US" sz="1600" u="none" strike="noStrike" noProof="0" dirty="0">
+                        <a:rPr lang="en-US" sz="1600" u="none" strike="noStrike" noProof="0">
                           <a:effectLst/>
                         </a:rPr>
                         <a:t>0,8324</a:t>
@@ -11537,7 +12100,7 @@
                         <a:buNone/>
                       </a:pPr>
                       <a:r>
-                        <a:rPr lang="en-US" sz="1600" u="none" strike="noStrike" noProof="0" dirty="0">
+                        <a:rPr lang="en-US" sz="1600" u="none" strike="noStrike" noProof="0">
                           <a:effectLst/>
                         </a:rPr>
                         <a:t>296.085</a:t>
@@ -11556,7 +12119,7 @@
                     <a:p>
                       <a:pPr algn="r" rtl="0" fontAlgn="base"/>
                       <a:r>
-                        <a:rPr lang="pt-BR" sz="1600" dirty="0">
+                        <a:rPr lang="pt-BR" sz="1600">
                           <a:effectLst/>
                         </a:rPr>
                         <a:t>330ml​​</a:t>
@@ -11574,7 +12137,7 @@
                         <a:buNone/>
                       </a:pPr>
                       <a:r>
-                        <a:rPr lang="en-US" sz="1600" u="none" strike="noStrike" noProof="0" dirty="0">
+                        <a:rPr lang="en-US" sz="1600" u="none" strike="noStrike" noProof="0">
                           <a:effectLst/>
                         </a:rPr>
                         <a:t>0,0999</a:t>
@@ -11602,7 +12165,7 @@
                         <a:buNone/>
                       </a:pPr>
                       <a:r>
-                        <a:rPr lang="en-US" sz="1600" u="none" strike="noStrike" noProof="0" dirty="0">
+                        <a:rPr lang="en-US" sz="1600" u="none" strike="noStrike" noProof="0">
                           <a:effectLst/>
                         </a:rPr>
                         <a:t>147.494</a:t>
@@ -11621,7 +12184,7 @@
                     <a:p>
                       <a:pPr algn="r" rtl="0" fontAlgn="base"/>
                       <a:r>
-                        <a:rPr lang="pt-BR" sz="1600" dirty="0">
+                        <a:rPr lang="pt-BR" sz="1600">
                           <a:effectLst/>
                         </a:rPr>
                         <a:t>355ml​​</a:t>
@@ -11639,7 +12202,7 @@
                         <a:buNone/>
                       </a:pPr>
                       <a:r>
-                        <a:rPr lang="en-US" sz="1600" u="none" strike="noStrike" noProof="0" dirty="0">
+                        <a:rPr lang="en-US" sz="1600" u="none" strike="noStrike" noProof="0">
                           <a:effectLst/>
                         </a:rPr>
                         <a:t>0,0498</a:t>
@@ -11714,7 +12277,7 @@
                     <a:lstStyle/>
                     <a:p>
                       <a:r>
-                        <a:rPr lang="pt-BR" sz="1800" dirty="0"/>
+                        <a:rPr lang="pt-BR" sz="1800"/>
                         <a:t>Volume</a:t>
                       </a:r>
                     </a:p>
@@ -11730,26 +12293,26 @@
                         <a:buNone/>
                       </a:pPr>
                       <a:r>
-                        <a:rPr lang="pt-BR" sz="1800" u="sng" strike="noStrike" noProof="0" dirty="0"/>
+                        <a:rPr lang="pt-BR" sz="1800" u="sng" strike="noStrike" noProof="0"/>
                         <a:t>Relação</a:t>
                       </a:r>
                       <a:r>
-                        <a:rPr lang="pt-BR" sz="1800" u="none" strike="noStrike" noProof="0" dirty="0"/>
+                        <a:rPr lang="pt-BR" sz="1800" u="none" strike="noStrike" noProof="0"/>
                         <a:t> da quantidade de </a:t>
                       </a:r>
                       <a:r>
-                        <a:rPr lang="pt-BR" sz="1800" u="sng" strike="noStrike" noProof="0" dirty="0"/>
+                        <a:rPr lang="pt-BR" sz="1800" u="sng" strike="noStrike" noProof="0"/>
                         <a:t>peças </a:t>
                       </a:r>
                       <a:r>
-                        <a:rPr lang="pt-BR" sz="1800" u="none" strike="noStrike" noProof="0" dirty="0"/>
+                        <a:rPr lang="pt-BR" sz="1800" u="none" strike="noStrike" noProof="0"/>
                         <a:t>entregues com a quantidade de </a:t>
                       </a:r>
                       <a:r>
-                        <a:rPr lang="pt-BR" sz="1800" u="sng" strike="noStrike" noProof="0" dirty="0"/>
+                        <a:rPr lang="pt-BR" sz="1800" u="sng" strike="noStrike" noProof="0"/>
                         <a:t>ordens</a:t>
                       </a:r>
-                      <a:endParaRPr lang="pt-BR" sz="1800" dirty="0"/>
+                      <a:endParaRPr lang="pt-BR" sz="1800"/>
                     </a:p>
                   </a:txBody>
                   <a:tcPr/>
@@ -11767,7 +12330,7 @@
                     <a:lstStyle/>
                     <a:p>
                       <a:r>
-                        <a:rPr lang="pt-BR" sz="1800" dirty="0"/>
+                        <a:rPr lang="pt-BR" sz="1800"/>
                         <a:t>6 L</a:t>
                       </a:r>
                     </a:p>
@@ -11783,10 +12346,10 @@
                         <a:buNone/>
                       </a:pPr>
                       <a:r>
-                        <a:rPr lang="pt-BR" sz="1800" u="none" strike="noStrike" noProof="0" dirty="0"/>
+                        <a:rPr lang="pt-BR" sz="1800" u="none" strike="noStrike" noProof="0"/>
                         <a:t>1,6889</a:t>
                       </a:r>
-                      <a:endParaRPr lang="pt-BR" sz="1800" dirty="0"/>
+                      <a:endParaRPr lang="pt-BR" sz="1800"/>
                     </a:p>
                   </a:txBody>
                   <a:tcPr/>
@@ -11804,7 +12367,7 @@
                     <a:lstStyle/>
                     <a:p>
                       <a:r>
-                        <a:rPr lang="pt-BR" sz="1800" dirty="0"/>
+                        <a:rPr lang="pt-BR" sz="1800"/>
                         <a:t>330ml</a:t>
                       </a:r>
                     </a:p>
@@ -11820,10 +12383,10 @@
                         <a:buNone/>
                       </a:pPr>
                       <a:r>
-                        <a:rPr lang="pt-BR" sz="1800" u="none" strike="noStrike" noProof="0" dirty="0"/>
+                        <a:rPr lang="pt-BR" sz="1800" u="none" strike="noStrike" noProof="0"/>
                         <a:t>1,6956</a:t>
                       </a:r>
-                      <a:endParaRPr lang="pt-BR" sz="1800" dirty="0"/>
+                      <a:endParaRPr lang="pt-BR" sz="1800"/>
                     </a:p>
                   </a:txBody>
                   <a:tcPr/>
@@ -11841,7 +12404,7 @@
                     <a:lstStyle/>
                     <a:p>
                       <a:r>
-                        <a:rPr lang="pt-BR" sz="1800" dirty="0"/>
+                        <a:rPr lang="pt-BR" sz="1800"/>
                         <a:t>355ml</a:t>
                       </a:r>
                     </a:p>
@@ -11857,10 +12420,10 @@
                         <a:buNone/>
                       </a:pPr>
                       <a:r>
-                        <a:rPr lang="pt-BR" sz="1800" u="none" strike="noStrike" noProof="0" dirty="0"/>
+                        <a:rPr lang="pt-BR" sz="1800" u="none" strike="noStrike" noProof="0"/>
                         <a:t>1,8424</a:t>
                       </a:r>
-                      <a:endParaRPr lang="pt-BR" sz="1800" dirty="0"/>
+                      <a:endParaRPr lang="pt-BR" sz="1800"/>
                     </a:p>
                   </a:txBody>
                   <a:tcPr/>
@@ -12684,7 +13247,7 @@
           <a:lstStyle/>
           <a:p>
             <a:pPr algn="ctr"/>
-            <a:endParaRPr lang="en-US" dirty="0">
+            <a:endParaRPr lang="en-US">
               <a:solidFill>
                 <a:prstClr val="white"/>
               </a:solidFill>
@@ -15478,7 +16041,7 @@
                 <a:spcPts val="600"/>
               </a:spcAft>
             </a:pPr>
-            <a:endParaRPr lang="pt-BR" dirty="0">
+            <a:endParaRPr lang="pt-BR">
               <a:ea typeface="+mn-lt"/>
               <a:cs typeface="+mn-lt"/>
             </a:endParaRPr>
@@ -15640,9 +16203,6 @@
               </a:rPr>
               <a:t>Verificar correlação com MARCA, com CLIENTE e com VOLUME</a:t>
             </a:r>
-            <a:endParaRPr lang="pt-BR" dirty="0">
-              <a:cs typeface="Calibri"/>
-            </a:endParaRPr>
           </a:p>
         </p:txBody>
       </p:sp>
@@ -16304,7 +16864,7 @@
           <a:lstStyle/>
           <a:p>
             <a:pPr algn="ctr"/>
-            <a:endParaRPr lang="en-US" dirty="0"/>
+            <a:endParaRPr lang="en-US"/>
           </a:p>
         </p:txBody>
       </p:sp>
@@ -18295,14 +18855,14 @@
           <p:nvPr>
             <p:extLst>
               <p:ext uri="{D42A27DB-BD31-4B8C-83A1-F6EECF244321}">
-                <p14:modId xmlns:p14="http://schemas.microsoft.com/office/powerpoint/2010/main" val="761223328"/>
+                <p14:modId xmlns:p14="http://schemas.microsoft.com/office/powerpoint/2010/main" val="723618693"/>
               </p:ext>
             </p:extLst>
           </p:nvPr>
         </p:nvGraphicFramePr>
         <p:xfrm>
-          <a:off x="6138194" y="2484255"/>
-          <a:ext cx="4696954" cy="3549541"/>
+          <a:off x="6484558" y="2276437"/>
+          <a:ext cx="4696952" cy="4126927"/>
         </p:xfrm>
         <a:graphic>
           <a:graphicData uri="http://schemas.openxmlformats.org/drawingml/2006/table">
@@ -18311,34 +18871,41 @@
                 <a:tableStyleId>{1E171933-4619-4E11-9A3F-F7608DF75F80}</a:tableStyleId>
               </a:tblPr>
               <a:tblGrid>
-                <a:gridCol w="1224217">
+                <a:gridCol w="963452">
                   <a:extLst>
                     <a:ext uri="{9D8B030D-6E8A-4147-A177-3AD203B41FA5}">
                       <a16:colId xmlns:a16="http://schemas.microsoft.com/office/drawing/2014/main" val="4038726792"/>
                     </a:ext>
                   </a:extLst>
                 </a:gridCol>
-                <a:gridCol w="1591903">
+                <a:gridCol w="1252819">
                   <a:extLst>
                     <a:ext uri="{9D8B030D-6E8A-4147-A177-3AD203B41FA5}">
                       <a16:colId xmlns:a16="http://schemas.microsoft.com/office/drawing/2014/main" val="2202315969"/>
                     </a:ext>
                   </a:extLst>
                 </a:gridCol>
-                <a:gridCol w="609574">
+                <a:gridCol w="479731">
                   <a:extLst>
                     <a:ext uri="{9D8B030D-6E8A-4147-A177-3AD203B41FA5}">
                       <a16:colId xmlns:a16="http://schemas.microsoft.com/office/drawing/2014/main" val="973207587"/>
                     </a:ext>
                   </a:extLst>
                 </a:gridCol>
-                <a:gridCol w="1271260">
+                <a:gridCol w="1000475">
                   <a:extLst>
                     <a:ext uri="{9D8B030D-6E8A-4147-A177-3AD203B41FA5}">
                       <a16:colId xmlns:a16="http://schemas.microsoft.com/office/drawing/2014/main" val="1461465705"/>
                     </a:ext>
                   </a:extLst>
                 </a:gridCol>
+                <a:gridCol w="1000475">
+                  <a:extLst>
+                    <a:ext uri="{9D8B030D-6E8A-4147-A177-3AD203B41FA5}">
+                      <a16:colId xmlns:a16="http://schemas.microsoft.com/office/drawing/2014/main" val="3577629201"/>
+                    </a:ext>
+                  </a:extLst>
+                </a:gridCol>
               </a:tblGrid>
               <a:tr h="415826">
                 <a:tc>
@@ -18430,6 +18997,30 @@
                     </a:p>
                   </a:txBody>
                   <a:tcPr marL="57230" marR="57230" marT="28615" marB="28615">
+                    <a:solidFill>
+                      <a:srgbClr val="FFC000"/>
+                    </a:solidFill>
+                  </a:tcPr>
+                </a:tc>
+                <a:tc>
+                  <a:txBody>
+                    <a:bodyPr/>
+                    <a:lstStyle/>
+                    <a:p>
+                      <a:pPr lvl="0">
+                        <a:buNone/>
+                      </a:pPr>
+                      <a:r>
+                        <a:rPr lang="pt-BR" sz="1100" b="1">
+                          <a:solidFill>
+                            <a:schemeClr val="bg1"/>
+                          </a:solidFill>
+                        </a:rPr>
+                        <a:t>Maco</a:t>
+                      </a:r>
+                    </a:p>
+                  </a:txBody>
+                  <a:tcPr marL="57229" marR="57229" marT="28614" marB="28614">
                     <a:solidFill>
                       <a:srgbClr val="FFC000"/>
                     </a:solidFill>
@@ -18526,6 +19117,22 @@
                   </a:txBody>
                   <a:tcPr marL="57230" marR="57230" marT="28615" marB="28615"/>
                 </a:tc>
+                <a:tc>
+                  <a:txBody>
+                    <a:bodyPr/>
+                    <a:lstStyle/>
+                    <a:p>
+                      <a:pPr lvl="0" algn="r">
+                        <a:buNone/>
+                      </a:pPr>
+                      <a:r>
+                        <a:rPr lang="pt-BR" sz="1100" b="0" i="0" u="none" strike="noStrike" noProof="0"/>
+                        <a:t>150.68983</a:t>
+                      </a:r>
+                    </a:p>
+                  </a:txBody>
+                  <a:tcPr marL="57229" marR="57229" marT="28614" marB="28614"/>
+                </a:tc>
                 <a:extLst>
                   <a:ext uri="{0D108BD9-81ED-4DB2-BD59-A6C34878D82A}">
                     <a16:rowId xmlns:a16="http://schemas.microsoft.com/office/drawing/2014/main" val="789727506"/>
@@ -18598,6 +19205,24 @@
                   </a:txBody>
                   <a:tcPr marL="57230" marR="57230" marT="28614" marB="28614"/>
                 </a:tc>
+                <a:tc>
+                  <a:txBody>
+                    <a:bodyPr/>
+                    <a:lstStyle/>
+                    <a:p>
+                      <a:pPr lvl="0" algn="r">
+                        <a:buNone/>
+                      </a:pPr>
+                      <a:r>
+                        <a:rPr lang="pt-BR" sz="1100" b="0" i="0" u="none" strike="noStrike" noProof="0">
+                          <a:latin typeface="Calibri"/>
+                        </a:rPr>
+                        <a:t>171.61458</a:t>
+                      </a:r>
+                    </a:p>
+                  </a:txBody>
+                  <a:tcPr marL="57229" marR="57229" marT="28613" marB="28613"/>
+                </a:tc>
                 <a:extLst>
                   <a:ext uri="{0D108BD9-81ED-4DB2-BD59-A6C34878D82A}">
                     <a16:rowId xmlns:a16="http://schemas.microsoft.com/office/drawing/2014/main" val="2294799149"/>
@@ -18682,6 +19307,25 @@
                   </a:txBody>
                   <a:tcPr marL="57230" marR="57230" marT="28615" marB="28615"/>
                 </a:tc>
+                <a:tc>
+                  <a:txBody>
+                    <a:bodyPr/>
+                    <a:lstStyle/>
+                    <a:p>
+                      <a:pPr lvl="0" algn="r">
+                        <a:buNone/>
+                      </a:pPr>
+                      <a:r>
+                        <a:rPr lang="pt-BR" sz="1100" b="0" i="0" u="none" strike="noStrike" noProof="0">
+                          <a:latin typeface="Calibri"/>
+                        </a:rPr>
+                        <a:t>195.58745</a:t>
+                      </a:r>
+                      <a:endParaRPr lang="pt-BR"/>
+                    </a:p>
+                  </a:txBody>
+                  <a:tcPr marL="57229" marR="57229" marT="28614" marB="28614"/>
+                </a:tc>
                 <a:extLst>
                   <a:ext uri="{0D108BD9-81ED-4DB2-BD59-A6C34878D82A}">
                     <a16:rowId xmlns:a16="http://schemas.microsoft.com/office/drawing/2014/main" val="2795093823"/>
@@ -18758,6 +19402,25 @@
                   </a:txBody>
                   <a:tcPr marL="57230" marR="57230" marT="28614" marB="28614"/>
                 </a:tc>
+                <a:tc>
+                  <a:txBody>
+                    <a:bodyPr/>
+                    <a:lstStyle/>
+                    <a:p>
+                      <a:pPr lvl="0" algn="r">
+                        <a:buNone/>
+                      </a:pPr>
+                      <a:r>
+                        <a:rPr lang="pt-BR" sz="1100" b="0" i="0" u="none" strike="noStrike" noProof="0">
+                          <a:latin typeface="Calibri"/>
+                        </a:rPr>
+                        <a:t>170.75471</a:t>
+                      </a:r>
+                      <a:endParaRPr lang="pt-BR"/>
+                    </a:p>
+                  </a:txBody>
+                  <a:tcPr marL="57229" marR="57229" marT="28613" marB="28613"/>
+                </a:tc>
                 <a:extLst>
                   <a:ext uri="{0D108BD9-81ED-4DB2-BD59-A6C34878D82A}">
                     <a16:rowId xmlns:a16="http://schemas.microsoft.com/office/drawing/2014/main" val="766579971"/>
@@ -18856,6 +19519,23 @@
                   </a:txBody>
                   <a:tcPr marL="57230" marR="57230" marT="28615" marB="28615"/>
                 </a:tc>
+                <a:tc>
+                  <a:txBody>
+                    <a:bodyPr/>
+                    <a:lstStyle/>
+                    <a:p>
+                      <a:pPr lvl="0" algn="r">
+                        <a:buNone/>
+                      </a:pPr>
+                      <a:r>
+                        <a:rPr lang="pt-BR" sz="1100" b="0" i="0" u="none" strike="noStrike" noProof="0"/>
+                        <a:t>224.59976</a:t>
+                      </a:r>
+                      <a:endParaRPr lang="pt-BR"/>
+                    </a:p>
+                  </a:txBody>
+                  <a:tcPr marL="57229" marR="57229" marT="28614" marB="28614"/>
+                </a:tc>
                 <a:extLst>
                   <a:ext uri="{0D108BD9-81ED-4DB2-BD59-A6C34878D82A}">
                     <a16:rowId xmlns:a16="http://schemas.microsoft.com/office/drawing/2014/main" val="890994131"/>
@@ -18932,6 +19612,25 @@
                   </a:txBody>
                   <a:tcPr marL="57230" marR="57230" marT="28614" marB="28614"/>
                 </a:tc>
+                <a:tc>
+                  <a:txBody>
+                    <a:bodyPr/>
+                    <a:lstStyle/>
+                    <a:p>
+                      <a:pPr lvl="0" algn="r">
+                        <a:buNone/>
+                      </a:pPr>
+                      <a:r>
+                        <a:rPr lang="pt-BR" sz="1100" b="0" i="0" u="none" strike="noStrike" noProof="0">
+                          <a:latin typeface="Calibri"/>
+                        </a:rPr>
+                        <a:t>211.63166</a:t>
+                      </a:r>
+                      <a:endParaRPr lang="pt-BR"/>
+                    </a:p>
+                  </a:txBody>
+                  <a:tcPr marL="57229" marR="57229" marT="28613" marB="28613"/>
+                </a:tc>
                 <a:extLst>
                   <a:ext uri="{0D108BD9-81ED-4DB2-BD59-A6C34878D82A}">
                     <a16:rowId xmlns:a16="http://schemas.microsoft.com/office/drawing/2014/main" val="2862269919"/>
@@ -19021,6 +19720,25 @@
                   </a:txBody>
                   <a:tcPr marL="57230" marR="57230" marT="28615" marB="28615"/>
                 </a:tc>
+                <a:tc>
+                  <a:txBody>
+                    <a:bodyPr/>
+                    <a:lstStyle/>
+                    <a:p>
+                      <a:pPr lvl="0" algn="r">
+                        <a:buNone/>
+                      </a:pPr>
+                      <a:r>
+                        <a:rPr lang="pt-BR" sz="1100" b="0" i="0" u="none" strike="noStrike" noProof="0">
+                          <a:latin typeface="Calibri"/>
+                        </a:rPr>
+                        <a:t>217.44926</a:t>
+                      </a:r>
+                      <a:endParaRPr lang="pt-BR"/>
+                    </a:p>
+                  </a:txBody>
+                  <a:tcPr marL="57229" marR="57229" marT="28614" marB="28614"/>
+                </a:tc>
                 <a:extLst>
                   <a:ext uri="{0D108BD9-81ED-4DB2-BD59-A6C34878D82A}">
                     <a16:rowId xmlns:a16="http://schemas.microsoft.com/office/drawing/2014/main" val="1074616226"/>
@@ -19110,6 +19828,22 @@
                   </a:txBody>
                   <a:tcPr marL="57230" marR="57230" marT="28615" marB="28615"/>
                 </a:tc>
+                <a:tc>
+                  <a:txBody>
+                    <a:bodyPr/>
+                    <a:lstStyle/>
+                    <a:p>
+                      <a:pPr lvl="0" algn="r">
+                        <a:buNone/>
+                      </a:pPr>
+                      <a:r>
+                        <a:rPr lang="pt-BR" sz="1100" b="0" i="0" u="none" strike="noStrike" noProof="0"/>
+                        <a:t>147.37941</a:t>
+                      </a:r>
+                    </a:p>
+                  </a:txBody>
+                  <a:tcPr marL="57229" marR="57229" marT="28614" marB="28614"/>
+                </a:tc>
                 <a:extLst>
                   <a:ext uri="{0D108BD9-81ED-4DB2-BD59-A6C34878D82A}">
                     <a16:rowId xmlns:a16="http://schemas.microsoft.com/office/drawing/2014/main" val="3083441293"/>
@@ -19199,6 +19933,22 @@
                   </a:txBody>
                   <a:tcPr marL="57230" marR="57230" marT="28615" marB="28615"/>
                 </a:tc>
+                <a:tc>
+                  <a:txBody>
+                    <a:bodyPr/>
+                    <a:lstStyle/>
+                    <a:p>
+                      <a:pPr lvl="0" algn="r">
+                        <a:buNone/>
+                      </a:pPr>
+                      <a:r>
+                        <a:rPr lang="pt-BR" sz="1100" b="0" i="0" u="none" strike="noStrike" noProof="0"/>
+                        <a:t>201.89884</a:t>
+                      </a:r>
+                    </a:p>
+                  </a:txBody>
+                  <a:tcPr marL="57229" marR="57229" marT="28614" marB="28614"/>
+                </a:tc>
                 <a:extLst>
                   <a:ext uri="{0D108BD9-81ED-4DB2-BD59-A6C34878D82A}">
                     <a16:rowId xmlns:a16="http://schemas.microsoft.com/office/drawing/2014/main" val="1926475398"/>
@@ -19283,12 +20033,27 @@
                         </a:rPr>
                         <a:t>77721</a:t>
                       </a:r>
-                      <a:endParaRPr lang="pt-BR" sz="1100" b="0" i="0" u="none" strike="noStrike" noProof="0" dirty="0">
-                        <a:latin typeface="Calibri"/>
-                      </a:endParaRPr>
                     </a:p>
                   </a:txBody>
                   <a:tcPr marL="57230" marR="57230" marT="28615" marB="28615"/>
+                </a:tc>
+                <a:tc>
+                  <a:txBody>
+                    <a:bodyPr/>
+                    <a:lstStyle/>
+                    <a:p>
+                      <a:pPr lvl="0" algn="r">
+                        <a:buNone/>
+                      </a:pPr>
+                      <a:r>
+                        <a:rPr lang="pt-BR" sz="1100" b="0" i="0" u="none" strike="noStrike" noProof="0">
+                          <a:latin typeface="Calibri"/>
+                        </a:rPr>
+                        <a:t>--</a:t>
+                      </a:r>
+                    </a:p>
+                  </a:txBody>
+                  <a:tcPr marL="57229" marR="57229" marT="28614" marB="28614"/>
                 </a:tc>
                 <a:extLst>
                   <a:ext uri="{0D108BD9-81ED-4DB2-BD59-A6C34878D82A}">
@@ -19366,6 +20131,24 @@
                   </a:txBody>
                   <a:tcPr marL="57230" marR="57230" marT="28615" marB="28615"/>
                 </a:tc>
+                <a:tc>
+                  <a:txBody>
+                    <a:bodyPr/>
+                    <a:lstStyle/>
+                    <a:p>
+                      <a:pPr lvl="0" algn="r">
+                        <a:buNone/>
+                      </a:pPr>
+                      <a:r>
+                        <a:rPr lang="pt-BR" sz="1100" b="0" i="0" u="none" strike="noStrike" noProof="0">
+                          <a:latin typeface="Calibri"/>
+                        </a:rPr>
+                        <a:t>137.85127</a:t>
+                      </a:r>
+                    </a:p>
+                  </a:txBody>
+                  <a:tcPr marL="57229" marR="57229" marT="28614" marB="28614"/>
+                </a:tc>
                 <a:extLst>
                   <a:ext uri="{0D108BD9-81ED-4DB2-BD59-A6C34878D82A}">
                     <a16:rowId xmlns:a16="http://schemas.microsoft.com/office/drawing/2014/main" val="2257774954"/>
@@ -19448,6 +20231,24 @@
                     </a:p>
                   </a:txBody>
                   <a:tcPr marL="57230" marR="57230" marT="28615" marB="28615"/>
+                </a:tc>
+                <a:tc>
+                  <a:txBody>
+                    <a:bodyPr/>
+                    <a:lstStyle/>
+                    <a:p>
+                      <a:pPr lvl="0" algn="r">
+                        <a:buNone/>
+                      </a:pPr>
+                      <a:r>
+                        <a:rPr lang="pt-BR" sz="1100" b="0" i="0" u="none" strike="noStrike" noProof="0">
+                          <a:latin typeface="Calibri"/>
+                        </a:rPr>
+                        <a:t>--</a:t>
+                      </a:r>
+                    </a:p>
+                  </a:txBody>
+                  <a:tcPr marL="57229" marR="57229" marT="28614" marB="28614"/>
                 </a:tc>
                 <a:extLst>
                   <a:ext uri="{0D108BD9-81ED-4DB2-BD59-A6C34878D82A}">
@@ -19992,14 +20793,14 @@
           <p:nvPr>
             <p:extLst>
               <p:ext uri="{D42A27DB-BD31-4B8C-83A1-F6EECF244321}">
-                <p14:modId xmlns:p14="http://schemas.microsoft.com/office/powerpoint/2010/main" val="2433074002"/>
+                <p14:modId xmlns:p14="http://schemas.microsoft.com/office/powerpoint/2010/main" val="2307211394"/>
               </p:ext>
             </p:extLst>
           </p:nvPr>
         </p:nvGraphicFramePr>
         <p:xfrm>
           <a:off x="733507" y="1607085"/>
-          <a:ext cx="5536003" cy="3585080"/>
+          <a:ext cx="5535999" cy="3923812"/>
         </p:xfrm>
         <a:graphic>
           <a:graphicData uri="http://schemas.openxmlformats.org/drawingml/2006/table">
@@ -20008,34 +20809,41 @@
                 <a:tableStyleId>{7DF18680-E054-41AD-8BC1-D1AEF772440D}</a:tableStyleId>
               </a:tblPr>
               <a:tblGrid>
-                <a:gridCol w="1501024">
+                <a:gridCol w="1173358">
                   <a:extLst>
                     <a:ext uri="{9D8B030D-6E8A-4147-A177-3AD203B41FA5}">
                       <a16:colId xmlns:a16="http://schemas.microsoft.com/office/drawing/2014/main" val="2439833673"/>
                     </a:ext>
                   </a:extLst>
                 </a:gridCol>
-                <a:gridCol w="1400620">
+                <a:gridCol w="1094872">
                   <a:extLst>
                     <a:ext uri="{9D8B030D-6E8A-4147-A177-3AD203B41FA5}">
                       <a16:colId xmlns:a16="http://schemas.microsoft.com/office/drawing/2014/main" val="3880640159"/>
                     </a:ext>
                   </a:extLst>
                 </a:gridCol>
-                <a:gridCol w="1088409">
+                <a:gridCol w="850815">
                   <a:extLst>
                     <a:ext uri="{9D8B030D-6E8A-4147-A177-3AD203B41FA5}">
                       <a16:colId xmlns:a16="http://schemas.microsoft.com/office/drawing/2014/main" val="773726573"/>
                     </a:ext>
                   </a:extLst>
                 </a:gridCol>
-                <a:gridCol w="1545950">
+                <a:gridCol w="1208477">
                   <a:extLst>
                     <a:ext uri="{9D8B030D-6E8A-4147-A177-3AD203B41FA5}">
                       <a16:colId xmlns:a16="http://schemas.microsoft.com/office/drawing/2014/main" val="4094310413"/>
                     </a:ext>
                   </a:extLst>
                 </a:gridCol>
+                <a:gridCol w="1208477">
+                  <a:extLst>
+                    <a:ext uri="{9D8B030D-6E8A-4147-A177-3AD203B41FA5}">
+                      <a16:colId xmlns:a16="http://schemas.microsoft.com/office/drawing/2014/main" val="1729299648"/>
+                    </a:ext>
+                  </a:extLst>
+                </a:gridCol>
               </a:tblGrid>
               <a:tr h="935952">
                 <a:tc>
@@ -20095,6 +20903,22 @@
                     </a:p>
                   </a:txBody>
                   <a:tcPr marL="205252" marR="123151" marT="123151" marB="123151" anchor="ctr"/>
+                </a:tc>
+                <a:tc>
+                  <a:txBody>
+                    <a:bodyPr/>
+                    <a:lstStyle/>
+                    <a:p>
+                      <a:pPr lvl="0">
+                        <a:buNone/>
+                      </a:pPr>
+                      <a:r>
+                        <a:rPr lang="pt-BR" sz="1400" cap="none" spc="0"/>
+                        <a:t>Maco</a:t>
+                      </a:r>
+                    </a:p>
+                  </a:txBody>
+                  <a:tcPr marL="205251" marR="123150" marT="123150" marB="123150" anchor="ctr"/>
                 </a:tc>
                 <a:extLst>
                   <a:ext uri="{0D108BD9-81ED-4DB2-BD59-A6C34878D82A}">
@@ -20170,6 +20994,22 @@
                   </a:txBody>
                   <a:tcPr marL="205252" marR="123151" marT="123151" marB="123151"/>
                 </a:tc>
+                <a:tc>
+                  <a:txBody>
+                    <a:bodyPr/>
+                    <a:lstStyle/>
+                    <a:p>
+                      <a:pPr lvl="0" algn="r">
+                        <a:buNone/>
+                      </a:pPr>
+                      <a:r>
+                        <a:rPr lang="pt-BR" sz="1400" u="none" strike="noStrike" cap="none" spc="0" noProof="0"/>
+                        <a:t>140.09731</a:t>
+                      </a:r>
+                    </a:p>
+                  </a:txBody>
+                  <a:tcPr marL="205251" marR="123150" marT="123150" marB="123150"/>
+                </a:tc>
                 <a:extLst>
                   <a:ext uri="{0D108BD9-81ED-4DB2-BD59-A6C34878D82A}">
                     <a16:rowId xmlns:a16="http://schemas.microsoft.com/office/drawing/2014/main" val="4182537716"/>
@@ -20235,6 +21075,22 @@
                   </a:txBody>
                   <a:tcPr marL="205252" marR="123151" marT="123151" marB="123151"/>
                 </a:tc>
+                <a:tc>
+                  <a:txBody>
+                    <a:bodyPr/>
+                    <a:lstStyle/>
+                    <a:p>
+                      <a:pPr lvl="0" algn="r">
+                        <a:buNone/>
+                      </a:pPr>
+                      <a:r>
+                        <a:rPr lang="pt-BR" sz="1400" u="none" strike="noStrike" cap="none" spc="0" noProof="0"/>
+                        <a:t>158.76879</a:t>
+                      </a:r>
+                    </a:p>
+                  </a:txBody>
+                  <a:tcPr marL="205251" marR="123150" marT="123150" marB="123150"/>
+                </a:tc>
                 <a:extLst>
                   <a:ext uri="{0D108BD9-81ED-4DB2-BD59-A6C34878D82A}">
                     <a16:rowId xmlns:a16="http://schemas.microsoft.com/office/drawing/2014/main" val="141906463"/>
@@ -20309,6 +21165,22 @@
                     </a:p>
                   </a:txBody>
                   <a:tcPr marL="205252" marR="123151" marT="123151" marB="123151"/>
+                </a:tc>
+                <a:tc>
+                  <a:txBody>
+                    <a:bodyPr/>
+                    <a:lstStyle/>
+                    <a:p>
+                      <a:pPr lvl="0" algn="r">
+                        <a:buNone/>
+                      </a:pPr>
+                      <a:r>
+                        <a:rPr lang="pt-BR" sz="1400" u="none" strike="noStrike" cap="none" spc="0" noProof="0"/>
+                        <a:t>167.12853</a:t>
+                      </a:r>
+                    </a:p>
+                  </a:txBody>
+                  <a:tcPr marL="205251" marR="123150" marT="123150" marB="123150"/>
                 </a:tc>
                 <a:extLst>
                   <a:ext uri="{0D108BD9-81ED-4DB2-BD59-A6C34878D82A}">
@@ -20392,6 +21264,22 @@
                     </a:p>
                   </a:txBody>
                   <a:tcPr marL="205252" marR="123151" marT="123151" marB="123151"/>
+                </a:tc>
+                <a:tc>
+                  <a:txBody>
+                    <a:bodyPr/>
+                    <a:lstStyle/>
+                    <a:p>
+                      <a:pPr lvl="0" algn="r">
+                        <a:buNone/>
+                      </a:pPr>
+                      <a:r>
+                        <a:rPr lang="pt-BR" sz="1400" u="none" strike="noStrike" cap="none" spc="0" noProof="0"/>
+                        <a:t>--</a:t>
+                      </a:r>
+                    </a:p>
+                  </a:txBody>
+                  <a:tcPr marL="205251" marR="123150" marT="123150" marB="123150"/>
                 </a:tc>
                 <a:extLst>
                   <a:ext uri="{0D108BD9-81ED-4DB2-BD59-A6C34878D82A}">

</xml_diff>